<commit_message>
Add in the service specific deployment instructions
</commit_message>
<xml_diff>
--- a/images/source_images.pptx
+++ b/images/source_images.pptx
@@ -105,13 +105,18 @@
       </a:defRPr>
     </a:lvl9pPr>
   </p:defaultTextStyle>
+  <p:extLst>
+    <p:ext uri="{EFAFB233-063F-42B5-8137-9DF3F51BA10A}">
+      <p15:sldGuideLst xmlns:p15="http://schemas.microsoft.com/office/powerpoint/2012/main"/>
+    </p:ext>
+  </p:extLst>
 </p:presentation>
 </file>
 
 <file path=ppt/revisionInfo.xml><?xml version="1.0" encoding="utf-8"?>
 <p1510:revInfo xmlns:a="http://schemas.openxmlformats.org/drawingml/2006/main" xmlns:r="http://schemas.openxmlformats.org/officeDocument/2006/relationships" xmlns:p1510="http://schemas.microsoft.com/office/powerpoint/2015/10/main">
   <p1510:revLst>
-    <p1510:client id="{23B26FFF-7AF8-4582-BF06-9F7AC6C64342}" v="401" dt="2018-10-02T15:22:05.463"/>
+    <p1510:client id="{23B26FFF-7AF8-4582-BF06-9F7AC6C64342}" v="410" dt="2018-10-02T18:10:24.004"/>
   </p1510:revLst>
 </p1510:revInfo>
 </file>
@@ -121,7 +126,7 @@
   <pc:docChgLst>
     <pc:chgData name="Ken Barr" userId="08394fa4-6c67-4e80-95e1-dad59dfd7fac" providerId="ADAL" clId="{23B26FFF-7AF8-4582-BF06-9F7AC6C64342}"/>
     <pc:docChg chg="undo custSel mod addSld modSld">
-      <pc:chgData name="Ken Barr" userId="08394fa4-6c67-4e80-95e1-dad59dfd7fac" providerId="ADAL" clId="{23B26FFF-7AF8-4582-BF06-9F7AC6C64342}" dt="2018-10-02T15:22:05.462" v="400" actId="164"/>
+      <pc:chgData name="Ken Barr" userId="08394fa4-6c67-4e80-95e1-dad59dfd7fac" providerId="ADAL" clId="{23B26FFF-7AF8-4582-BF06-9F7AC6C64342}" dt="2018-10-02T18:10:24.003" v="409" actId="164"/>
       <pc:docMkLst>
         <pc:docMk/>
       </pc:docMkLst>
@@ -365,7 +370,7 @@
         </pc:cxnChg>
       </pc:sldChg>
       <pc:sldChg chg="addSp delSp modSp add mod setBg">
-        <pc:chgData name="Ken Barr" userId="08394fa4-6c67-4e80-95e1-dad59dfd7fac" providerId="ADAL" clId="{23B26FFF-7AF8-4582-BF06-9F7AC6C64342}" dt="2018-10-02T15:22:05.462" v="400" actId="164"/>
+        <pc:chgData name="Ken Barr" userId="08394fa4-6c67-4e80-95e1-dad59dfd7fac" providerId="ADAL" clId="{23B26FFF-7AF8-4582-BF06-9F7AC6C64342}" dt="2018-10-02T18:10:24.003" v="409" actId="164"/>
         <pc:sldMkLst>
           <pc:docMk/>
           <pc:sldMk cId="262467478" sldId="257"/>
@@ -419,7 +424,7 @@
           </ac:spMkLst>
         </pc:spChg>
         <pc:spChg chg="add mod">
-          <ac:chgData name="Ken Barr" userId="08394fa4-6c67-4e80-95e1-dad59dfd7fac" providerId="ADAL" clId="{23B26FFF-7AF8-4582-BF06-9F7AC6C64342}" dt="2018-10-02T15:22:05.462" v="400" actId="164"/>
+          <ac:chgData name="Ken Barr" userId="08394fa4-6c67-4e80-95e1-dad59dfd7fac" providerId="ADAL" clId="{23B26FFF-7AF8-4582-BF06-9F7AC6C64342}" dt="2018-10-02T18:09:48.587" v="407" actId="1076"/>
           <ac:spMkLst>
             <pc:docMk/>
             <pc:sldMk cId="262467478" sldId="257"/>
@@ -451,6 +456,14 @@
           </ac:spMkLst>
         </pc:spChg>
         <pc:grpChg chg="add mod">
+          <ac:chgData name="Ken Barr" userId="08394fa4-6c67-4e80-95e1-dad59dfd7fac" providerId="ADAL" clId="{23B26FFF-7AF8-4582-BF06-9F7AC6C64342}" dt="2018-10-02T18:10:24.003" v="409" actId="164"/>
+          <ac:grpSpMkLst>
+            <pc:docMk/>
+            <pc:sldMk cId="262467478" sldId="257"/>
+            <ac:grpSpMk id="2" creationId="{0A5C4AAE-228E-4E67-9742-CD8515782C60}"/>
+          </ac:grpSpMkLst>
+        </pc:grpChg>
+        <pc:grpChg chg="add mod">
           <ac:chgData name="Ken Barr" userId="08394fa4-6c67-4e80-95e1-dad59dfd7fac" providerId="ADAL" clId="{23B26FFF-7AF8-4582-BF06-9F7AC6C64342}" dt="2018-10-02T15:22:05.462" v="400" actId="164"/>
           <ac:grpSpMkLst>
             <pc:docMk/>
@@ -459,7 +472,7 @@
           </ac:grpSpMkLst>
         </pc:grpChg>
         <pc:grpChg chg="add mod">
-          <ac:chgData name="Ken Barr" userId="08394fa4-6c67-4e80-95e1-dad59dfd7fac" providerId="ADAL" clId="{23B26FFF-7AF8-4582-BF06-9F7AC6C64342}" dt="2018-10-02T15:22:05.462" v="400" actId="164"/>
+          <ac:chgData name="Ken Barr" userId="08394fa4-6c67-4e80-95e1-dad59dfd7fac" providerId="ADAL" clId="{23B26FFF-7AF8-4582-BF06-9F7AC6C64342}" dt="2018-10-02T18:10:24.003" v="409" actId="164"/>
           <ac:grpSpMkLst>
             <pc:docMk/>
             <pc:sldMk cId="262467478" sldId="257"/>
@@ -498,8 +511,8 @@
             <ac:picMk id="11" creationId="{A177B99B-A73A-4F1C-80D1-432DA26D2F64}"/>
           </ac:picMkLst>
         </pc:picChg>
-        <pc:picChg chg="add mod">
-          <ac:chgData name="Ken Barr" userId="08394fa4-6c67-4e80-95e1-dad59dfd7fac" providerId="ADAL" clId="{23B26FFF-7AF8-4582-BF06-9F7AC6C64342}" dt="2018-10-02T15:22:05.462" v="400" actId="164"/>
+        <pc:picChg chg="add del mod">
+          <ac:chgData name="Ken Barr" userId="08394fa4-6c67-4e80-95e1-dad59dfd7fac" providerId="ADAL" clId="{23B26FFF-7AF8-4582-BF06-9F7AC6C64342}" dt="2018-10-02T18:09:35.418" v="402"/>
           <ac:picMkLst>
             <pc:docMk/>
             <pc:sldMk cId="262467478" sldId="257"/>
@@ -520,6 +533,14 @@
             <pc:docMk/>
             <pc:sldMk cId="262467478" sldId="257"/>
             <ac:picMk id="26" creationId="{4BD30CAE-FF1E-4E2C-A4A0-2BD353115034}"/>
+          </ac:picMkLst>
+        </pc:picChg>
+        <pc:picChg chg="add mod">
+          <ac:chgData name="Ken Barr" userId="08394fa4-6c67-4e80-95e1-dad59dfd7fac" providerId="ADAL" clId="{23B26FFF-7AF8-4582-BF06-9F7AC6C64342}" dt="2018-10-02T18:10:24.003" v="409" actId="164"/>
+          <ac:picMkLst>
+            <pc:docMk/>
+            <pc:sldMk cId="262467478" sldId="257"/>
+            <ac:picMk id="33" creationId="{2F834631-092B-4291-A6C1-F1D7E345474B}"/>
           </ac:picMkLst>
         </pc:picChg>
         <pc:cxnChg chg="add del">
@@ -5292,10 +5313,10 @@
       </p:grpSpPr>
       <p:grpSp>
         <p:nvGrpSpPr>
-          <p:cNvPr id="32" name="Group 31">
+          <p:cNvPr id="2" name="Group 1">
             <a:extLst>
               <a:ext uri="{FF2B5EF4-FFF2-40B4-BE49-F238E27FC236}">
-                <a16:creationId xmlns:a16="http://schemas.microsoft.com/office/drawing/2014/main" id="{D3A78710-2126-4F19-A6C4-E6D3DB5D008D}"/>
+                <a16:creationId xmlns:a16="http://schemas.microsoft.com/office/drawing/2014/main" id="{0A5C4AAE-228E-4E67-9742-CD8515782C60}"/>
               </a:ext>
             </a:extLst>
           </p:cNvPr>
@@ -5310,391 +5331,512 @@
             <a:chExt cx="8310704" cy="3301546"/>
           </a:xfrm>
         </p:grpSpPr>
-        <p:pic>
-          <p:nvPicPr>
-            <p:cNvPr id="4" name="Picture 3">
+        <p:grpSp>
+          <p:nvGrpSpPr>
+            <p:cNvPr id="32" name="Group 31">
               <a:extLst>
                 <a:ext uri="{FF2B5EF4-FFF2-40B4-BE49-F238E27FC236}">
-                  <a16:creationId xmlns:a16="http://schemas.microsoft.com/office/drawing/2014/main" id="{90AABAEB-8BAF-40C5-A1F0-D9E4CB368B7E}"/>
+                  <a16:creationId xmlns:a16="http://schemas.microsoft.com/office/drawing/2014/main" id="{D3A78710-2126-4F19-A6C4-E6D3DB5D008D}"/>
                 </a:ext>
               </a:extLst>
             </p:cNvPr>
-            <p:cNvPicPr>
-              <a:picLocks noChangeAspect="1"/>
-            </p:cNvPicPr>
-            <p:nvPr/>
-          </p:nvPicPr>
-          <p:blipFill>
-            <a:blip r:embed="rId2" cstate="screen">
-              <a:extLst>
-                <a:ext uri="{28A0092B-C50C-407E-A947-70E740481C1C}">
-                  <a14:useLocalDpi xmlns:a14="http://schemas.microsoft.com/office/drawing/2010/main"/>
-                </a:ext>
-              </a:extLst>
-            </a:blip>
-            <a:stretch>
-              <a:fillRect/>
-            </a:stretch>
-          </p:blipFill>
-          <p:spPr>
-            <a:xfrm>
-              <a:off x="3177509" y="2770289"/>
-              <a:ext cx="1070805" cy="1055766"/>
-            </a:xfrm>
-            <a:prstGeom prst="rect">
-              <a:avLst/>
-            </a:prstGeom>
-            <a:effectLst/>
-          </p:spPr>
-        </p:pic>
-        <p:pic>
-          <p:nvPicPr>
-            <p:cNvPr id="9" name="Picture 8">
-              <a:extLst>
-                <a:ext uri="{FF2B5EF4-FFF2-40B4-BE49-F238E27FC236}">
-                  <a16:creationId xmlns:a16="http://schemas.microsoft.com/office/drawing/2014/main" id="{A4F0757E-E158-49EF-BE66-AA660102A140}"/>
-                </a:ext>
-              </a:extLst>
-            </p:cNvPr>
-            <p:cNvPicPr>
-              <a:picLocks noChangeAspect="1"/>
-            </p:cNvPicPr>
-            <p:nvPr/>
-          </p:nvPicPr>
-          <p:blipFill>
-            <a:blip r:embed="rId3">
-              <a:extLst>
-                <a:ext uri="{28A0092B-C50C-407E-A947-70E740481C1C}">
-                  <a14:useLocalDpi xmlns:a14="http://schemas.microsoft.com/office/drawing/2010/main" val="0"/>
-                </a:ext>
-              </a:extLst>
-            </a:blip>
-            <a:stretch>
-              <a:fillRect/>
-            </a:stretch>
-          </p:blipFill>
-          <p:spPr>
-            <a:xfrm>
-              <a:off x="5621046" y="2985175"/>
-              <a:ext cx="436327" cy="625640"/>
-            </a:xfrm>
-            <a:prstGeom prst="rect">
-              <a:avLst/>
-            </a:prstGeom>
-          </p:spPr>
-        </p:pic>
-        <p:pic>
-          <p:nvPicPr>
-            <p:cNvPr id="11" name="Picture 10">
-              <a:extLst>
-                <a:ext uri="{FF2B5EF4-FFF2-40B4-BE49-F238E27FC236}">
-                  <a16:creationId xmlns:a16="http://schemas.microsoft.com/office/drawing/2014/main" id="{A177B99B-A73A-4F1C-80D1-432DA26D2F64}"/>
-                </a:ext>
-              </a:extLst>
-            </p:cNvPr>
-            <p:cNvPicPr>
-              <a:picLocks noChangeAspect="1"/>
-            </p:cNvPicPr>
-            <p:nvPr/>
-          </p:nvPicPr>
-          <p:blipFill>
-            <a:blip r:embed="rId4">
-              <a:extLst>
-                <a:ext uri="{28A0092B-C50C-407E-A947-70E740481C1C}">
-                  <a14:useLocalDpi xmlns:a14="http://schemas.microsoft.com/office/drawing/2010/main" val="0"/>
-                </a:ext>
-              </a:extLst>
-            </a:blip>
-            <a:stretch>
-              <a:fillRect/>
-            </a:stretch>
-          </p:blipFill>
-          <p:spPr>
-            <a:xfrm>
-              <a:off x="6238042" y="2550629"/>
-              <a:ext cx="335701" cy="636066"/>
-            </a:xfrm>
-            <a:prstGeom prst="rect">
-              <a:avLst/>
-            </a:prstGeom>
-          </p:spPr>
-        </p:pic>
-        <p:pic>
-          <p:nvPicPr>
-            <p:cNvPr id="13" name="Picture 12">
-              <a:extLst>
-                <a:ext uri="{FF2B5EF4-FFF2-40B4-BE49-F238E27FC236}">
-                  <a16:creationId xmlns:a16="http://schemas.microsoft.com/office/drawing/2014/main" id="{4A46D5AB-5008-46EE-B010-6E49166C6331}"/>
-                </a:ext>
-              </a:extLst>
-            </p:cNvPr>
-            <p:cNvPicPr>
-              <a:picLocks noChangeAspect="1"/>
-            </p:cNvPicPr>
-            <p:nvPr/>
-          </p:nvPicPr>
-          <p:blipFill>
-            <a:blip r:embed="rId5">
-              <a:extLst>
-                <a:ext uri="{28A0092B-C50C-407E-A947-70E740481C1C}">
-                  <a14:useLocalDpi xmlns:a14="http://schemas.microsoft.com/office/drawing/2010/main" val="0"/>
-                </a:ext>
-              </a:extLst>
-            </a:blip>
-            <a:stretch>
-              <a:fillRect/>
-            </a:stretch>
-          </p:blipFill>
-          <p:spPr>
-            <a:xfrm>
-              <a:off x="6691851" y="3046932"/>
-              <a:ext cx="543745" cy="563883"/>
-            </a:xfrm>
-            <a:prstGeom prst="rect">
-              <a:avLst/>
-            </a:prstGeom>
-          </p:spPr>
-        </p:pic>
-        <p:pic>
-          <p:nvPicPr>
-            <p:cNvPr id="15" name="Picture 14">
-              <a:extLst>
-                <a:ext uri="{FF2B5EF4-FFF2-40B4-BE49-F238E27FC236}">
-                  <a16:creationId xmlns:a16="http://schemas.microsoft.com/office/drawing/2014/main" id="{8D38356F-3844-4E67-AEBB-9E8176808617}"/>
-                </a:ext>
-              </a:extLst>
-            </p:cNvPr>
-            <p:cNvPicPr>
-              <a:picLocks noChangeAspect="1"/>
-            </p:cNvPicPr>
-            <p:nvPr/>
-          </p:nvPicPr>
-          <p:blipFill>
-            <a:blip r:embed="rId6" cstate="print">
-              <a:extLst>
-                <a:ext uri="{28A0092B-C50C-407E-A947-70E740481C1C}">
-                  <a14:useLocalDpi xmlns:a14="http://schemas.microsoft.com/office/drawing/2010/main"/>
-                </a:ext>
-              </a:extLst>
-            </a:blip>
-            <a:stretch>
-              <a:fillRect/>
-            </a:stretch>
-          </p:blipFill>
-          <p:spPr>
-            <a:xfrm>
-              <a:off x="1040096" y="3055499"/>
-              <a:ext cx="1325716" cy="505917"/>
-            </a:xfrm>
-            <a:prstGeom prst="rect">
-              <a:avLst/>
-            </a:prstGeom>
-          </p:spPr>
-        </p:pic>
-        <p:cxnSp>
-          <p:nvCxnSpPr>
-            <p:cNvPr id="16" name="Straight Arrow Connector 15">
-              <a:extLst>
-                <a:ext uri="{FF2B5EF4-FFF2-40B4-BE49-F238E27FC236}">
-                  <a16:creationId xmlns:a16="http://schemas.microsoft.com/office/drawing/2014/main" id="{E4CB1C41-42E1-426A-A880-7744438641A2}"/>
-                </a:ext>
-              </a:extLst>
-            </p:cNvPr>
-            <p:cNvCxnSpPr>
-              <a:cxnSpLocks/>
-              <a:stCxn id="15" idx="3"/>
-              <a:endCxn id="4" idx="1"/>
-            </p:cNvCxnSpPr>
-            <p:nvPr/>
-          </p:nvCxnSpPr>
-          <p:spPr bwMode="auto">
-            <a:xfrm flipV="1">
-              <a:off x="2365812" y="3298172"/>
-              <a:ext cx="811697" cy="10286"/>
-            </a:xfrm>
-            <a:prstGeom prst="straightConnector1">
-              <a:avLst/>
-            </a:prstGeom>
-            <a:ln w="76200">
-              <a:solidFill>
-                <a:srgbClr val="62AA37"/>
-              </a:solidFill>
-              <a:headEnd type="triangle" w="med" len="med"/>
-              <a:tailEnd type="triangle" w="med" len="med"/>
-            </a:ln>
-          </p:spPr>
-          <p:style>
-            <a:lnRef idx="1">
-              <a:schemeClr val="dk1"/>
-            </a:lnRef>
-            <a:fillRef idx="0">
-              <a:schemeClr val="dk1"/>
-            </a:fillRef>
-            <a:effectRef idx="0">
-              <a:schemeClr val="dk1"/>
-            </a:effectRef>
-            <a:fontRef idx="minor">
-              <a:schemeClr val="tx1"/>
-            </a:fontRef>
-          </p:style>
-        </p:cxnSp>
-        <p:cxnSp>
-          <p:nvCxnSpPr>
-            <p:cNvPr id="17" name="Straight Arrow Connector 16">
-              <a:extLst>
-                <a:ext uri="{FF2B5EF4-FFF2-40B4-BE49-F238E27FC236}">
-                  <a16:creationId xmlns:a16="http://schemas.microsoft.com/office/drawing/2014/main" id="{94718BE7-C867-420D-9A20-4260A1E6D924}"/>
-                </a:ext>
-              </a:extLst>
-            </p:cNvPr>
-            <p:cNvCxnSpPr>
-              <a:cxnSpLocks/>
-              <a:stCxn id="4" idx="3"/>
-              <a:endCxn id="9" idx="1"/>
-            </p:cNvCxnSpPr>
-            <p:nvPr/>
-          </p:nvCxnSpPr>
-          <p:spPr bwMode="auto">
-            <a:xfrm flipV="1">
-              <a:off x="4248314" y="3297995"/>
-              <a:ext cx="1372732" cy="177"/>
-            </a:xfrm>
-            <a:prstGeom prst="straightConnector1">
-              <a:avLst/>
-            </a:prstGeom>
-            <a:ln w="76200">
-              <a:solidFill>
-                <a:srgbClr val="003469"/>
-              </a:solidFill>
-              <a:headEnd type="triangle" w="med" len="med"/>
-              <a:tailEnd type="triangle" w="med" len="med"/>
-            </a:ln>
-          </p:spPr>
-          <p:style>
-            <a:lnRef idx="1">
-              <a:schemeClr val="dk1"/>
-            </a:lnRef>
-            <a:fillRef idx="0">
-              <a:schemeClr val="dk1"/>
-            </a:fillRef>
-            <a:effectRef idx="0">
-              <a:schemeClr val="dk1"/>
-            </a:effectRef>
-            <a:fontRef idx="minor">
-              <a:schemeClr val="tx1"/>
-            </a:fontRef>
-          </p:style>
-        </p:cxnSp>
-        <p:pic>
-          <p:nvPicPr>
-            <p:cNvPr id="5" name="Picture 4">
-              <a:extLst>
-                <a:ext uri="{FF2B5EF4-FFF2-40B4-BE49-F238E27FC236}">
-                  <a16:creationId xmlns:a16="http://schemas.microsoft.com/office/drawing/2014/main" id="{C6B31AA8-A2A8-4259-9E8E-D784C70AA78E}"/>
-                </a:ext>
-              </a:extLst>
-            </p:cNvPr>
-            <p:cNvPicPr>
-              <a:picLocks noChangeAspect="1"/>
-            </p:cNvPicPr>
-            <p:nvPr/>
-          </p:nvPicPr>
-          <p:blipFill>
-            <a:blip r:embed="rId7">
-              <a:extLst>
-                <a:ext uri="{28A0092B-C50C-407E-A947-70E740481C1C}">
-                  <a14:useLocalDpi xmlns:a14="http://schemas.microsoft.com/office/drawing/2010/main" val="0"/>
-                </a:ext>
-              </a:extLst>
-            </a:blip>
-            <a:stretch>
-              <a:fillRect/>
-            </a:stretch>
-          </p:blipFill>
-          <p:spPr>
-            <a:xfrm>
-              <a:off x="4734331" y="3015876"/>
-              <a:ext cx="538195" cy="564237"/>
-            </a:xfrm>
-            <a:prstGeom prst="rect">
-              <a:avLst/>
-            </a:prstGeom>
-          </p:spPr>
-        </p:pic>
-        <p:cxnSp>
-          <p:nvCxnSpPr>
-            <p:cNvPr id="20" name="Straight Arrow Connector 19">
-              <a:extLst>
-                <a:ext uri="{FF2B5EF4-FFF2-40B4-BE49-F238E27FC236}">
-                  <a16:creationId xmlns:a16="http://schemas.microsoft.com/office/drawing/2014/main" id="{F32D1835-F29F-4A0B-8E4E-3EDC4E30B11E}"/>
-                </a:ext>
-              </a:extLst>
-            </p:cNvPr>
-            <p:cNvCxnSpPr>
-              <a:cxnSpLocks/>
-              <a:stCxn id="9" idx="3"/>
-            </p:cNvCxnSpPr>
-            <p:nvPr/>
-          </p:nvCxnSpPr>
-          <p:spPr bwMode="auto">
-            <a:xfrm>
-              <a:off x="6057373" y="3297995"/>
-              <a:ext cx="686366" cy="16993"/>
-            </a:xfrm>
-            <a:prstGeom prst="straightConnector1">
-              <a:avLst/>
-            </a:prstGeom>
-            <a:ln w="76200">
-              <a:solidFill>
-                <a:srgbClr val="003469"/>
-              </a:solidFill>
-              <a:headEnd type="triangle" w="med" len="med"/>
-              <a:tailEnd type="triangle" w="med" len="med"/>
-            </a:ln>
-          </p:spPr>
-          <p:style>
-            <a:lnRef idx="1">
-              <a:schemeClr val="dk1"/>
-            </a:lnRef>
-            <a:fillRef idx="0">
-              <a:schemeClr val="dk1"/>
-            </a:fillRef>
-            <a:effectRef idx="0">
-              <a:schemeClr val="dk1"/>
-            </a:effectRef>
-            <a:fontRef idx="minor">
-              <a:schemeClr val="tx1"/>
-            </a:fontRef>
-          </p:style>
-        </p:cxnSp>
-        <p:grpSp>
-          <p:nvGrpSpPr>
-            <p:cNvPr id="22" name="Group 21">
-              <a:extLst>
-                <a:ext uri="{FF2B5EF4-FFF2-40B4-BE49-F238E27FC236}">
-                  <a16:creationId xmlns:a16="http://schemas.microsoft.com/office/drawing/2014/main" id="{72C5963D-A01F-47A7-BB57-7FC74D50A0EA}"/>
-                </a:ext>
-              </a:extLst>
-            </p:cNvPr>
-            <p:cNvGrpSpPr>
-              <a:grpSpLocks/>
-            </p:cNvGrpSpPr>
+            <p:cNvGrpSpPr/>
             <p:nvPr/>
           </p:nvGrpSpPr>
-          <p:grpSpPr bwMode="auto">
+          <p:grpSpPr>
             <a:xfrm>
-              <a:off x="3182079" y="2643203"/>
-              <a:ext cx="2090447" cy="1278164"/>
-              <a:chOff x="545458" y="4783771"/>
-              <a:chExt cx="2293787" cy="1733798"/>
+              <a:off x="1040096" y="1444545"/>
+              <a:ext cx="8310704" cy="3301546"/>
+              <a:chOff x="1040096" y="1444545"/>
+              <a:chExt cx="8310704" cy="3301546"/>
             </a:xfrm>
           </p:grpSpPr>
+          <p:pic>
+            <p:nvPicPr>
+              <p:cNvPr id="4" name="Picture 3">
+                <a:extLst>
+                  <a:ext uri="{FF2B5EF4-FFF2-40B4-BE49-F238E27FC236}">
+                    <a16:creationId xmlns:a16="http://schemas.microsoft.com/office/drawing/2014/main" id="{90AABAEB-8BAF-40C5-A1F0-D9E4CB368B7E}"/>
+                  </a:ext>
+                </a:extLst>
+              </p:cNvPr>
+              <p:cNvPicPr>
+                <a:picLocks noChangeAspect="1"/>
+              </p:cNvPicPr>
+              <p:nvPr/>
+            </p:nvPicPr>
+            <p:blipFill>
+              <a:blip r:embed="rId2" cstate="screen">
+                <a:extLst>
+                  <a:ext uri="{28A0092B-C50C-407E-A947-70E740481C1C}">
+                    <a14:useLocalDpi xmlns:a14="http://schemas.microsoft.com/office/drawing/2010/main"/>
+                  </a:ext>
+                </a:extLst>
+              </a:blip>
+              <a:stretch>
+                <a:fillRect/>
+              </a:stretch>
+            </p:blipFill>
+            <p:spPr>
+              <a:xfrm>
+                <a:off x="3177509" y="2770289"/>
+                <a:ext cx="1070805" cy="1055766"/>
+              </a:xfrm>
+              <a:prstGeom prst="rect">
+                <a:avLst/>
+              </a:prstGeom>
+              <a:effectLst/>
+            </p:spPr>
+          </p:pic>
+          <p:pic>
+            <p:nvPicPr>
+              <p:cNvPr id="9" name="Picture 8">
+                <a:extLst>
+                  <a:ext uri="{FF2B5EF4-FFF2-40B4-BE49-F238E27FC236}">
+                    <a16:creationId xmlns:a16="http://schemas.microsoft.com/office/drawing/2014/main" id="{A4F0757E-E158-49EF-BE66-AA660102A140}"/>
+                  </a:ext>
+                </a:extLst>
+              </p:cNvPr>
+              <p:cNvPicPr>
+                <a:picLocks noChangeAspect="1"/>
+              </p:cNvPicPr>
+              <p:nvPr/>
+            </p:nvPicPr>
+            <p:blipFill>
+              <a:blip r:embed="rId3">
+                <a:extLst>
+                  <a:ext uri="{28A0092B-C50C-407E-A947-70E740481C1C}">
+                    <a14:useLocalDpi xmlns:a14="http://schemas.microsoft.com/office/drawing/2010/main" val="0"/>
+                  </a:ext>
+                </a:extLst>
+              </a:blip>
+              <a:stretch>
+                <a:fillRect/>
+              </a:stretch>
+            </p:blipFill>
+            <p:spPr>
+              <a:xfrm>
+                <a:off x="5621046" y="2985175"/>
+                <a:ext cx="436327" cy="625640"/>
+              </a:xfrm>
+              <a:prstGeom prst="rect">
+                <a:avLst/>
+              </a:prstGeom>
+            </p:spPr>
+          </p:pic>
+          <p:pic>
+            <p:nvPicPr>
+              <p:cNvPr id="11" name="Picture 10">
+                <a:extLst>
+                  <a:ext uri="{FF2B5EF4-FFF2-40B4-BE49-F238E27FC236}">
+                    <a16:creationId xmlns:a16="http://schemas.microsoft.com/office/drawing/2014/main" id="{A177B99B-A73A-4F1C-80D1-432DA26D2F64}"/>
+                  </a:ext>
+                </a:extLst>
+              </p:cNvPr>
+              <p:cNvPicPr>
+                <a:picLocks noChangeAspect="1"/>
+              </p:cNvPicPr>
+              <p:nvPr/>
+            </p:nvPicPr>
+            <p:blipFill>
+              <a:blip r:embed="rId4">
+                <a:extLst>
+                  <a:ext uri="{28A0092B-C50C-407E-A947-70E740481C1C}">
+                    <a14:useLocalDpi xmlns:a14="http://schemas.microsoft.com/office/drawing/2010/main" val="0"/>
+                  </a:ext>
+                </a:extLst>
+              </a:blip>
+              <a:stretch>
+                <a:fillRect/>
+              </a:stretch>
+            </p:blipFill>
+            <p:spPr>
+              <a:xfrm>
+                <a:off x="6238042" y="2550629"/>
+                <a:ext cx="335701" cy="636066"/>
+              </a:xfrm>
+              <a:prstGeom prst="rect">
+                <a:avLst/>
+              </a:prstGeom>
+            </p:spPr>
+          </p:pic>
+          <p:pic>
+            <p:nvPicPr>
+              <p:cNvPr id="15" name="Picture 14">
+                <a:extLst>
+                  <a:ext uri="{FF2B5EF4-FFF2-40B4-BE49-F238E27FC236}">
+                    <a16:creationId xmlns:a16="http://schemas.microsoft.com/office/drawing/2014/main" id="{8D38356F-3844-4E67-AEBB-9E8176808617}"/>
+                  </a:ext>
+                </a:extLst>
+              </p:cNvPr>
+              <p:cNvPicPr>
+                <a:picLocks noChangeAspect="1"/>
+              </p:cNvPicPr>
+              <p:nvPr/>
+            </p:nvPicPr>
+            <p:blipFill>
+              <a:blip r:embed="rId5" cstate="print">
+                <a:extLst>
+                  <a:ext uri="{28A0092B-C50C-407E-A947-70E740481C1C}">
+                    <a14:useLocalDpi xmlns:a14="http://schemas.microsoft.com/office/drawing/2010/main"/>
+                  </a:ext>
+                </a:extLst>
+              </a:blip>
+              <a:stretch>
+                <a:fillRect/>
+              </a:stretch>
+            </p:blipFill>
+            <p:spPr>
+              <a:xfrm>
+                <a:off x="1040096" y="3055499"/>
+                <a:ext cx="1325716" cy="505917"/>
+              </a:xfrm>
+              <a:prstGeom prst="rect">
+                <a:avLst/>
+              </a:prstGeom>
+            </p:spPr>
+          </p:pic>
+          <p:cxnSp>
+            <p:nvCxnSpPr>
+              <p:cNvPr id="16" name="Straight Arrow Connector 15">
+                <a:extLst>
+                  <a:ext uri="{FF2B5EF4-FFF2-40B4-BE49-F238E27FC236}">
+                    <a16:creationId xmlns:a16="http://schemas.microsoft.com/office/drawing/2014/main" id="{E4CB1C41-42E1-426A-A880-7744438641A2}"/>
+                  </a:ext>
+                </a:extLst>
+              </p:cNvPr>
+              <p:cNvCxnSpPr>
+                <a:cxnSpLocks/>
+                <a:stCxn id="15" idx="3"/>
+                <a:endCxn id="4" idx="1"/>
+              </p:cNvCxnSpPr>
+              <p:nvPr/>
+            </p:nvCxnSpPr>
+            <p:spPr bwMode="auto">
+              <a:xfrm flipV="1">
+                <a:off x="2365812" y="3298172"/>
+                <a:ext cx="811697" cy="10286"/>
+              </a:xfrm>
+              <a:prstGeom prst="straightConnector1">
+                <a:avLst/>
+              </a:prstGeom>
+              <a:ln w="76200">
+                <a:solidFill>
+                  <a:srgbClr val="62AA37"/>
+                </a:solidFill>
+                <a:headEnd type="triangle" w="med" len="med"/>
+                <a:tailEnd type="triangle" w="med" len="med"/>
+              </a:ln>
+            </p:spPr>
+            <p:style>
+              <a:lnRef idx="1">
+                <a:schemeClr val="dk1"/>
+              </a:lnRef>
+              <a:fillRef idx="0">
+                <a:schemeClr val="dk1"/>
+              </a:fillRef>
+              <a:effectRef idx="0">
+                <a:schemeClr val="dk1"/>
+              </a:effectRef>
+              <a:fontRef idx="minor">
+                <a:schemeClr val="tx1"/>
+              </a:fontRef>
+            </p:style>
+          </p:cxnSp>
+          <p:cxnSp>
+            <p:nvCxnSpPr>
+              <p:cNvPr id="17" name="Straight Arrow Connector 16">
+                <a:extLst>
+                  <a:ext uri="{FF2B5EF4-FFF2-40B4-BE49-F238E27FC236}">
+                    <a16:creationId xmlns:a16="http://schemas.microsoft.com/office/drawing/2014/main" id="{94718BE7-C867-420D-9A20-4260A1E6D924}"/>
+                  </a:ext>
+                </a:extLst>
+              </p:cNvPr>
+              <p:cNvCxnSpPr>
+                <a:cxnSpLocks/>
+                <a:stCxn id="4" idx="3"/>
+                <a:endCxn id="9" idx="1"/>
+              </p:cNvCxnSpPr>
+              <p:nvPr/>
+            </p:nvCxnSpPr>
+            <p:spPr bwMode="auto">
+              <a:xfrm flipV="1">
+                <a:off x="4248314" y="3297995"/>
+                <a:ext cx="1372732" cy="177"/>
+              </a:xfrm>
+              <a:prstGeom prst="straightConnector1">
+                <a:avLst/>
+              </a:prstGeom>
+              <a:ln w="76200">
+                <a:solidFill>
+                  <a:srgbClr val="003469"/>
+                </a:solidFill>
+                <a:headEnd type="triangle" w="med" len="med"/>
+                <a:tailEnd type="triangle" w="med" len="med"/>
+              </a:ln>
+            </p:spPr>
+            <p:style>
+              <a:lnRef idx="1">
+                <a:schemeClr val="dk1"/>
+              </a:lnRef>
+              <a:fillRef idx="0">
+                <a:schemeClr val="dk1"/>
+              </a:fillRef>
+              <a:effectRef idx="0">
+                <a:schemeClr val="dk1"/>
+              </a:effectRef>
+              <a:fontRef idx="minor">
+                <a:schemeClr val="tx1"/>
+              </a:fontRef>
+            </p:style>
+          </p:cxnSp>
+          <p:pic>
+            <p:nvPicPr>
+              <p:cNvPr id="5" name="Picture 4">
+                <a:extLst>
+                  <a:ext uri="{FF2B5EF4-FFF2-40B4-BE49-F238E27FC236}">
+                    <a16:creationId xmlns:a16="http://schemas.microsoft.com/office/drawing/2014/main" id="{C6B31AA8-A2A8-4259-9E8E-D784C70AA78E}"/>
+                  </a:ext>
+                </a:extLst>
+              </p:cNvPr>
+              <p:cNvPicPr>
+                <a:picLocks noChangeAspect="1"/>
+              </p:cNvPicPr>
+              <p:nvPr/>
+            </p:nvPicPr>
+            <p:blipFill>
+              <a:blip r:embed="rId6">
+                <a:extLst>
+                  <a:ext uri="{28A0092B-C50C-407E-A947-70E740481C1C}">
+                    <a14:useLocalDpi xmlns:a14="http://schemas.microsoft.com/office/drawing/2010/main" val="0"/>
+                  </a:ext>
+                </a:extLst>
+              </a:blip>
+              <a:stretch>
+                <a:fillRect/>
+              </a:stretch>
+            </p:blipFill>
+            <p:spPr>
+              <a:xfrm>
+                <a:off x="4734331" y="3015876"/>
+                <a:ext cx="538195" cy="564237"/>
+              </a:xfrm>
+              <a:prstGeom prst="rect">
+                <a:avLst/>
+              </a:prstGeom>
+            </p:spPr>
+          </p:pic>
+          <p:cxnSp>
+            <p:nvCxnSpPr>
+              <p:cNvPr id="20" name="Straight Arrow Connector 19">
+                <a:extLst>
+                  <a:ext uri="{FF2B5EF4-FFF2-40B4-BE49-F238E27FC236}">
+                    <a16:creationId xmlns:a16="http://schemas.microsoft.com/office/drawing/2014/main" id="{F32D1835-F29F-4A0B-8E4E-3EDC4E30B11E}"/>
+                  </a:ext>
+                </a:extLst>
+              </p:cNvPr>
+              <p:cNvCxnSpPr>
+                <a:cxnSpLocks/>
+                <a:stCxn id="9" idx="3"/>
+              </p:cNvCxnSpPr>
+              <p:nvPr/>
+            </p:nvCxnSpPr>
+            <p:spPr bwMode="auto">
+              <a:xfrm>
+                <a:off x="6057373" y="3297995"/>
+                <a:ext cx="686366" cy="16993"/>
+              </a:xfrm>
+              <a:prstGeom prst="straightConnector1">
+                <a:avLst/>
+              </a:prstGeom>
+              <a:ln w="76200">
+                <a:solidFill>
+                  <a:srgbClr val="003469"/>
+                </a:solidFill>
+                <a:headEnd type="triangle" w="med" len="med"/>
+                <a:tailEnd type="triangle" w="med" len="med"/>
+              </a:ln>
+            </p:spPr>
+            <p:style>
+              <a:lnRef idx="1">
+                <a:schemeClr val="dk1"/>
+              </a:lnRef>
+              <a:fillRef idx="0">
+                <a:schemeClr val="dk1"/>
+              </a:fillRef>
+              <a:effectRef idx="0">
+                <a:schemeClr val="dk1"/>
+              </a:effectRef>
+              <a:fontRef idx="minor">
+                <a:schemeClr val="tx1"/>
+              </a:fontRef>
+            </p:style>
+          </p:cxnSp>
+          <p:grpSp>
+            <p:nvGrpSpPr>
+              <p:cNvPr id="22" name="Group 21">
+                <a:extLst>
+                  <a:ext uri="{FF2B5EF4-FFF2-40B4-BE49-F238E27FC236}">
+                    <a16:creationId xmlns:a16="http://schemas.microsoft.com/office/drawing/2014/main" id="{72C5963D-A01F-47A7-BB57-7FC74D50A0EA}"/>
+                  </a:ext>
+                </a:extLst>
+              </p:cNvPr>
+              <p:cNvGrpSpPr>
+                <a:grpSpLocks/>
+              </p:cNvGrpSpPr>
+              <p:nvPr/>
+            </p:nvGrpSpPr>
+            <p:grpSpPr bwMode="auto">
+              <a:xfrm>
+                <a:off x="3182079" y="2643203"/>
+                <a:ext cx="2090447" cy="1278164"/>
+                <a:chOff x="545458" y="4783771"/>
+                <a:chExt cx="2293787" cy="1733798"/>
+              </a:xfrm>
+            </p:grpSpPr>
+            <p:sp>
+              <p:nvSpPr>
+                <p:cNvPr id="23" name="Rounded Rectangle 14">
+                  <a:extLst>
+                    <a:ext uri="{FF2B5EF4-FFF2-40B4-BE49-F238E27FC236}">
+                      <a16:creationId xmlns:a16="http://schemas.microsoft.com/office/drawing/2014/main" id="{83B47EA5-1426-4162-B30B-BBBD7165BF36}"/>
+                    </a:ext>
+                  </a:extLst>
+                </p:cNvPr>
+                <p:cNvSpPr/>
+                <p:nvPr/>
+              </p:nvSpPr>
+              <p:spPr>
+                <a:xfrm>
+                  <a:off x="545458" y="4783771"/>
+                  <a:ext cx="2293787" cy="1733798"/>
+                </a:xfrm>
+                <a:prstGeom prst="roundRect">
+                  <a:avLst>
+                    <a:gd name="adj" fmla="val 9818"/>
+                  </a:avLst>
+                </a:prstGeom>
+                <a:noFill/>
+                <a:ln w="19050">
+                  <a:solidFill>
+                    <a:schemeClr val="tx1"/>
+                  </a:solidFill>
+                  <a:prstDash val="solid"/>
+                </a:ln>
+                <a:effectLst/>
+              </p:spPr>
+              <p:style>
+                <a:lnRef idx="1">
+                  <a:schemeClr val="accent1"/>
+                </a:lnRef>
+                <a:fillRef idx="3">
+                  <a:schemeClr val="accent1"/>
+                </a:fillRef>
+                <a:effectRef idx="2">
+                  <a:schemeClr val="accent1"/>
+                </a:effectRef>
+                <a:fontRef idx="minor">
+                  <a:schemeClr val="lt1"/>
+                </a:fontRef>
+              </p:style>
+              <p:txBody>
+                <a:bodyPr anchor="ctr"/>
+                <a:lstStyle/>
+                <a:p>
+                  <a:pPr algn="ctr" fontAlgn="auto">
+                    <a:spcBef>
+                      <a:spcPts val="0"/>
+                    </a:spcBef>
+                    <a:spcAft>
+                      <a:spcPts val="0"/>
+                    </a:spcAft>
+                    <a:defRPr/>
+                  </a:pPr>
+                  <a:endParaRPr lang="en-US" dirty="0">
+                    <a:solidFill>
+                      <a:schemeClr val="tx1"/>
+                    </a:solidFill>
+                    <a:latin typeface="Helvetica Neue"/>
+                    <a:cs typeface="Helvetica Neue"/>
+                  </a:endParaRPr>
+                </a:p>
+              </p:txBody>
+            </p:sp>
+            <p:sp>
+              <p:nvSpPr>
+                <p:cNvPr id="24" name="Rounded Rectangle 15">
+                  <a:extLst>
+                    <a:ext uri="{FF2B5EF4-FFF2-40B4-BE49-F238E27FC236}">
+                      <a16:creationId xmlns:a16="http://schemas.microsoft.com/office/drawing/2014/main" id="{0626774B-A58F-48CD-92B3-1A46BF3879C8}"/>
+                    </a:ext>
+                  </a:extLst>
+                </p:cNvPr>
+                <p:cNvSpPr/>
+                <p:nvPr/>
+              </p:nvSpPr>
+              <p:spPr>
+                <a:xfrm>
+                  <a:off x="545458" y="4783771"/>
+                  <a:ext cx="2293787" cy="1733798"/>
+                </a:xfrm>
+                <a:prstGeom prst="roundRect">
+                  <a:avLst>
+                    <a:gd name="adj" fmla="val 9818"/>
+                  </a:avLst>
+                </a:prstGeom>
+                <a:noFill/>
+                <a:ln w="19050">
+                  <a:solidFill>
+                    <a:srgbClr val="FF0000"/>
+                  </a:solidFill>
+                  <a:prstDash val="lgDash"/>
+                </a:ln>
+                <a:effectLst/>
+              </p:spPr>
+              <p:style>
+                <a:lnRef idx="1">
+                  <a:schemeClr val="accent1"/>
+                </a:lnRef>
+                <a:fillRef idx="3">
+                  <a:schemeClr val="accent1"/>
+                </a:fillRef>
+                <a:effectRef idx="2">
+                  <a:schemeClr val="accent1"/>
+                </a:effectRef>
+                <a:fontRef idx="minor">
+                  <a:schemeClr val="lt1"/>
+                </a:fontRef>
+              </p:style>
+              <p:txBody>
+                <a:bodyPr anchor="ctr"/>
+                <a:lstStyle/>
+                <a:p>
+                  <a:pPr algn="ctr" fontAlgn="auto">
+                    <a:spcBef>
+                      <a:spcPts val="0"/>
+                    </a:spcBef>
+                    <a:spcAft>
+                      <a:spcPts val="0"/>
+                    </a:spcAft>
+                    <a:defRPr/>
+                  </a:pPr>
+                  <a:endParaRPr lang="en-US" dirty="0">
+                    <a:solidFill>
+                      <a:schemeClr val="tx1"/>
+                    </a:solidFill>
+                    <a:latin typeface="Helvetica Neue"/>
+                    <a:cs typeface="Helvetica Neue"/>
+                  </a:endParaRPr>
+                </a:p>
+              </p:txBody>
+            </p:sp>
+          </p:grpSp>
           <p:sp>
             <p:nvSpPr>
-              <p:cNvPr id="23" name="Rounded Rectangle 14">
+              <p:cNvPr id="25" name="Rounded Rectangle 21">
                 <a:extLst>
                   <a:ext uri="{FF2B5EF4-FFF2-40B4-BE49-F238E27FC236}">
-                    <a16:creationId xmlns:a16="http://schemas.microsoft.com/office/drawing/2014/main" id="{83B47EA5-1426-4162-B30B-BBBD7165BF36}"/>
+                    <a16:creationId xmlns:a16="http://schemas.microsoft.com/office/drawing/2014/main" id="{A325EC13-D7FB-461A-9F3A-6712A769407D}"/>
                   </a:ext>
                 </a:extLst>
               </p:cNvPr>
@@ -5703,8 +5845,8 @@
             </p:nvSpPr>
             <p:spPr>
               <a:xfrm>
-                <a:off x="545458" y="4783771"/>
-                <a:ext cx="2293787" cy="1733798"/>
+                <a:off x="3000290" y="2319920"/>
+                <a:ext cx="3082564" cy="1733550"/>
               </a:xfrm>
               <a:prstGeom prst="roundRect">
                 <a:avLst>
@@ -5712,7 +5854,7 @@
                 </a:avLst>
               </a:prstGeom>
               <a:noFill/>
-              <a:ln w="19050">
+              <a:ln w="6350">
                 <a:solidFill>
                   <a:schemeClr val="tx1"/>
                 </a:solidFill>
@@ -5757,149 +5899,271 @@
               </a:p>
             </p:txBody>
           </p:sp>
-          <p:sp>
-            <p:nvSpPr>
-              <p:cNvPr id="24" name="Rounded Rectangle 15">
+          <p:pic>
+            <p:nvPicPr>
+              <p:cNvPr id="26" name="Picture 25">
                 <a:extLst>
                   <a:ext uri="{FF2B5EF4-FFF2-40B4-BE49-F238E27FC236}">
-                    <a16:creationId xmlns:a16="http://schemas.microsoft.com/office/drawing/2014/main" id="{0626774B-A58F-48CD-92B3-1A46BF3879C8}"/>
+                    <a16:creationId xmlns:a16="http://schemas.microsoft.com/office/drawing/2014/main" id="{4BD30CAE-FF1E-4E2C-A4A0-2BD353115034}"/>
                   </a:ext>
                 </a:extLst>
               </p:cNvPr>
-              <p:cNvSpPr/>
+              <p:cNvPicPr>
+                <a:picLocks noChangeAspect="1"/>
+              </p:cNvPicPr>
+              <p:nvPr/>
+            </p:nvPicPr>
+            <p:blipFill>
+              <a:blip r:embed="rId7"/>
+              <a:stretch>
+                <a:fillRect/>
+              </a:stretch>
+            </p:blipFill>
+            <p:spPr>
+              <a:xfrm>
+                <a:off x="3069559" y="2168021"/>
+                <a:ext cx="215900" cy="241300"/>
+              </a:xfrm>
+              <a:prstGeom prst="rect">
+                <a:avLst/>
+              </a:prstGeom>
+            </p:spPr>
+          </p:pic>
+          <p:sp>
+            <p:nvSpPr>
+              <p:cNvPr id="27" name="TextBox 26">
+                <a:extLst>
+                  <a:ext uri="{FF2B5EF4-FFF2-40B4-BE49-F238E27FC236}">
+                    <a16:creationId xmlns:a16="http://schemas.microsoft.com/office/drawing/2014/main" id="{CA383DF6-4841-48BE-A57A-B0076B5CE94B}"/>
+                  </a:ext>
+                </a:extLst>
+              </p:cNvPr>
+              <p:cNvSpPr txBox="1"/>
               <p:nvPr/>
             </p:nvSpPr>
             <p:spPr>
               <a:xfrm>
-                <a:off x="545458" y="4783771"/>
-                <a:ext cx="2293787" cy="1733798"/>
+                <a:off x="1053228" y="3561416"/>
+                <a:ext cx="1727076" cy="923330"/>
               </a:xfrm>
-              <a:prstGeom prst="roundRect">
-                <a:avLst>
-                  <a:gd name="adj" fmla="val 9818"/>
-                </a:avLst>
+              <a:prstGeom prst="rect">
+                <a:avLst/>
               </a:prstGeom>
               <a:noFill/>
-              <a:ln w="19050">
-                <a:solidFill>
-                  <a:srgbClr val="FF0000"/>
-                </a:solidFill>
-                <a:prstDash val="lgDash"/>
-              </a:ln>
-              <a:effectLst/>
             </p:spPr>
-            <p:style>
-              <a:lnRef idx="1">
-                <a:schemeClr val="accent1"/>
-              </a:lnRef>
-              <a:fillRef idx="3">
-                <a:schemeClr val="accent1"/>
-              </a:fillRef>
-              <a:effectRef idx="2">
-                <a:schemeClr val="accent1"/>
-              </a:effectRef>
-              <a:fontRef idx="minor">
-                <a:schemeClr val="lt1"/>
-              </a:fontRef>
-            </p:style>
             <p:txBody>
-              <a:bodyPr anchor="ctr"/>
+              <a:bodyPr wrap="none" rtlCol="0">
+                <a:spAutoFit/>
+              </a:bodyPr>
               <a:lstStyle/>
               <a:p>
-                <a:pPr algn="ctr" fontAlgn="auto">
-                  <a:spcBef>
-                    <a:spcPts val="0"/>
-                  </a:spcBef>
-                  <a:spcAft>
-                    <a:spcPts val="0"/>
-                  </a:spcAft>
-                  <a:defRPr/>
-                </a:pPr>
-                <a:endParaRPr lang="en-US" dirty="0">
-                  <a:solidFill>
-                    <a:schemeClr val="tx1"/>
-                  </a:solidFill>
-                  <a:latin typeface="Helvetica Neue"/>
-                  <a:cs typeface="Helvetica Neue"/>
-                </a:endParaRPr>
+                <a:r>
+                  <a:rPr lang="en-CA" dirty="0"/>
+                  <a:t>Application </a:t>
+                </a:r>
+              </a:p>
+              <a:p>
+                <a:r>
+                  <a:rPr lang="en-CA" dirty="0"/>
+                  <a:t>send/receive</a:t>
+                </a:r>
+              </a:p>
+              <a:p>
+                <a:r>
+                  <a:rPr lang="en-CA" dirty="0"/>
+                  <a:t>JMS for example</a:t>
+                </a:r>
+              </a:p>
+            </p:txBody>
+          </p:sp>
+          <p:sp>
+            <p:nvSpPr>
+              <p:cNvPr id="28" name="TextBox 27">
+                <a:extLst>
+                  <a:ext uri="{FF2B5EF4-FFF2-40B4-BE49-F238E27FC236}">
+                    <a16:creationId xmlns:a16="http://schemas.microsoft.com/office/drawing/2014/main" id="{0507B6BA-2D43-4727-A29E-A10ADD3360E3}"/>
+                  </a:ext>
+                </a:extLst>
+              </p:cNvPr>
+              <p:cNvSpPr txBox="1"/>
+              <p:nvPr/>
+            </p:nvSpPr>
+            <p:spPr>
+              <a:xfrm>
+                <a:off x="6573743" y="3769757"/>
+                <a:ext cx="2026389" cy="646331"/>
+              </a:xfrm>
+              <a:prstGeom prst="rect">
+                <a:avLst/>
+              </a:prstGeom>
+              <a:noFill/>
+            </p:spPr>
+            <p:txBody>
+              <a:bodyPr wrap="none" rtlCol="0">
+                <a:spAutoFit/>
+              </a:bodyPr>
+              <a:lstStyle/>
+              <a:p>
+                <a:r>
+                  <a:rPr lang="en-CA" dirty="0"/>
+                  <a:t>Data written to SQS</a:t>
+                </a:r>
+              </a:p>
+              <a:p>
+                <a:r>
+                  <a:rPr lang="en-CA" dirty="0"/>
+                  <a:t>for example</a:t>
+                </a:r>
+              </a:p>
+            </p:txBody>
+          </p:sp>
+          <p:sp>
+            <p:nvSpPr>
+              <p:cNvPr id="29" name="TextBox 28">
+                <a:extLst>
+                  <a:ext uri="{FF2B5EF4-FFF2-40B4-BE49-F238E27FC236}">
+                    <a16:creationId xmlns:a16="http://schemas.microsoft.com/office/drawing/2014/main" id="{28212C3F-ABD1-4B87-95BE-6C7F0F29D62A}"/>
+                  </a:ext>
+                </a:extLst>
+              </p:cNvPr>
+              <p:cNvSpPr txBox="1"/>
+              <p:nvPr/>
+            </p:nvSpPr>
+            <p:spPr>
+              <a:xfrm>
+                <a:off x="6082854" y="1627299"/>
+                <a:ext cx="3267946" cy="923330"/>
+              </a:xfrm>
+              <a:prstGeom prst="rect">
+                <a:avLst/>
+              </a:prstGeom>
+              <a:noFill/>
+            </p:spPr>
+            <p:txBody>
+              <a:bodyPr wrap="none" rtlCol="0">
+                <a:spAutoFit/>
+              </a:bodyPr>
+              <a:lstStyle/>
+              <a:p>
+                <a:r>
+                  <a:rPr lang="en-CA" dirty="0"/>
+                  <a:t>IAM Role generated </a:t>
+                </a:r>
+              </a:p>
+              <a:p>
+                <a:r>
+                  <a:rPr lang="en-CA" dirty="0"/>
+                  <a:t>Allowing specific resource access</a:t>
+                </a:r>
+              </a:p>
+              <a:p>
+                <a:r>
+                  <a:rPr lang="en-CA" dirty="0"/>
+                  <a:t>Can be across AWS account</a:t>
+                </a:r>
+              </a:p>
+            </p:txBody>
+          </p:sp>
+          <p:sp>
+            <p:nvSpPr>
+              <p:cNvPr id="30" name="TextBox 29">
+                <a:extLst>
+                  <a:ext uri="{FF2B5EF4-FFF2-40B4-BE49-F238E27FC236}">
+                    <a16:creationId xmlns:a16="http://schemas.microsoft.com/office/drawing/2014/main" id="{C2E85324-8C6E-49E0-ABAD-E9909CC0E49C}"/>
+                  </a:ext>
+                </a:extLst>
+              </p:cNvPr>
+              <p:cNvSpPr txBox="1"/>
+              <p:nvPr/>
+            </p:nvSpPr>
+            <p:spPr>
+              <a:xfrm>
+                <a:off x="3823074" y="1444545"/>
+                <a:ext cx="2179892" cy="923330"/>
+              </a:xfrm>
+              <a:prstGeom prst="rect">
+                <a:avLst/>
+              </a:prstGeom>
+              <a:noFill/>
+            </p:spPr>
+            <p:txBody>
+              <a:bodyPr wrap="none" rtlCol="0">
+                <a:spAutoFit/>
+              </a:bodyPr>
+              <a:lstStyle/>
+              <a:p>
+                <a:r>
+                  <a:rPr lang="en-CA" dirty="0"/>
+                  <a:t>Internal </a:t>
+                </a:r>
+                <a:r>
+                  <a:rPr lang="en-CA" dirty="0" err="1"/>
+                  <a:t>APIGateway</a:t>
+                </a:r>
+                <a:endParaRPr lang="en-CA" dirty="0"/>
+              </a:p>
+              <a:p>
+                <a:r>
+                  <a:rPr lang="en-CA" dirty="0"/>
+                  <a:t>w/ VPC endpoint in </a:t>
+                </a:r>
+              </a:p>
+              <a:p>
+                <a:r>
+                  <a:rPr lang="en-CA" dirty="0"/>
+                  <a:t>closed security group</a:t>
+                </a:r>
+              </a:p>
+            </p:txBody>
+          </p:sp>
+          <p:sp>
+            <p:nvSpPr>
+              <p:cNvPr id="31" name="TextBox 30">
+                <a:extLst>
+                  <a:ext uri="{FF2B5EF4-FFF2-40B4-BE49-F238E27FC236}">
+                    <a16:creationId xmlns:a16="http://schemas.microsoft.com/office/drawing/2014/main" id="{9590DEE4-A6DE-4091-B4DB-E46311CC1AD5}"/>
+                  </a:ext>
+                </a:extLst>
+              </p:cNvPr>
+              <p:cNvSpPr txBox="1"/>
+              <p:nvPr/>
+            </p:nvSpPr>
+            <p:spPr>
+              <a:xfrm>
+                <a:off x="2941000" y="4099760"/>
+                <a:ext cx="2614627" cy="646331"/>
+              </a:xfrm>
+              <a:prstGeom prst="rect">
+                <a:avLst/>
+              </a:prstGeom>
+              <a:noFill/>
+            </p:spPr>
+            <p:txBody>
+              <a:bodyPr wrap="none" rtlCol="0">
+                <a:spAutoFit/>
+              </a:bodyPr>
+              <a:lstStyle/>
+              <a:p>
+                <a:r>
+                  <a:rPr lang="en-CA" dirty="0"/>
+                  <a:t>Solace message broker</a:t>
+                </a:r>
+              </a:p>
+              <a:p>
+                <a:r>
+                  <a:rPr lang="en-CA" dirty="0"/>
+                  <a:t>w/ Rest Delivery Endpoint</a:t>
+                </a:r>
               </a:p>
             </p:txBody>
           </p:sp>
         </p:grpSp>
-        <p:sp>
-          <p:nvSpPr>
-            <p:cNvPr id="25" name="Rounded Rectangle 21">
+        <p:pic>
+          <p:nvPicPr>
+            <p:cNvPr id="33" name="Picture 32">
               <a:extLst>
                 <a:ext uri="{FF2B5EF4-FFF2-40B4-BE49-F238E27FC236}">
-                  <a16:creationId xmlns:a16="http://schemas.microsoft.com/office/drawing/2014/main" id="{A325EC13-D7FB-461A-9F3A-6712A769407D}"/>
-                </a:ext>
-              </a:extLst>
-            </p:cNvPr>
-            <p:cNvSpPr/>
-            <p:nvPr/>
-          </p:nvSpPr>
-          <p:spPr>
-            <a:xfrm>
-              <a:off x="3000290" y="2319920"/>
-              <a:ext cx="3082564" cy="1733550"/>
-            </a:xfrm>
-            <a:prstGeom prst="roundRect">
-              <a:avLst>
-                <a:gd name="adj" fmla="val 9818"/>
-              </a:avLst>
-            </a:prstGeom>
-            <a:noFill/>
-            <a:ln w="6350">
-              <a:solidFill>
-                <a:schemeClr val="tx1"/>
-              </a:solidFill>
-              <a:prstDash val="solid"/>
-            </a:ln>
-            <a:effectLst/>
-          </p:spPr>
-          <p:style>
-            <a:lnRef idx="1">
-              <a:schemeClr val="accent1"/>
-            </a:lnRef>
-            <a:fillRef idx="3">
-              <a:schemeClr val="accent1"/>
-            </a:fillRef>
-            <a:effectRef idx="2">
-              <a:schemeClr val="accent1"/>
-            </a:effectRef>
-            <a:fontRef idx="minor">
-              <a:schemeClr val="lt1"/>
-            </a:fontRef>
-          </p:style>
-          <p:txBody>
-            <a:bodyPr anchor="ctr"/>
-            <a:lstStyle/>
-            <a:p>
-              <a:pPr algn="ctr" fontAlgn="auto">
-                <a:spcBef>
-                  <a:spcPts val="0"/>
-                </a:spcBef>
-                <a:spcAft>
-                  <a:spcPts val="0"/>
-                </a:spcAft>
-                <a:defRPr/>
-              </a:pPr>
-              <a:endParaRPr lang="en-US" dirty="0">
-                <a:solidFill>
-                  <a:schemeClr val="tx1"/>
-                </a:solidFill>
-                <a:latin typeface="Helvetica Neue"/>
-                <a:cs typeface="Helvetica Neue"/>
-              </a:endParaRPr>
-            </a:p>
-          </p:txBody>
-        </p:sp>
-        <p:pic>
-          <p:nvPicPr>
-            <p:cNvPr id="26" name="Picture 25">
-              <a:extLst>
-                <a:ext uri="{FF2B5EF4-FFF2-40B4-BE49-F238E27FC236}">
-                  <a16:creationId xmlns:a16="http://schemas.microsoft.com/office/drawing/2014/main" id="{4BD30CAE-FF1E-4E2C-A4A0-2BD353115034}"/>
+                  <a16:creationId xmlns:a16="http://schemas.microsoft.com/office/drawing/2014/main" id="{2F834631-092B-4291-A6C1-F1D7E345474B}"/>
                 </a:ext>
               </a:extLst>
             </p:cNvPr>
@@ -5909,249 +6173,27 @@
             <p:nvPr/>
           </p:nvPicPr>
           <p:blipFill>
-            <a:blip r:embed="rId8"/>
+            <a:blip r:embed="rId8">
+              <a:extLst>
+                <a:ext uri="{28A0092B-C50C-407E-A947-70E740481C1C}">
+                  <a14:useLocalDpi xmlns:a14="http://schemas.microsoft.com/office/drawing/2010/main" val="0"/>
+                </a:ext>
+              </a:extLst>
+            </a:blip>
             <a:stretch>
               <a:fillRect/>
             </a:stretch>
           </p:blipFill>
           <p:spPr>
             <a:xfrm>
-              <a:off x="3069559" y="2168021"/>
-              <a:ext cx="215900" cy="241300"/>
+              <a:off x="6752769" y="2975514"/>
+              <a:ext cx="693132" cy="745246"/>
             </a:xfrm>
             <a:prstGeom prst="rect">
               <a:avLst/>
             </a:prstGeom>
           </p:spPr>
         </p:pic>
-        <p:sp>
-          <p:nvSpPr>
-            <p:cNvPr id="27" name="TextBox 26">
-              <a:extLst>
-                <a:ext uri="{FF2B5EF4-FFF2-40B4-BE49-F238E27FC236}">
-                  <a16:creationId xmlns:a16="http://schemas.microsoft.com/office/drawing/2014/main" id="{CA383DF6-4841-48BE-A57A-B0076B5CE94B}"/>
-                </a:ext>
-              </a:extLst>
-            </p:cNvPr>
-            <p:cNvSpPr txBox="1"/>
-            <p:nvPr/>
-          </p:nvSpPr>
-          <p:spPr>
-            <a:xfrm>
-              <a:off x="1053228" y="3561416"/>
-              <a:ext cx="1727076" cy="923330"/>
-            </a:xfrm>
-            <a:prstGeom prst="rect">
-              <a:avLst/>
-            </a:prstGeom>
-            <a:noFill/>
-          </p:spPr>
-          <p:txBody>
-            <a:bodyPr wrap="none" rtlCol="0">
-              <a:spAutoFit/>
-            </a:bodyPr>
-            <a:lstStyle/>
-            <a:p>
-              <a:r>
-                <a:rPr lang="en-CA" dirty="0"/>
-                <a:t>Application </a:t>
-              </a:r>
-            </a:p>
-            <a:p>
-              <a:r>
-                <a:rPr lang="en-CA" dirty="0"/>
-                <a:t>send/receive</a:t>
-              </a:r>
-            </a:p>
-            <a:p>
-              <a:r>
-                <a:rPr lang="en-CA" dirty="0"/>
-                <a:t>JMS for example</a:t>
-              </a:r>
-            </a:p>
-          </p:txBody>
-        </p:sp>
-        <p:sp>
-          <p:nvSpPr>
-            <p:cNvPr id="28" name="TextBox 27">
-              <a:extLst>
-                <a:ext uri="{FF2B5EF4-FFF2-40B4-BE49-F238E27FC236}">
-                  <a16:creationId xmlns:a16="http://schemas.microsoft.com/office/drawing/2014/main" id="{0507B6BA-2D43-4727-A29E-A10ADD3360E3}"/>
-                </a:ext>
-              </a:extLst>
-            </p:cNvPr>
-            <p:cNvSpPr txBox="1"/>
-            <p:nvPr/>
-          </p:nvSpPr>
-          <p:spPr>
-            <a:xfrm>
-              <a:off x="6573743" y="3617433"/>
-              <a:ext cx="1882118" cy="646331"/>
-            </a:xfrm>
-            <a:prstGeom prst="rect">
-              <a:avLst/>
-            </a:prstGeom>
-            <a:noFill/>
-          </p:spPr>
-          <p:txBody>
-            <a:bodyPr wrap="none" rtlCol="0">
-              <a:spAutoFit/>
-            </a:bodyPr>
-            <a:lstStyle/>
-            <a:p>
-              <a:r>
-                <a:rPr lang="en-CA" dirty="0"/>
-                <a:t>Data written to S3</a:t>
-              </a:r>
-            </a:p>
-            <a:p>
-              <a:r>
-                <a:rPr lang="en-CA" dirty="0"/>
-                <a:t>for example</a:t>
-              </a:r>
-            </a:p>
-          </p:txBody>
-        </p:sp>
-        <p:sp>
-          <p:nvSpPr>
-            <p:cNvPr id="29" name="TextBox 28">
-              <a:extLst>
-                <a:ext uri="{FF2B5EF4-FFF2-40B4-BE49-F238E27FC236}">
-                  <a16:creationId xmlns:a16="http://schemas.microsoft.com/office/drawing/2014/main" id="{28212C3F-ABD1-4B87-95BE-6C7F0F29D62A}"/>
-                </a:ext>
-              </a:extLst>
-            </p:cNvPr>
-            <p:cNvSpPr txBox="1"/>
-            <p:nvPr/>
-          </p:nvSpPr>
-          <p:spPr>
-            <a:xfrm>
-              <a:off x="6082854" y="1627299"/>
-              <a:ext cx="3267946" cy="923330"/>
-            </a:xfrm>
-            <a:prstGeom prst="rect">
-              <a:avLst/>
-            </a:prstGeom>
-            <a:noFill/>
-          </p:spPr>
-          <p:txBody>
-            <a:bodyPr wrap="none" rtlCol="0">
-              <a:spAutoFit/>
-            </a:bodyPr>
-            <a:lstStyle/>
-            <a:p>
-              <a:r>
-                <a:rPr lang="en-CA" dirty="0"/>
-                <a:t>IAM Role generated </a:t>
-              </a:r>
-            </a:p>
-            <a:p>
-              <a:r>
-                <a:rPr lang="en-CA" dirty="0"/>
-                <a:t>Allowing specific resource access</a:t>
-              </a:r>
-            </a:p>
-            <a:p>
-              <a:r>
-                <a:rPr lang="en-CA" dirty="0"/>
-                <a:t>Can be across AWS account</a:t>
-              </a:r>
-            </a:p>
-          </p:txBody>
-        </p:sp>
-        <p:sp>
-          <p:nvSpPr>
-            <p:cNvPr id="30" name="TextBox 29">
-              <a:extLst>
-                <a:ext uri="{FF2B5EF4-FFF2-40B4-BE49-F238E27FC236}">
-                  <a16:creationId xmlns:a16="http://schemas.microsoft.com/office/drawing/2014/main" id="{C2E85324-8C6E-49E0-ABAD-E9909CC0E49C}"/>
-                </a:ext>
-              </a:extLst>
-            </p:cNvPr>
-            <p:cNvSpPr txBox="1"/>
-            <p:nvPr/>
-          </p:nvSpPr>
-          <p:spPr>
-            <a:xfrm>
-              <a:off x="3823074" y="1444545"/>
-              <a:ext cx="2179892" cy="923330"/>
-            </a:xfrm>
-            <a:prstGeom prst="rect">
-              <a:avLst/>
-            </a:prstGeom>
-            <a:noFill/>
-          </p:spPr>
-          <p:txBody>
-            <a:bodyPr wrap="none" rtlCol="0">
-              <a:spAutoFit/>
-            </a:bodyPr>
-            <a:lstStyle/>
-            <a:p>
-              <a:r>
-                <a:rPr lang="en-CA" dirty="0"/>
-                <a:t>Internal </a:t>
-              </a:r>
-              <a:r>
-                <a:rPr lang="en-CA" dirty="0" err="1"/>
-                <a:t>APIGateway</a:t>
-              </a:r>
-              <a:endParaRPr lang="en-CA" dirty="0"/>
-            </a:p>
-            <a:p>
-              <a:r>
-                <a:rPr lang="en-CA" dirty="0"/>
-                <a:t>w/ VPC endpoint in </a:t>
-              </a:r>
-            </a:p>
-            <a:p>
-              <a:r>
-                <a:rPr lang="en-CA" dirty="0"/>
-                <a:t>closed security group</a:t>
-              </a:r>
-            </a:p>
-          </p:txBody>
-        </p:sp>
-        <p:sp>
-          <p:nvSpPr>
-            <p:cNvPr id="31" name="TextBox 30">
-              <a:extLst>
-                <a:ext uri="{FF2B5EF4-FFF2-40B4-BE49-F238E27FC236}">
-                  <a16:creationId xmlns:a16="http://schemas.microsoft.com/office/drawing/2014/main" id="{9590DEE4-A6DE-4091-B4DB-E46311CC1AD5}"/>
-                </a:ext>
-              </a:extLst>
-            </p:cNvPr>
-            <p:cNvSpPr txBox="1"/>
-            <p:nvPr/>
-          </p:nvSpPr>
-          <p:spPr>
-            <a:xfrm>
-              <a:off x="2941000" y="4099760"/>
-              <a:ext cx="2614627" cy="646331"/>
-            </a:xfrm>
-            <a:prstGeom prst="rect">
-              <a:avLst/>
-            </a:prstGeom>
-            <a:noFill/>
-          </p:spPr>
-          <p:txBody>
-            <a:bodyPr wrap="none" rtlCol="0">
-              <a:spAutoFit/>
-            </a:bodyPr>
-            <a:lstStyle/>
-            <a:p>
-              <a:r>
-                <a:rPr lang="en-CA" dirty="0"/>
-                <a:t>Solace message broker</a:t>
-              </a:r>
-            </a:p>
-            <a:p>
-              <a:r>
-                <a:rPr lang="en-CA" dirty="0"/>
-                <a:t>w/ Rest Delivery Endpoint</a:t>
-              </a:r>
-            </a:p>
-          </p:txBody>
-        </p:sp>
       </p:grpSp>
     </p:spTree>
     <p:extLst>

</xml_diff>

<commit_message>
test ec2 name and post heinz review
</commit_message>
<xml_diff>
--- a/images/source_images.pptx
+++ b/images/source_images.pptx
@@ -7,6 +7,7 @@
   <p:sldIdLst>
     <p:sldId id="256" r:id="rId2"/>
     <p:sldId id="257" r:id="rId3"/>
+    <p:sldId id="258" r:id="rId4"/>
   </p:sldIdLst>
   <p:sldSz cx="12192000" cy="6858000"/>
   <p:notesSz cx="6858000" cy="9144000"/>
@@ -116,7 +117,7 @@
 <file path=ppt/revisionInfo.xml><?xml version="1.0" encoding="utf-8"?>
 <p1510:revInfo xmlns:a="http://schemas.openxmlformats.org/drawingml/2006/main" xmlns:r="http://schemas.openxmlformats.org/officeDocument/2006/relationships" xmlns:p1510="http://schemas.microsoft.com/office/powerpoint/2015/10/main">
   <p1510:revLst>
-    <p1510:client id="{23B26FFF-7AF8-4582-BF06-9F7AC6C64342}" v="410" dt="2018-10-02T18:10:24.004"/>
+    <p1510:client id="{23B26FFF-7AF8-4582-BF06-9F7AC6C64342}" v="480" dt="2018-10-03T15:28:10.456"/>
   </p1510:revLst>
 </p1510:revInfo>
 </file>
@@ -126,12 +127,12 @@
   <pc:docChgLst>
     <pc:chgData name="Ken Barr" userId="08394fa4-6c67-4e80-95e1-dad59dfd7fac" providerId="ADAL" clId="{23B26FFF-7AF8-4582-BF06-9F7AC6C64342}"/>
     <pc:docChg chg="undo custSel mod addSld modSld">
-      <pc:chgData name="Ken Barr" userId="08394fa4-6c67-4e80-95e1-dad59dfd7fac" providerId="ADAL" clId="{23B26FFF-7AF8-4582-BF06-9F7AC6C64342}" dt="2018-10-02T18:10:24.003" v="409" actId="164"/>
+      <pc:chgData name="Ken Barr" userId="08394fa4-6c67-4e80-95e1-dad59dfd7fac" providerId="ADAL" clId="{23B26FFF-7AF8-4582-BF06-9F7AC6C64342}" dt="2018-10-12T18:22:36.130" v="494" actId="255"/>
       <pc:docMkLst>
         <pc:docMk/>
       </pc:docMkLst>
       <pc:sldChg chg="addSp modSp">
-        <pc:chgData name="Ken Barr" userId="08394fa4-6c67-4e80-95e1-dad59dfd7fac" providerId="ADAL" clId="{23B26FFF-7AF8-4582-BF06-9F7AC6C64342}" dt="2018-10-02T13:34:15.497" v="2" actId="692"/>
+        <pc:chgData name="Ken Barr" userId="08394fa4-6c67-4e80-95e1-dad59dfd7fac" providerId="ADAL" clId="{23B26FFF-7AF8-4582-BF06-9F7AC6C64342}" dt="2018-10-12T18:21:01.748" v="488" actId="208"/>
         <pc:sldMkLst>
           <pc:docMk/>
           <pc:sldMk cId="1034791607" sldId="256"/>
@@ -185,7 +186,7 @@
           </ac:grpSpMkLst>
         </pc:grpChg>
         <pc:picChg chg="mod">
-          <ac:chgData name="Ken Barr" userId="08394fa4-6c67-4e80-95e1-dad59dfd7fac" providerId="ADAL" clId="{23B26FFF-7AF8-4582-BF06-9F7AC6C64342}" dt="2018-10-02T13:33:17.404" v="0" actId="164"/>
+          <ac:chgData name="Ken Barr" userId="08394fa4-6c67-4e80-95e1-dad59dfd7fac" providerId="ADAL" clId="{23B26FFF-7AF8-4582-BF06-9F7AC6C64342}" dt="2018-10-12T18:18:52.220" v="480" actId="14100"/>
           <ac:picMkLst>
             <pc:docMk/>
             <pc:sldMk cId="1034791607" sldId="256"/>
@@ -281,7 +282,7 @@
           </ac:picMkLst>
         </pc:picChg>
         <pc:cxnChg chg="mod">
-          <ac:chgData name="Ken Barr" userId="08394fa4-6c67-4e80-95e1-dad59dfd7fac" providerId="ADAL" clId="{23B26FFF-7AF8-4582-BF06-9F7AC6C64342}" dt="2018-10-02T13:33:17.404" v="0" actId="164"/>
+          <ac:chgData name="Ken Barr" userId="08394fa4-6c67-4e80-95e1-dad59dfd7fac" providerId="ADAL" clId="{23B26FFF-7AF8-4582-BF06-9F7AC6C64342}" dt="2018-10-12T18:21:01.748" v="488" actId="208"/>
           <ac:cxnSpMkLst>
             <pc:docMk/>
             <pc:sldMk cId="1034791607" sldId="256"/>
@@ -329,7 +330,7 @@
           </ac:cxnSpMkLst>
         </pc:cxnChg>
         <pc:cxnChg chg="mod">
-          <ac:chgData name="Ken Barr" userId="08394fa4-6c67-4e80-95e1-dad59dfd7fac" providerId="ADAL" clId="{23B26FFF-7AF8-4582-BF06-9F7AC6C64342}" dt="2018-10-02T13:33:17.404" v="0" actId="164"/>
+          <ac:chgData name="Ken Barr" userId="08394fa4-6c67-4e80-95e1-dad59dfd7fac" providerId="ADAL" clId="{23B26FFF-7AF8-4582-BF06-9F7AC6C64342}" dt="2018-10-12T18:19:11.825" v="485" actId="14100"/>
           <ac:cxnSpMkLst>
             <pc:docMk/>
             <pc:sldMk cId="1034791607" sldId="256"/>
@@ -337,7 +338,7 @@
           </ac:cxnSpMkLst>
         </pc:cxnChg>
         <pc:cxnChg chg="mod">
-          <ac:chgData name="Ken Barr" userId="08394fa4-6c67-4e80-95e1-dad59dfd7fac" providerId="ADAL" clId="{23B26FFF-7AF8-4582-BF06-9F7AC6C64342}" dt="2018-10-02T13:33:17.404" v="0" actId="164"/>
+          <ac:chgData name="Ken Barr" userId="08394fa4-6c67-4e80-95e1-dad59dfd7fac" providerId="ADAL" clId="{23B26FFF-7AF8-4582-BF06-9F7AC6C64342}" dt="2018-10-12T18:19:07.409" v="484" actId="14100"/>
           <ac:cxnSpMkLst>
             <pc:docMk/>
             <pc:sldMk cId="1034791607" sldId="256"/>
@@ -345,7 +346,7 @@
           </ac:cxnSpMkLst>
         </pc:cxnChg>
         <pc:cxnChg chg="mod">
-          <ac:chgData name="Ken Barr" userId="08394fa4-6c67-4e80-95e1-dad59dfd7fac" providerId="ADAL" clId="{23B26FFF-7AF8-4582-BF06-9F7AC6C64342}" dt="2018-10-02T13:33:17.404" v="0" actId="164"/>
+          <ac:chgData name="Ken Barr" userId="08394fa4-6c67-4e80-95e1-dad59dfd7fac" providerId="ADAL" clId="{23B26FFF-7AF8-4582-BF06-9F7AC6C64342}" dt="2018-10-12T18:19:04.792" v="483" actId="14100"/>
           <ac:cxnSpMkLst>
             <pc:docMk/>
             <pc:sldMk cId="1034791607" sldId="256"/>
@@ -353,7 +354,7 @@
           </ac:cxnSpMkLst>
         </pc:cxnChg>
         <pc:cxnChg chg="mod">
-          <ac:chgData name="Ken Barr" userId="08394fa4-6c67-4e80-95e1-dad59dfd7fac" providerId="ADAL" clId="{23B26FFF-7AF8-4582-BF06-9F7AC6C64342}" dt="2018-10-02T13:33:17.404" v="0" actId="164"/>
+          <ac:chgData name="Ken Barr" userId="08394fa4-6c67-4e80-95e1-dad59dfd7fac" providerId="ADAL" clId="{23B26FFF-7AF8-4582-BF06-9F7AC6C64342}" dt="2018-10-12T18:19:01.177" v="482" actId="14100"/>
           <ac:cxnSpMkLst>
             <pc:docMk/>
             <pc:sldMk cId="1034791607" sldId="256"/>
@@ -361,7 +362,7 @@
           </ac:cxnSpMkLst>
         </pc:cxnChg>
         <pc:cxnChg chg="mod">
-          <ac:chgData name="Ken Barr" userId="08394fa4-6c67-4e80-95e1-dad59dfd7fac" providerId="ADAL" clId="{23B26FFF-7AF8-4582-BF06-9F7AC6C64342}" dt="2018-10-02T13:34:15.497" v="2" actId="692"/>
+          <ac:chgData name="Ken Barr" userId="08394fa4-6c67-4e80-95e1-dad59dfd7fac" providerId="ADAL" clId="{23B26FFF-7AF8-4582-BF06-9F7AC6C64342}" dt="2018-10-12T18:18:58.258" v="481" actId="14100"/>
           <ac:cxnSpMkLst>
             <pc:docMk/>
             <pc:sldMk cId="1034791607" sldId="256"/>
@@ -370,7 +371,7 @@
         </pc:cxnChg>
       </pc:sldChg>
       <pc:sldChg chg="addSp delSp modSp add mod setBg">
-        <pc:chgData name="Ken Barr" userId="08394fa4-6c67-4e80-95e1-dad59dfd7fac" providerId="ADAL" clId="{23B26FFF-7AF8-4582-BF06-9F7AC6C64342}" dt="2018-10-02T18:10:24.003" v="409" actId="164"/>
+        <pc:chgData name="Ken Barr" userId="08394fa4-6c67-4e80-95e1-dad59dfd7fac" providerId="ADAL" clId="{23B26FFF-7AF8-4582-BF06-9F7AC6C64342}" dt="2018-10-12T18:22:36.130" v="494" actId="255"/>
         <pc:sldMkLst>
           <pc:docMk/>
           <pc:sldMk cId="262467478" sldId="257"/>
@@ -416,7 +417,7 @@
           </ac:spMkLst>
         </pc:spChg>
         <pc:spChg chg="add mod">
-          <ac:chgData name="Ken Barr" userId="08394fa4-6c67-4e80-95e1-dad59dfd7fac" providerId="ADAL" clId="{23B26FFF-7AF8-4582-BF06-9F7AC6C64342}" dt="2018-10-02T15:22:05.462" v="400" actId="164"/>
+          <ac:chgData name="Ken Barr" userId="08394fa4-6c67-4e80-95e1-dad59dfd7fac" providerId="ADAL" clId="{23B26FFF-7AF8-4582-BF06-9F7AC6C64342}" dt="2018-10-12T18:22:25.121" v="492" actId="255"/>
           <ac:spMkLst>
             <pc:docMk/>
             <pc:sldMk cId="262467478" sldId="257"/>
@@ -424,7 +425,7 @@
           </ac:spMkLst>
         </pc:spChg>
         <pc:spChg chg="add mod">
-          <ac:chgData name="Ken Barr" userId="08394fa4-6c67-4e80-95e1-dad59dfd7fac" providerId="ADAL" clId="{23B26FFF-7AF8-4582-BF06-9F7AC6C64342}" dt="2018-10-02T18:09:48.587" v="407" actId="1076"/>
+          <ac:chgData name="Ken Barr" userId="08394fa4-6c67-4e80-95e1-dad59dfd7fac" providerId="ADAL" clId="{23B26FFF-7AF8-4582-BF06-9F7AC6C64342}" dt="2018-10-12T18:22:36.130" v="494" actId="255"/>
           <ac:spMkLst>
             <pc:docMk/>
             <pc:sldMk cId="262467478" sldId="257"/>
@@ -432,7 +433,7 @@
           </ac:spMkLst>
         </pc:spChg>
         <pc:spChg chg="add mod">
-          <ac:chgData name="Ken Barr" userId="08394fa4-6c67-4e80-95e1-dad59dfd7fac" providerId="ADAL" clId="{23B26FFF-7AF8-4582-BF06-9F7AC6C64342}" dt="2018-10-02T15:22:05.462" v="400" actId="164"/>
+          <ac:chgData name="Ken Barr" userId="08394fa4-6c67-4e80-95e1-dad59dfd7fac" providerId="ADAL" clId="{23B26FFF-7AF8-4582-BF06-9F7AC6C64342}" dt="2018-10-12T18:22:19.490" v="491" actId="255"/>
           <ac:spMkLst>
             <pc:docMk/>
             <pc:sldMk cId="262467478" sldId="257"/>
@@ -440,7 +441,7 @@
           </ac:spMkLst>
         </pc:spChg>
         <pc:spChg chg="add mod">
-          <ac:chgData name="Ken Barr" userId="08394fa4-6c67-4e80-95e1-dad59dfd7fac" providerId="ADAL" clId="{23B26FFF-7AF8-4582-BF06-9F7AC6C64342}" dt="2018-10-02T15:22:05.462" v="400" actId="164"/>
+          <ac:chgData name="Ken Barr" userId="08394fa4-6c67-4e80-95e1-dad59dfd7fac" providerId="ADAL" clId="{23B26FFF-7AF8-4582-BF06-9F7AC6C64342}" dt="2018-10-12T18:22:13.864" v="490" actId="1076"/>
           <ac:spMkLst>
             <pc:docMk/>
             <pc:sldMk cId="262467478" sldId="257"/>
@@ -448,7 +449,7 @@
           </ac:spMkLst>
         </pc:spChg>
         <pc:spChg chg="add mod">
-          <ac:chgData name="Ken Barr" userId="08394fa4-6c67-4e80-95e1-dad59dfd7fac" providerId="ADAL" clId="{23B26FFF-7AF8-4582-BF06-9F7AC6C64342}" dt="2018-10-02T15:22:05.462" v="400" actId="164"/>
+          <ac:chgData name="Ken Barr" userId="08394fa4-6c67-4e80-95e1-dad59dfd7fac" providerId="ADAL" clId="{23B26FFF-7AF8-4582-BF06-9F7AC6C64342}" dt="2018-10-12T18:22:30.686" v="493" actId="255"/>
           <ac:spMkLst>
             <pc:docMk/>
             <pc:sldMk cId="262467478" sldId="257"/>
@@ -576,6 +577,117 @@
           </ac:cxnSpMkLst>
         </pc:cxnChg>
       </pc:sldChg>
+      <pc:sldChg chg="delSp modSp add">
+        <pc:chgData name="Ken Barr" userId="08394fa4-6c67-4e80-95e1-dad59dfd7fac" providerId="ADAL" clId="{23B26FFF-7AF8-4582-BF06-9F7AC6C64342}" dt="2018-10-03T15:28:10.456" v="479" actId="1076"/>
+        <pc:sldMkLst>
+          <pc:docMk/>
+          <pc:sldMk cId="2595064566" sldId="258"/>
+        </pc:sldMkLst>
+        <pc:spChg chg="del mod">
+          <ac:chgData name="Ken Barr" userId="08394fa4-6c67-4e80-95e1-dad59dfd7fac" providerId="ADAL" clId="{23B26FFF-7AF8-4582-BF06-9F7AC6C64342}" dt="2018-10-03T15:23:43.024" v="413"/>
+          <ac:spMkLst>
+            <pc:docMk/>
+            <pc:sldMk cId="2595064566" sldId="258"/>
+            <ac:spMk id="23" creationId="{83B47EA5-1426-4162-B30B-BBBD7165BF36}"/>
+          </ac:spMkLst>
+        </pc:spChg>
+        <pc:spChg chg="del">
+          <ac:chgData name="Ken Barr" userId="08394fa4-6c67-4e80-95e1-dad59dfd7fac" providerId="ADAL" clId="{23B26FFF-7AF8-4582-BF06-9F7AC6C64342}" dt="2018-10-03T15:23:38.744" v="412"/>
+          <ac:spMkLst>
+            <pc:docMk/>
+            <pc:sldMk cId="2595064566" sldId="258"/>
+            <ac:spMk id="24" creationId="{0626774B-A58F-48CD-92B3-1A46BF3879C8}"/>
+          </ac:spMkLst>
+        </pc:spChg>
+        <pc:spChg chg="del">
+          <ac:chgData name="Ken Barr" userId="08394fa4-6c67-4e80-95e1-dad59dfd7fac" providerId="ADAL" clId="{23B26FFF-7AF8-4582-BF06-9F7AC6C64342}" dt="2018-10-03T15:23:36.912" v="411"/>
+          <ac:spMkLst>
+            <pc:docMk/>
+            <pc:sldMk cId="2595064566" sldId="258"/>
+            <ac:spMk id="25" creationId="{A325EC13-D7FB-461A-9F3A-6712A769407D}"/>
+          </ac:spMkLst>
+        </pc:spChg>
+        <pc:spChg chg="mod">
+          <ac:chgData name="Ken Barr" userId="08394fa4-6c67-4e80-95e1-dad59dfd7fac" providerId="ADAL" clId="{23B26FFF-7AF8-4582-BF06-9F7AC6C64342}" dt="2018-10-03T15:27:57.274" v="475" actId="255"/>
+          <ac:spMkLst>
+            <pc:docMk/>
+            <pc:sldMk cId="2595064566" sldId="258"/>
+            <ac:spMk id="27" creationId="{CA383DF6-4841-48BE-A57A-B0076B5CE94B}"/>
+          </ac:spMkLst>
+        </pc:spChg>
+        <pc:spChg chg="mod">
+          <ac:chgData name="Ken Barr" userId="08394fa4-6c67-4e80-95e1-dad59dfd7fac" providerId="ADAL" clId="{23B26FFF-7AF8-4582-BF06-9F7AC6C64342}" dt="2018-10-03T15:27:57.274" v="475" actId="255"/>
+          <ac:spMkLst>
+            <pc:docMk/>
+            <pc:sldMk cId="2595064566" sldId="258"/>
+            <ac:spMk id="28" creationId="{0507B6BA-2D43-4727-A29E-A10ADD3360E3}"/>
+          </ac:spMkLst>
+        </pc:spChg>
+        <pc:spChg chg="mod">
+          <ac:chgData name="Ken Barr" userId="08394fa4-6c67-4e80-95e1-dad59dfd7fac" providerId="ADAL" clId="{23B26FFF-7AF8-4582-BF06-9F7AC6C64342}" dt="2018-10-03T15:28:10.456" v="479" actId="1076"/>
+          <ac:spMkLst>
+            <pc:docMk/>
+            <pc:sldMk cId="2595064566" sldId="258"/>
+            <ac:spMk id="29" creationId="{28212C3F-ABD1-4B87-95BE-6C7F0F29D62A}"/>
+          </ac:spMkLst>
+        </pc:spChg>
+        <pc:spChg chg="mod">
+          <ac:chgData name="Ken Barr" userId="08394fa4-6c67-4e80-95e1-dad59dfd7fac" providerId="ADAL" clId="{23B26FFF-7AF8-4582-BF06-9F7AC6C64342}" dt="2018-10-03T15:28:05.207" v="477" actId="1076"/>
+          <ac:spMkLst>
+            <pc:docMk/>
+            <pc:sldMk cId="2595064566" sldId="258"/>
+            <ac:spMk id="30" creationId="{C2E85324-8C6E-49E0-ABAD-E9909CC0E49C}"/>
+          </ac:spMkLst>
+        </pc:spChg>
+        <pc:spChg chg="mod">
+          <ac:chgData name="Ken Barr" userId="08394fa4-6c67-4e80-95e1-dad59dfd7fac" providerId="ADAL" clId="{23B26FFF-7AF8-4582-BF06-9F7AC6C64342}" dt="2018-10-03T15:27:57.274" v="475" actId="255"/>
+          <ac:spMkLst>
+            <pc:docMk/>
+            <pc:sldMk cId="2595064566" sldId="258"/>
+            <ac:spMk id="31" creationId="{9590DEE4-A6DE-4091-B4DB-E46311CC1AD5}"/>
+          </ac:spMkLst>
+        </pc:spChg>
+        <pc:grpChg chg="mod">
+          <ac:chgData name="Ken Barr" userId="08394fa4-6c67-4e80-95e1-dad59dfd7fac" providerId="ADAL" clId="{23B26FFF-7AF8-4582-BF06-9F7AC6C64342}" dt="2018-10-03T15:28:07.920" v="478" actId="14100"/>
+          <ac:grpSpMkLst>
+            <pc:docMk/>
+            <pc:sldMk cId="2595064566" sldId="258"/>
+            <ac:grpSpMk id="2" creationId="{0A5C4AAE-228E-4E67-9742-CD8515782C60}"/>
+          </ac:grpSpMkLst>
+        </pc:grpChg>
+        <pc:grpChg chg="del mod">
+          <ac:chgData name="Ken Barr" userId="08394fa4-6c67-4e80-95e1-dad59dfd7fac" providerId="ADAL" clId="{23B26FFF-7AF8-4582-BF06-9F7AC6C64342}" dt="2018-10-03T15:23:38.744" v="412"/>
+          <ac:grpSpMkLst>
+            <pc:docMk/>
+            <pc:sldMk cId="2595064566" sldId="258"/>
+            <ac:grpSpMk id="22" creationId="{72C5963D-A01F-47A7-BB57-7FC74D50A0EA}"/>
+          </ac:grpSpMkLst>
+        </pc:grpChg>
+        <pc:grpChg chg="mod">
+          <ac:chgData name="Ken Barr" userId="08394fa4-6c67-4e80-95e1-dad59dfd7fac" providerId="ADAL" clId="{23B26FFF-7AF8-4582-BF06-9F7AC6C64342}" dt="2018-10-03T15:23:48.716" v="415"/>
+          <ac:grpSpMkLst>
+            <pc:docMk/>
+            <pc:sldMk cId="2595064566" sldId="258"/>
+            <ac:grpSpMk id="32" creationId="{D3A78710-2126-4F19-A6C4-E6D3DB5D008D}"/>
+          </ac:grpSpMkLst>
+        </pc:grpChg>
+        <pc:picChg chg="del">
+          <ac:chgData name="Ken Barr" userId="08394fa4-6c67-4e80-95e1-dad59dfd7fac" providerId="ADAL" clId="{23B26FFF-7AF8-4582-BF06-9F7AC6C64342}" dt="2018-10-03T15:23:48.716" v="415"/>
+          <ac:picMkLst>
+            <pc:docMk/>
+            <pc:sldMk cId="2595064566" sldId="258"/>
+            <ac:picMk id="5" creationId="{C6B31AA8-A2A8-4259-9E8E-D784C70AA78E}"/>
+          </ac:picMkLst>
+        </pc:picChg>
+        <pc:picChg chg="del">
+          <ac:chgData name="Ken Barr" userId="08394fa4-6c67-4e80-95e1-dad59dfd7fac" providerId="ADAL" clId="{23B26FFF-7AF8-4582-BF06-9F7AC6C64342}" dt="2018-10-03T15:23:44.859" v="414"/>
+          <ac:picMkLst>
+            <pc:docMk/>
+            <pc:sldMk cId="2595064566" sldId="258"/>
+            <ac:picMk id="26" creationId="{4BD30CAE-FF1E-4E2C-A4A0-2BD353115034}"/>
+          </ac:picMkLst>
+        </pc:picChg>
+      </pc:sldChg>
     </pc:docChg>
   </pc:docChgLst>
 </pc:chgInfo>
@@ -730,7 +842,7 @@
           <a:p>
             <a:fld id="{D7078A92-8A65-4E12-AE5D-AB4AEDE49790}" type="datetimeFigureOut">
               <a:rPr lang="en-CA" smtClean="0"/>
-              <a:t>2018-10-02</a:t>
+              <a:t>2018-10-12</a:t>
             </a:fld>
             <a:endParaRPr lang="en-CA"/>
           </a:p>
@@ -930,7 +1042,7 @@
           <a:p>
             <a:fld id="{D7078A92-8A65-4E12-AE5D-AB4AEDE49790}" type="datetimeFigureOut">
               <a:rPr lang="en-CA" smtClean="0"/>
-              <a:t>2018-10-02</a:t>
+              <a:t>2018-10-12</a:t>
             </a:fld>
             <a:endParaRPr lang="en-CA"/>
           </a:p>
@@ -1140,7 +1252,7 @@
           <a:p>
             <a:fld id="{D7078A92-8A65-4E12-AE5D-AB4AEDE49790}" type="datetimeFigureOut">
               <a:rPr lang="en-CA" smtClean="0"/>
-              <a:t>2018-10-02</a:t>
+              <a:t>2018-10-12</a:t>
             </a:fld>
             <a:endParaRPr lang="en-CA"/>
           </a:p>
@@ -1340,7 +1452,7 @@
           <a:p>
             <a:fld id="{D7078A92-8A65-4E12-AE5D-AB4AEDE49790}" type="datetimeFigureOut">
               <a:rPr lang="en-CA" smtClean="0"/>
-              <a:t>2018-10-02</a:t>
+              <a:t>2018-10-12</a:t>
             </a:fld>
             <a:endParaRPr lang="en-CA"/>
           </a:p>
@@ -1616,7 +1728,7 @@
           <a:p>
             <a:fld id="{D7078A92-8A65-4E12-AE5D-AB4AEDE49790}" type="datetimeFigureOut">
               <a:rPr lang="en-CA" smtClean="0"/>
-              <a:t>2018-10-02</a:t>
+              <a:t>2018-10-12</a:t>
             </a:fld>
             <a:endParaRPr lang="en-CA"/>
           </a:p>
@@ -1884,7 +1996,7 @@
           <a:p>
             <a:fld id="{D7078A92-8A65-4E12-AE5D-AB4AEDE49790}" type="datetimeFigureOut">
               <a:rPr lang="en-CA" smtClean="0"/>
-              <a:t>2018-10-02</a:t>
+              <a:t>2018-10-12</a:t>
             </a:fld>
             <a:endParaRPr lang="en-CA"/>
           </a:p>
@@ -2299,7 +2411,7 @@
           <a:p>
             <a:fld id="{D7078A92-8A65-4E12-AE5D-AB4AEDE49790}" type="datetimeFigureOut">
               <a:rPr lang="en-CA" smtClean="0"/>
-              <a:t>2018-10-02</a:t>
+              <a:t>2018-10-12</a:t>
             </a:fld>
             <a:endParaRPr lang="en-CA"/>
           </a:p>
@@ -2441,7 +2553,7 @@
           <a:p>
             <a:fld id="{D7078A92-8A65-4E12-AE5D-AB4AEDE49790}" type="datetimeFigureOut">
               <a:rPr lang="en-CA" smtClean="0"/>
-              <a:t>2018-10-02</a:t>
+              <a:t>2018-10-12</a:t>
             </a:fld>
             <a:endParaRPr lang="en-CA"/>
           </a:p>
@@ -2554,7 +2666,7 @@
           <a:p>
             <a:fld id="{D7078A92-8A65-4E12-AE5D-AB4AEDE49790}" type="datetimeFigureOut">
               <a:rPr lang="en-CA" smtClean="0"/>
-              <a:t>2018-10-02</a:t>
+              <a:t>2018-10-12</a:t>
             </a:fld>
             <a:endParaRPr lang="en-CA"/>
           </a:p>
@@ -2867,7 +2979,7 @@
           <a:p>
             <a:fld id="{D7078A92-8A65-4E12-AE5D-AB4AEDE49790}" type="datetimeFigureOut">
               <a:rPr lang="en-CA" smtClean="0"/>
-              <a:t>2018-10-02</a:t>
+              <a:t>2018-10-12</a:t>
             </a:fld>
             <a:endParaRPr lang="en-CA"/>
           </a:p>
@@ -3156,7 +3268,7 @@
           <a:p>
             <a:fld id="{D7078A92-8A65-4E12-AE5D-AB4AEDE49790}" type="datetimeFigureOut">
               <a:rPr lang="en-CA" smtClean="0"/>
-              <a:t>2018-10-02</a:t>
+              <a:t>2018-10-12</a:t>
             </a:fld>
             <a:endParaRPr lang="en-CA"/>
           </a:p>
@@ -3399,7 +3511,7 @@
           <a:p>
             <a:fld id="{D7078A92-8A65-4E12-AE5D-AB4AEDE49790}" type="datetimeFigureOut">
               <a:rPr lang="en-CA" smtClean="0"/>
-              <a:t>2018-10-02</a:t>
+              <a:t>2018-10-12</a:t>
             </a:fld>
             <a:endParaRPr lang="en-CA"/>
           </a:p>
@@ -3865,7 +3977,7 @@
           <p:spPr>
             <a:xfrm>
               <a:off x="3437965" y="1840653"/>
-              <a:ext cx="1969271" cy="2314259"/>
+              <a:ext cx="2233168" cy="2314259"/>
             </a:xfrm>
             <a:prstGeom prst="rect">
               <a:avLst/>
@@ -4111,7 +4223,7 @@
             </a:prstGeom>
             <a:ln w="76200">
               <a:solidFill>
-                <a:schemeClr val="accent6"/>
+                <a:srgbClr val="1DD783"/>
               </a:solidFill>
               <a:headEnd type="triangle" w="med" len="med"/>
               <a:tailEnd type="triangle" w="med" len="med"/>
@@ -4373,8 +4485,8 @@
           </p:nvCxnSpPr>
           <p:spPr bwMode="auto">
             <a:xfrm flipV="1">
-              <a:off x="5267162" y="1026827"/>
-              <a:ext cx="2178032" cy="1345395"/>
+              <a:off x="5393031" y="1026828"/>
+              <a:ext cx="2052163" cy="1303463"/>
             </a:xfrm>
             <a:prstGeom prst="straightConnector1">
               <a:avLst/>
@@ -5113,8 +5225,8 @@
           </p:nvCxnSpPr>
           <p:spPr bwMode="auto">
             <a:xfrm flipV="1">
-              <a:off x="5376846" y="2107078"/>
-              <a:ext cx="2068347" cy="733009"/>
+              <a:off x="5609579" y="2107079"/>
+              <a:ext cx="1835614" cy="642966"/>
             </a:xfrm>
             <a:prstGeom prst="straightConnector1">
               <a:avLst/>
@@ -5159,8 +5271,8 @@
           </p:nvCxnSpPr>
           <p:spPr bwMode="auto">
             <a:xfrm flipV="1">
-              <a:off x="5351295" y="3101259"/>
-              <a:ext cx="2155452" cy="63218"/>
+              <a:off x="5671133" y="3101259"/>
+              <a:ext cx="1835614" cy="41931"/>
             </a:xfrm>
             <a:prstGeom prst="straightConnector1">
               <a:avLst/>
@@ -5205,8 +5317,8 @@
           </p:nvCxnSpPr>
           <p:spPr bwMode="auto">
             <a:xfrm>
-              <a:off x="5340786" y="3440139"/>
-              <a:ext cx="2272318" cy="694564"/>
+              <a:off x="5549774" y="3503357"/>
+              <a:ext cx="2063330" cy="631346"/>
             </a:xfrm>
             <a:prstGeom prst="straightConnector1">
               <a:avLst/>
@@ -5250,8 +5362,8 @@
           </p:nvCxnSpPr>
           <p:spPr bwMode="auto">
             <a:xfrm>
-              <a:off x="5219734" y="3642274"/>
-              <a:ext cx="2305658" cy="1326465"/>
+              <a:off x="5376846" y="3714810"/>
+              <a:ext cx="2148546" cy="1253929"/>
             </a:xfrm>
             <a:prstGeom prst="straightConnector1">
               <a:avLst/>
@@ -5325,10 +5437,10 @@
         </p:nvGrpSpPr>
         <p:grpSpPr>
           <a:xfrm>
-            <a:off x="1040096" y="1444545"/>
-            <a:ext cx="8310704" cy="3301546"/>
-            <a:chOff x="1040096" y="1444545"/>
-            <a:chExt cx="8310704" cy="3301546"/>
+            <a:off x="1040096" y="1598750"/>
+            <a:ext cx="7624619" cy="3024230"/>
+            <a:chOff x="1040096" y="1598750"/>
+            <a:chExt cx="7624619" cy="3024230"/>
           </a:xfrm>
         </p:grpSpPr>
         <p:grpSp>
@@ -5345,10 +5457,10 @@
           </p:nvGrpSpPr>
           <p:grpSpPr>
             <a:xfrm>
-              <a:off x="1040096" y="1444545"/>
-              <a:ext cx="8310704" cy="3301546"/>
-              <a:chOff x="1040096" y="1444545"/>
-              <a:chExt cx="8310704" cy="3301546"/>
+              <a:off x="1040096" y="1598750"/>
+              <a:ext cx="7624619" cy="3024230"/>
+              <a:chOff x="1040096" y="1598750"/>
+              <a:chExt cx="7624619" cy="3024230"/>
             </a:xfrm>
           </p:grpSpPr>
           <p:pic>
@@ -5944,7 +6056,7 @@
             <p:spPr>
               <a:xfrm>
                 <a:off x="1053228" y="3561416"/>
-                <a:ext cx="1727076" cy="923330"/>
+                <a:ext cx="1383584" cy="738664"/>
               </a:xfrm>
               <a:prstGeom prst="rect">
                 <a:avLst/>
@@ -5958,19 +6070,19 @@
               <a:lstStyle/>
               <a:p>
                 <a:r>
-                  <a:rPr lang="en-CA" dirty="0"/>
+                  <a:rPr lang="en-CA" sz="1400" dirty="0"/>
                   <a:t>Application </a:t>
                 </a:r>
               </a:p>
               <a:p>
                 <a:r>
-                  <a:rPr lang="en-CA" dirty="0"/>
+                  <a:rPr lang="en-CA" sz="1400" dirty="0"/>
                   <a:t>send/receive</a:t>
                 </a:r>
               </a:p>
               <a:p>
                 <a:r>
-                  <a:rPr lang="en-CA" dirty="0"/>
+                  <a:rPr lang="en-CA" sz="1400" dirty="0"/>
                   <a:t>JMS for example</a:t>
                 </a:r>
               </a:p>
@@ -5991,7 +6103,7 @@
             <p:spPr>
               <a:xfrm>
                 <a:off x="6573743" y="3769757"/>
-                <a:ext cx="2026389" cy="646331"/>
+                <a:ext cx="1617302" cy="523220"/>
               </a:xfrm>
               <a:prstGeom prst="rect">
                 <a:avLst/>
@@ -6005,13 +6117,13 @@
               <a:lstStyle/>
               <a:p>
                 <a:r>
-                  <a:rPr lang="en-CA" dirty="0"/>
+                  <a:rPr lang="en-CA" sz="1400" dirty="0"/>
                   <a:t>Data written to SQS</a:t>
                 </a:r>
               </a:p>
               <a:p>
                 <a:r>
-                  <a:rPr lang="en-CA" dirty="0"/>
+                  <a:rPr lang="en-CA" sz="1400" dirty="0"/>
                   <a:t>for example</a:t>
                 </a:r>
               </a:p>
@@ -6032,7 +6144,7 @@
             <p:spPr>
               <a:xfrm>
                 <a:off x="6082854" y="1627299"/>
-                <a:ext cx="3267946" cy="923330"/>
+                <a:ext cx="2581861" cy="738664"/>
               </a:xfrm>
               <a:prstGeom prst="rect">
                 <a:avLst/>
@@ -6046,19 +6158,19 @@
               <a:lstStyle/>
               <a:p>
                 <a:r>
-                  <a:rPr lang="en-CA" dirty="0"/>
+                  <a:rPr lang="en-CA" sz="1400" dirty="0"/>
                   <a:t>IAM Role generated </a:t>
                 </a:r>
               </a:p>
               <a:p>
                 <a:r>
-                  <a:rPr lang="en-CA" dirty="0"/>
+                  <a:rPr lang="en-CA" sz="1400" dirty="0"/>
                   <a:t>Allowing specific resource access</a:t>
                 </a:r>
               </a:p>
               <a:p>
                 <a:r>
-                  <a:rPr lang="en-CA" dirty="0"/>
+                  <a:rPr lang="en-CA" sz="1400" dirty="0"/>
                   <a:t>Can be across AWS account</a:t>
                 </a:r>
               </a:p>
@@ -6078,8 +6190,8 @@
             </p:nvSpPr>
             <p:spPr>
               <a:xfrm>
-                <a:off x="3823074" y="1444545"/>
-                <a:ext cx="2179892" cy="923330"/>
+                <a:off x="3919937" y="1598750"/>
+                <a:ext cx="1736694" cy="738664"/>
               </a:xfrm>
               <a:prstGeom prst="rect">
                 <a:avLst/>
@@ -6093,24 +6205,24 @@
               <a:lstStyle/>
               <a:p>
                 <a:r>
-                  <a:rPr lang="en-CA" dirty="0"/>
+                  <a:rPr lang="en-CA" sz="1400" dirty="0"/>
                   <a:t>Internal </a:t>
                 </a:r>
                 <a:r>
-                  <a:rPr lang="en-CA" dirty="0" err="1"/>
+                  <a:rPr lang="en-CA" sz="1400" dirty="0" err="1"/>
                   <a:t>APIGateway</a:t>
                 </a:r>
-                <a:endParaRPr lang="en-CA" dirty="0"/>
+                <a:endParaRPr lang="en-CA" sz="1400" dirty="0"/>
               </a:p>
               <a:p>
                 <a:r>
-                  <a:rPr lang="en-CA" dirty="0"/>
+                  <a:rPr lang="en-CA" sz="1400" dirty="0"/>
                   <a:t>w/ VPC endpoint in </a:t>
                 </a:r>
               </a:p>
               <a:p>
                 <a:r>
-                  <a:rPr lang="en-CA" dirty="0"/>
+                  <a:rPr lang="en-CA" sz="1400" dirty="0"/>
                   <a:t>closed security group</a:t>
                 </a:r>
               </a:p>
@@ -6131,7 +6243,7 @@
             <p:spPr>
               <a:xfrm>
                 <a:off x="2941000" y="4099760"/>
-                <a:ext cx="2614627" cy="646331"/>
+                <a:ext cx="2076594" cy="523220"/>
               </a:xfrm>
               <a:prstGeom prst="rect">
                 <a:avLst/>
@@ -6145,13 +6257,13 @@
               <a:lstStyle/>
               <a:p>
                 <a:r>
-                  <a:rPr lang="en-CA" dirty="0"/>
+                  <a:rPr lang="en-CA" sz="1400" dirty="0"/>
                   <a:t>Solace message broker</a:t>
                 </a:r>
               </a:p>
               <a:p>
                 <a:r>
-                  <a:rPr lang="en-CA" dirty="0"/>
+                  <a:rPr lang="en-CA" sz="1400" dirty="0"/>
                   <a:t>w/ Rest Delivery Endpoint</a:t>
                 </a:r>
               </a:p>
@@ -6199,6 +6311,621 @@
     <p:extLst>
       <p:ext uri="{BB962C8B-B14F-4D97-AF65-F5344CB8AC3E}">
         <p14:creationId xmlns:p14="http://schemas.microsoft.com/office/powerpoint/2010/main" val="262467478"/>
+      </p:ext>
+    </p:extLst>
+  </p:cSld>
+  <p:clrMapOvr>
+    <a:masterClrMapping/>
+  </p:clrMapOvr>
+</p:sld>
+</file>
+
+<file path=ppt/slides/slide3.xml><?xml version="1.0" encoding="utf-8"?>
+<p:sld xmlns:a="http://schemas.openxmlformats.org/drawingml/2006/main" xmlns:r="http://schemas.openxmlformats.org/officeDocument/2006/relationships" xmlns:p="http://schemas.openxmlformats.org/presentationml/2006/main">
+  <p:cSld>
+    <p:spTree>
+      <p:nvGrpSpPr>
+        <p:cNvPr id="1" name=""/>
+        <p:cNvGrpSpPr/>
+        <p:nvPr/>
+      </p:nvGrpSpPr>
+      <p:grpSpPr>
+        <a:xfrm>
+          <a:off x="0" y="0"/>
+          <a:ext cx="0" cy="0"/>
+          <a:chOff x="0" y="0"/>
+          <a:chExt cx="0" cy="0"/>
+        </a:xfrm>
+      </p:grpSpPr>
+      <p:grpSp>
+        <p:nvGrpSpPr>
+          <p:cNvPr id="2" name="Group 1">
+            <a:extLst>
+              <a:ext uri="{FF2B5EF4-FFF2-40B4-BE49-F238E27FC236}">
+                <a16:creationId xmlns:a16="http://schemas.microsoft.com/office/drawing/2014/main" id="{0A5C4AAE-228E-4E67-9742-CD8515782C60}"/>
+              </a:ext>
+            </a:extLst>
+          </p:cNvPr>
+          <p:cNvGrpSpPr/>
+          <p:nvPr/>
+        </p:nvGrpSpPr>
+        <p:grpSpPr>
+          <a:xfrm>
+            <a:off x="1040097" y="1699358"/>
+            <a:ext cx="5101429" cy="2092464"/>
+            <a:chOff x="1040096" y="1724981"/>
+            <a:chExt cx="6945637" cy="2836444"/>
+          </a:xfrm>
+        </p:grpSpPr>
+        <p:grpSp>
+          <p:nvGrpSpPr>
+            <p:cNvPr id="32" name="Group 31">
+              <a:extLst>
+                <a:ext uri="{FF2B5EF4-FFF2-40B4-BE49-F238E27FC236}">
+                  <a16:creationId xmlns:a16="http://schemas.microsoft.com/office/drawing/2014/main" id="{D3A78710-2126-4F19-A6C4-E6D3DB5D008D}"/>
+                </a:ext>
+              </a:extLst>
+            </p:cNvPr>
+            <p:cNvGrpSpPr/>
+            <p:nvPr/>
+          </p:nvGrpSpPr>
+          <p:grpSpPr>
+            <a:xfrm>
+              <a:off x="1040096" y="1724981"/>
+              <a:ext cx="6945637" cy="2836444"/>
+              <a:chOff x="1040096" y="1724981"/>
+              <a:chExt cx="6945637" cy="2836444"/>
+            </a:xfrm>
+          </p:grpSpPr>
+          <p:pic>
+            <p:nvPicPr>
+              <p:cNvPr id="4" name="Picture 3">
+                <a:extLst>
+                  <a:ext uri="{FF2B5EF4-FFF2-40B4-BE49-F238E27FC236}">
+                    <a16:creationId xmlns:a16="http://schemas.microsoft.com/office/drawing/2014/main" id="{90AABAEB-8BAF-40C5-A1F0-D9E4CB368B7E}"/>
+                  </a:ext>
+                </a:extLst>
+              </p:cNvPr>
+              <p:cNvPicPr>
+                <a:picLocks noChangeAspect="1"/>
+              </p:cNvPicPr>
+              <p:nvPr/>
+            </p:nvPicPr>
+            <p:blipFill>
+              <a:blip r:embed="rId2" cstate="screen">
+                <a:extLst>
+                  <a:ext uri="{28A0092B-C50C-407E-A947-70E740481C1C}">
+                    <a14:useLocalDpi xmlns:a14="http://schemas.microsoft.com/office/drawing/2010/main"/>
+                  </a:ext>
+                </a:extLst>
+              </a:blip>
+              <a:stretch>
+                <a:fillRect/>
+              </a:stretch>
+            </p:blipFill>
+            <p:spPr>
+              <a:xfrm>
+                <a:off x="3177509" y="2770289"/>
+                <a:ext cx="1070805" cy="1055766"/>
+              </a:xfrm>
+              <a:prstGeom prst="rect">
+                <a:avLst/>
+              </a:prstGeom>
+              <a:effectLst/>
+            </p:spPr>
+          </p:pic>
+          <p:pic>
+            <p:nvPicPr>
+              <p:cNvPr id="9" name="Picture 8">
+                <a:extLst>
+                  <a:ext uri="{FF2B5EF4-FFF2-40B4-BE49-F238E27FC236}">
+                    <a16:creationId xmlns:a16="http://schemas.microsoft.com/office/drawing/2014/main" id="{A4F0757E-E158-49EF-BE66-AA660102A140}"/>
+                  </a:ext>
+                </a:extLst>
+              </p:cNvPr>
+              <p:cNvPicPr>
+                <a:picLocks noChangeAspect="1"/>
+              </p:cNvPicPr>
+              <p:nvPr/>
+            </p:nvPicPr>
+            <p:blipFill>
+              <a:blip r:embed="rId3">
+                <a:extLst>
+                  <a:ext uri="{28A0092B-C50C-407E-A947-70E740481C1C}">
+                    <a14:useLocalDpi xmlns:a14="http://schemas.microsoft.com/office/drawing/2010/main" val="0"/>
+                  </a:ext>
+                </a:extLst>
+              </a:blip>
+              <a:stretch>
+                <a:fillRect/>
+              </a:stretch>
+            </p:blipFill>
+            <p:spPr>
+              <a:xfrm>
+                <a:off x="5621046" y="2985175"/>
+                <a:ext cx="436327" cy="625640"/>
+              </a:xfrm>
+              <a:prstGeom prst="rect">
+                <a:avLst/>
+              </a:prstGeom>
+            </p:spPr>
+          </p:pic>
+          <p:pic>
+            <p:nvPicPr>
+              <p:cNvPr id="11" name="Picture 10">
+                <a:extLst>
+                  <a:ext uri="{FF2B5EF4-FFF2-40B4-BE49-F238E27FC236}">
+                    <a16:creationId xmlns:a16="http://schemas.microsoft.com/office/drawing/2014/main" id="{A177B99B-A73A-4F1C-80D1-432DA26D2F64}"/>
+                  </a:ext>
+                </a:extLst>
+              </p:cNvPr>
+              <p:cNvPicPr>
+                <a:picLocks noChangeAspect="1"/>
+              </p:cNvPicPr>
+              <p:nvPr/>
+            </p:nvPicPr>
+            <p:blipFill>
+              <a:blip r:embed="rId4">
+                <a:extLst>
+                  <a:ext uri="{28A0092B-C50C-407E-A947-70E740481C1C}">
+                    <a14:useLocalDpi xmlns:a14="http://schemas.microsoft.com/office/drawing/2010/main" val="0"/>
+                  </a:ext>
+                </a:extLst>
+              </a:blip>
+              <a:stretch>
+                <a:fillRect/>
+              </a:stretch>
+            </p:blipFill>
+            <p:spPr>
+              <a:xfrm>
+                <a:off x="6238042" y="2550629"/>
+                <a:ext cx="335701" cy="636066"/>
+              </a:xfrm>
+              <a:prstGeom prst="rect">
+                <a:avLst/>
+              </a:prstGeom>
+            </p:spPr>
+          </p:pic>
+          <p:pic>
+            <p:nvPicPr>
+              <p:cNvPr id="15" name="Picture 14">
+                <a:extLst>
+                  <a:ext uri="{FF2B5EF4-FFF2-40B4-BE49-F238E27FC236}">
+                    <a16:creationId xmlns:a16="http://schemas.microsoft.com/office/drawing/2014/main" id="{8D38356F-3844-4E67-AEBB-9E8176808617}"/>
+                  </a:ext>
+                </a:extLst>
+              </p:cNvPr>
+              <p:cNvPicPr>
+                <a:picLocks noChangeAspect="1"/>
+              </p:cNvPicPr>
+              <p:nvPr/>
+            </p:nvPicPr>
+            <p:blipFill>
+              <a:blip r:embed="rId5" cstate="print">
+                <a:extLst>
+                  <a:ext uri="{28A0092B-C50C-407E-A947-70E740481C1C}">
+                    <a14:useLocalDpi xmlns:a14="http://schemas.microsoft.com/office/drawing/2010/main"/>
+                  </a:ext>
+                </a:extLst>
+              </a:blip>
+              <a:stretch>
+                <a:fillRect/>
+              </a:stretch>
+            </p:blipFill>
+            <p:spPr>
+              <a:xfrm>
+                <a:off x="1040096" y="3055499"/>
+                <a:ext cx="1325716" cy="505917"/>
+              </a:xfrm>
+              <a:prstGeom prst="rect">
+                <a:avLst/>
+              </a:prstGeom>
+            </p:spPr>
+          </p:pic>
+          <p:cxnSp>
+            <p:nvCxnSpPr>
+              <p:cNvPr id="16" name="Straight Arrow Connector 15">
+                <a:extLst>
+                  <a:ext uri="{FF2B5EF4-FFF2-40B4-BE49-F238E27FC236}">
+                    <a16:creationId xmlns:a16="http://schemas.microsoft.com/office/drawing/2014/main" id="{E4CB1C41-42E1-426A-A880-7744438641A2}"/>
+                  </a:ext>
+                </a:extLst>
+              </p:cNvPr>
+              <p:cNvCxnSpPr>
+                <a:cxnSpLocks/>
+                <a:stCxn id="15" idx="3"/>
+                <a:endCxn id="4" idx="1"/>
+              </p:cNvCxnSpPr>
+              <p:nvPr/>
+            </p:nvCxnSpPr>
+            <p:spPr bwMode="auto">
+              <a:xfrm flipV="1">
+                <a:off x="2365812" y="3298172"/>
+                <a:ext cx="811697" cy="10286"/>
+              </a:xfrm>
+              <a:prstGeom prst="straightConnector1">
+                <a:avLst/>
+              </a:prstGeom>
+              <a:ln w="76200">
+                <a:solidFill>
+                  <a:srgbClr val="62AA37"/>
+                </a:solidFill>
+                <a:headEnd type="triangle" w="med" len="med"/>
+                <a:tailEnd type="triangle" w="med" len="med"/>
+              </a:ln>
+            </p:spPr>
+            <p:style>
+              <a:lnRef idx="1">
+                <a:schemeClr val="dk1"/>
+              </a:lnRef>
+              <a:fillRef idx="0">
+                <a:schemeClr val="dk1"/>
+              </a:fillRef>
+              <a:effectRef idx="0">
+                <a:schemeClr val="dk1"/>
+              </a:effectRef>
+              <a:fontRef idx="minor">
+                <a:schemeClr val="tx1"/>
+              </a:fontRef>
+            </p:style>
+          </p:cxnSp>
+          <p:cxnSp>
+            <p:nvCxnSpPr>
+              <p:cNvPr id="17" name="Straight Arrow Connector 16">
+                <a:extLst>
+                  <a:ext uri="{FF2B5EF4-FFF2-40B4-BE49-F238E27FC236}">
+                    <a16:creationId xmlns:a16="http://schemas.microsoft.com/office/drawing/2014/main" id="{94718BE7-C867-420D-9A20-4260A1E6D924}"/>
+                  </a:ext>
+                </a:extLst>
+              </p:cNvPr>
+              <p:cNvCxnSpPr>
+                <a:cxnSpLocks/>
+                <a:stCxn id="4" idx="3"/>
+                <a:endCxn id="9" idx="1"/>
+              </p:cNvCxnSpPr>
+              <p:nvPr/>
+            </p:nvCxnSpPr>
+            <p:spPr bwMode="auto">
+              <a:xfrm flipV="1">
+                <a:off x="4248314" y="3297995"/>
+                <a:ext cx="1372732" cy="177"/>
+              </a:xfrm>
+              <a:prstGeom prst="straightConnector1">
+                <a:avLst/>
+              </a:prstGeom>
+              <a:ln w="76200">
+                <a:solidFill>
+                  <a:srgbClr val="003469"/>
+                </a:solidFill>
+                <a:headEnd type="triangle" w="med" len="med"/>
+                <a:tailEnd type="triangle" w="med" len="med"/>
+              </a:ln>
+            </p:spPr>
+            <p:style>
+              <a:lnRef idx="1">
+                <a:schemeClr val="dk1"/>
+              </a:lnRef>
+              <a:fillRef idx="0">
+                <a:schemeClr val="dk1"/>
+              </a:fillRef>
+              <a:effectRef idx="0">
+                <a:schemeClr val="dk1"/>
+              </a:effectRef>
+              <a:fontRef idx="minor">
+                <a:schemeClr val="tx1"/>
+              </a:fontRef>
+            </p:style>
+          </p:cxnSp>
+          <p:cxnSp>
+            <p:nvCxnSpPr>
+              <p:cNvPr id="20" name="Straight Arrow Connector 19">
+                <a:extLst>
+                  <a:ext uri="{FF2B5EF4-FFF2-40B4-BE49-F238E27FC236}">
+                    <a16:creationId xmlns:a16="http://schemas.microsoft.com/office/drawing/2014/main" id="{F32D1835-F29F-4A0B-8E4E-3EDC4E30B11E}"/>
+                  </a:ext>
+                </a:extLst>
+              </p:cNvPr>
+              <p:cNvCxnSpPr>
+                <a:cxnSpLocks/>
+                <a:stCxn id="9" idx="3"/>
+              </p:cNvCxnSpPr>
+              <p:nvPr/>
+            </p:nvCxnSpPr>
+            <p:spPr bwMode="auto">
+              <a:xfrm>
+                <a:off x="6057373" y="3297995"/>
+                <a:ext cx="686366" cy="16993"/>
+              </a:xfrm>
+              <a:prstGeom prst="straightConnector1">
+                <a:avLst/>
+              </a:prstGeom>
+              <a:ln w="76200">
+                <a:solidFill>
+                  <a:srgbClr val="003469"/>
+                </a:solidFill>
+                <a:headEnd type="triangle" w="med" len="med"/>
+                <a:tailEnd type="triangle" w="med" len="med"/>
+              </a:ln>
+            </p:spPr>
+            <p:style>
+              <a:lnRef idx="1">
+                <a:schemeClr val="dk1"/>
+              </a:lnRef>
+              <a:fillRef idx="0">
+                <a:schemeClr val="dk1"/>
+              </a:fillRef>
+              <a:effectRef idx="0">
+                <a:schemeClr val="dk1"/>
+              </a:effectRef>
+              <a:fontRef idx="minor">
+                <a:schemeClr val="tx1"/>
+              </a:fontRef>
+            </p:style>
+          </p:cxnSp>
+          <p:sp>
+            <p:nvSpPr>
+              <p:cNvPr id="27" name="TextBox 26">
+                <a:extLst>
+                  <a:ext uri="{FF2B5EF4-FFF2-40B4-BE49-F238E27FC236}">
+                    <a16:creationId xmlns:a16="http://schemas.microsoft.com/office/drawing/2014/main" id="{CA383DF6-4841-48BE-A57A-B0076B5CE94B}"/>
+                  </a:ext>
+                </a:extLst>
+              </p:cNvPr>
+              <p:cNvSpPr txBox="1"/>
+              <p:nvPr/>
+            </p:nvSpPr>
+            <p:spPr>
+              <a:xfrm>
+                <a:off x="1053228" y="3561416"/>
+                <a:ext cx="1213537" cy="646331"/>
+              </a:xfrm>
+              <a:prstGeom prst="rect">
+                <a:avLst/>
+              </a:prstGeom>
+              <a:noFill/>
+            </p:spPr>
+            <p:txBody>
+              <a:bodyPr wrap="none" rtlCol="0">
+                <a:spAutoFit/>
+              </a:bodyPr>
+              <a:lstStyle/>
+              <a:p>
+                <a:r>
+                  <a:rPr lang="en-CA" sz="1200" dirty="0"/>
+                  <a:t>Application </a:t>
+                </a:r>
+              </a:p>
+              <a:p>
+                <a:r>
+                  <a:rPr lang="en-CA" sz="1200" dirty="0"/>
+                  <a:t>send/receive</a:t>
+                </a:r>
+              </a:p>
+              <a:p>
+                <a:r>
+                  <a:rPr lang="en-CA" sz="1200" dirty="0"/>
+                  <a:t>JMS for example</a:t>
+                </a:r>
+              </a:p>
+            </p:txBody>
+          </p:sp>
+          <p:sp>
+            <p:nvSpPr>
+              <p:cNvPr id="28" name="TextBox 27">
+                <a:extLst>
+                  <a:ext uri="{FF2B5EF4-FFF2-40B4-BE49-F238E27FC236}">
+                    <a16:creationId xmlns:a16="http://schemas.microsoft.com/office/drawing/2014/main" id="{0507B6BA-2D43-4727-A29E-A10ADD3360E3}"/>
+                  </a:ext>
+                </a:extLst>
+              </p:cNvPr>
+              <p:cNvSpPr txBox="1"/>
+              <p:nvPr/>
+            </p:nvSpPr>
+            <p:spPr>
+              <a:xfrm>
+                <a:off x="6573743" y="3769757"/>
+                <a:ext cx="1411990" cy="461665"/>
+              </a:xfrm>
+              <a:prstGeom prst="rect">
+                <a:avLst/>
+              </a:prstGeom>
+              <a:noFill/>
+            </p:spPr>
+            <p:txBody>
+              <a:bodyPr wrap="none" rtlCol="0">
+                <a:spAutoFit/>
+              </a:bodyPr>
+              <a:lstStyle/>
+              <a:p>
+                <a:r>
+                  <a:rPr lang="en-CA" sz="1200" dirty="0"/>
+                  <a:t>Data written to SQS</a:t>
+                </a:r>
+              </a:p>
+              <a:p>
+                <a:r>
+                  <a:rPr lang="en-CA" sz="1200" dirty="0"/>
+                  <a:t>for example</a:t>
+                </a:r>
+              </a:p>
+            </p:txBody>
+          </p:sp>
+          <p:sp>
+            <p:nvSpPr>
+              <p:cNvPr id="29" name="TextBox 28">
+                <a:extLst>
+                  <a:ext uri="{FF2B5EF4-FFF2-40B4-BE49-F238E27FC236}">
+                    <a16:creationId xmlns:a16="http://schemas.microsoft.com/office/drawing/2014/main" id="{28212C3F-ABD1-4B87-95BE-6C7F0F29D62A}"/>
+                  </a:ext>
+                </a:extLst>
+              </p:cNvPr>
+              <p:cNvSpPr txBox="1"/>
+              <p:nvPr/>
+            </p:nvSpPr>
+            <p:spPr>
+              <a:xfrm>
+                <a:off x="5575831" y="1724981"/>
+                <a:ext cx="2244461" cy="646331"/>
+              </a:xfrm>
+              <a:prstGeom prst="rect">
+                <a:avLst/>
+              </a:prstGeom>
+              <a:noFill/>
+            </p:spPr>
+            <p:txBody>
+              <a:bodyPr wrap="none" rtlCol="0">
+                <a:spAutoFit/>
+              </a:bodyPr>
+              <a:lstStyle/>
+              <a:p>
+                <a:r>
+                  <a:rPr lang="en-CA" sz="1200" dirty="0"/>
+                  <a:t>IAM Role generated </a:t>
+                </a:r>
+              </a:p>
+              <a:p>
+                <a:r>
+                  <a:rPr lang="en-CA" sz="1200" dirty="0"/>
+                  <a:t>Allowing specific resource access</a:t>
+                </a:r>
+              </a:p>
+              <a:p>
+                <a:r>
+                  <a:rPr lang="en-CA" sz="1200" dirty="0"/>
+                  <a:t>Can be across AWS account</a:t>
+                </a:r>
+              </a:p>
+            </p:txBody>
+          </p:sp>
+          <p:sp>
+            <p:nvSpPr>
+              <p:cNvPr id="30" name="TextBox 29">
+                <a:extLst>
+                  <a:ext uri="{FF2B5EF4-FFF2-40B4-BE49-F238E27FC236}">
+                    <a16:creationId xmlns:a16="http://schemas.microsoft.com/office/drawing/2014/main" id="{C2E85324-8C6E-49E0-ABAD-E9909CC0E49C}"/>
+                  </a:ext>
+                </a:extLst>
+              </p:cNvPr>
+              <p:cNvSpPr txBox="1"/>
+              <p:nvPr/>
+            </p:nvSpPr>
+            <p:spPr>
+              <a:xfrm>
+                <a:off x="2771660" y="2204703"/>
+                <a:ext cx="1685269" cy="461666"/>
+              </a:xfrm>
+              <a:prstGeom prst="rect">
+                <a:avLst/>
+              </a:prstGeom>
+              <a:noFill/>
+            </p:spPr>
+            <p:txBody>
+              <a:bodyPr wrap="none" rtlCol="0">
+                <a:spAutoFit/>
+              </a:bodyPr>
+              <a:lstStyle/>
+              <a:p>
+                <a:r>
+                  <a:rPr lang="en-CA" sz="1200" dirty="0"/>
+                  <a:t>External </a:t>
+                </a:r>
+                <a:r>
+                  <a:rPr lang="en-CA" sz="1200" dirty="0" err="1"/>
+                  <a:t>APIGateway</a:t>
+                </a:r>
+                <a:endParaRPr lang="en-CA" sz="1200" dirty="0"/>
+              </a:p>
+              <a:p>
+                <a:r>
+                  <a:rPr lang="en-CA" sz="1200" dirty="0"/>
+                  <a:t>Secured with App Token</a:t>
+                </a:r>
+              </a:p>
+            </p:txBody>
+          </p:sp>
+          <p:sp>
+            <p:nvSpPr>
+              <p:cNvPr id="31" name="TextBox 30">
+                <a:extLst>
+                  <a:ext uri="{FF2B5EF4-FFF2-40B4-BE49-F238E27FC236}">
+                    <a16:creationId xmlns:a16="http://schemas.microsoft.com/office/drawing/2014/main" id="{9590DEE4-A6DE-4091-B4DB-E46311CC1AD5}"/>
+                  </a:ext>
+                </a:extLst>
+              </p:cNvPr>
+              <p:cNvSpPr txBox="1"/>
+              <p:nvPr/>
+            </p:nvSpPr>
+            <p:spPr>
+              <a:xfrm>
+                <a:off x="2941000" y="4099760"/>
+                <a:ext cx="1800365" cy="461665"/>
+              </a:xfrm>
+              <a:prstGeom prst="rect">
+                <a:avLst/>
+              </a:prstGeom>
+              <a:noFill/>
+            </p:spPr>
+            <p:txBody>
+              <a:bodyPr wrap="none" rtlCol="0">
+                <a:spAutoFit/>
+              </a:bodyPr>
+              <a:lstStyle/>
+              <a:p>
+                <a:r>
+                  <a:rPr lang="en-CA" sz="1200" dirty="0"/>
+                  <a:t>Solace message broker</a:t>
+                </a:r>
+              </a:p>
+              <a:p>
+                <a:r>
+                  <a:rPr lang="en-CA" sz="1200" dirty="0"/>
+                  <a:t>w/ Rest Delivery Endpoint</a:t>
+                </a:r>
+              </a:p>
+            </p:txBody>
+          </p:sp>
+        </p:grpSp>
+        <p:pic>
+          <p:nvPicPr>
+            <p:cNvPr id="33" name="Picture 32">
+              <a:extLst>
+                <a:ext uri="{FF2B5EF4-FFF2-40B4-BE49-F238E27FC236}">
+                  <a16:creationId xmlns:a16="http://schemas.microsoft.com/office/drawing/2014/main" id="{2F834631-092B-4291-A6C1-F1D7E345474B}"/>
+                </a:ext>
+              </a:extLst>
+            </p:cNvPr>
+            <p:cNvPicPr>
+              <a:picLocks noChangeAspect="1"/>
+            </p:cNvPicPr>
+            <p:nvPr/>
+          </p:nvPicPr>
+          <p:blipFill>
+            <a:blip r:embed="rId6">
+              <a:extLst>
+                <a:ext uri="{28A0092B-C50C-407E-A947-70E740481C1C}">
+                  <a14:useLocalDpi xmlns:a14="http://schemas.microsoft.com/office/drawing/2010/main" val="0"/>
+                </a:ext>
+              </a:extLst>
+            </a:blip>
+            <a:stretch>
+              <a:fillRect/>
+            </a:stretch>
+          </p:blipFill>
+          <p:spPr>
+            <a:xfrm>
+              <a:off x="6752769" y="2975514"/>
+              <a:ext cx="693132" cy="745246"/>
+            </a:xfrm>
+            <a:prstGeom prst="rect">
+              <a:avLst/>
+            </a:prstGeom>
+          </p:spPr>
+        </p:pic>
+      </p:grpSp>
+    </p:spTree>
+    <p:extLst>
+      <p:ext uri="{BB962C8B-B14F-4D97-AF65-F5344CB8AC3E}">
+        <p14:creationId xmlns:p14="http://schemas.microsoft.com/office/powerpoint/2010/main" val="2595064566"/>
       </p:ext>
     </p:extLst>
   </p:cSld>

</xml_diff>

<commit_message>
Add a high level data flow to the esign section.
</commit_message>
<xml_diff>
--- a/images/source_images.pptx
+++ b/images/source_images.pptx
@@ -6,8 +6,9 @@
   </p:sldMasterIdLst>
   <p:sldIdLst>
     <p:sldId id="256" r:id="rId2"/>
-    <p:sldId id="257" r:id="rId3"/>
-    <p:sldId id="258" r:id="rId4"/>
+    <p:sldId id="259" r:id="rId3"/>
+    <p:sldId id="257" r:id="rId4"/>
+    <p:sldId id="258" r:id="rId5"/>
   </p:sldIdLst>
   <p:sldSz cx="12192000" cy="6858000"/>
   <p:notesSz cx="6858000" cy="9144000"/>
@@ -842,7 +843,7 @@
           <a:p>
             <a:fld id="{D7078A92-8A65-4E12-AE5D-AB4AEDE49790}" type="datetimeFigureOut">
               <a:rPr lang="en-CA" smtClean="0"/>
-              <a:t>2018-10-12</a:t>
+              <a:t>2018-11-27</a:t>
             </a:fld>
             <a:endParaRPr lang="en-CA"/>
           </a:p>
@@ -1042,7 +1043,7 @@
           <a:p>
             <a:fld id="{D7078A92-8A65-4E12-AE5D-AB4AEDE49790}" type="datetimeFigureOut">
               <a:rPr lang="en-CA" smtClean="0"/>
-              <a:t>2018-10-12</a:t>
+              <a:t>2018-11-27</a:t>
             </a:fld>
             <a:endParaRPr lang="en-CA"/>
           </a:p>
@@ -1252,7 +1253,7 @@
           <a:p>
             <a:fld id="{D7078A92-8A65-4E12-AE5D-AB4AEDE49790}" type="datetimeFigureOut">
               <a:rPr lang="en-CA" smtClean="0"/>
-              <a:t>2018-10-12</a:t>
+              <a:t>2018-11-27</a:t>
             </a:fld>
             <a:endParaRPr lang="en-CA"/>
           </a:p>
@@ -1452,7 +1453,7 @@
           <a:p>
             <a:fld id="{D7078A92-8A65-4E12-AE5D-AB4AEDE49790}" type="datetimeFigureOut">
               <a:rPr lang="en-CA" smtClean="0"/>
-              <a:t>2018-10-12</a:t>
+              <a:t>2018-11-27</a:t>
             </a:fld>
             <a:endParaRPr lang="en-CA"/>
           </a:p>
@@ -1728,7 +1729,7 @@
           <a:p>
             <a:fld id="{D7078A92-8A65-4E12-AE5D-AB4AEDE49790}" type="datetimeFigureOut">
               <a:rPr lang="en-CA" smtClean="0"/>
-              <a:t>2018-10-12</a:t>
+              <a:t>2018-11-27</a:t>
             </a:fld>
             <a:endParaRPr lang="en-CA"/>
           </a:p>
@@ -1996,7 +1997,7 @@
           <a:p>
             <a:fld id="{D7078A92-8A65-4E12-AE5D-AB4AEDE49790}" type="datetimeFigureOut">
               <a:rPr lang="en-CA" smtClean="0"/>
-              <a:t>2018-10-12</a:t>
+              <a:t>2018-11-27</a:t>
             </a:fld>
             <a:endParaRPr lang="en-CA"/>
           </a:p>
@@ -2411,7 +2412,7 @@
           <a:p>
             <a:fld id="{D7078A92-8A65-4E12-AE5D-AB4AEDE49790}" type="datetimeFigureOut">
               <a:rPr lang="en-CA" smtClean="0"/>
-              <a:t>2018-10-12</a:t>
+              <a:t>2018-11-27</a:t>
             </a:fld>
             <a:endParaRPr lang="en-CA"/>
           </a:p>
@@ -2553,7 +2554,7 @@
           <a:p>
             <a:fld id="{D7078A92-8A65-4E12-AE5D-AB4AEDE49790}" type="datetimeFigureOut">
               <a:rPr lang="en-CA" smtClean="0"/>
-              <a:t>2018-10-12</a:t>
+              <a:t>2018-11-27</a:t>
             </a:fld>
             <a:endParaRPr lang="en-CA"/>
           </a:p>
@@ -2666,7 +2667,7 @@
           <a:p>
             <a:fld id="{D7078A92-8A65-4E12-AE5D-AB4AEDE49790}" type="datetimeFigureOut">
               <a:rPr lang="en-CA" smtClean="0"/>
-              <a:t>2018-10-12</a:t>
+              <a:t>2018-11-27</a:t>
             </a:fld>
             <a:endParaRPr lang="en-CA"/>
           </a:p>
@@ -2979,7 +2980,7 @@
           <a:p>
             <a:fld id="{D7078A92-8A65-4E12-AE5D-AB4AEDE49790}" type="datetimeFigureOut">
               <a:rPr lang="en-CA" smtClean="0"/>
-              <a:t>2018-10-12</a:t>
+              <a:t>2018-11-27</a:t>
             </a:fld>
             <a:endParaRPr lang="en-CA"/>
           </a:p>
@@ -3268,7 +3269,7 @@
           <a:p>
             <a:fld id="{D7078A92-8A65-4E12-AE5D-AB4AEDE49790}" type="datetimeFigureOut">
               <a:rPr lang="en-CA" smtClean="0"/>
-              <a:t>2018-10-12</a:t>
+              <a:t>2018-11-27</a:t>
             </a:fld>
             <a:endParaRPr lang="en-CA"/>
           </a:p>
@@ -3511,7 +3512,7 @@
           <a:p>
             <a:fld id="{D7078A92-8A65-4E12-AE5D-AB4AEDE49790}" type="datetimeFigureOut">
               <a:rPr lang="en-CA" smtClean="0"/>
-              <a:t>2018-10-12</a:t>
+              <a:t>2018-11-27</a:t>
             </a:fld>
             <a:endParaRPr lang="en-CA"/>
           </a:p>
@@ -5425,6 +5426,1673 @@
       </p:grpSpPr>
       <p:grpSp>
         <p:nvGrpSpPr>
+          <p:cNvPr id="119" name="Group 118">
+            <a:extLst>
+              <a:ext uri="{FF2B5EF4-FFF2-40B4-BE49-F238E27FC236}">
+                <a16:creationId xmlns:a16="http://schemas.microsoft.com/office/drawing/2014/main" id="{28C3E27D-5385-47AB-BA8B-96B2517A9E93}"/>
+              </a:ext>
+            </a:extLst>
+          </p:cNvPr>
+          <p:cNvGrpSpPr/>
+          <p:nvPr/>
+        </p:nvGrpSpPr>
+        <p:grpSpPr>
+          <a:xfrm>
+            <a:off x="1576702" y="1339531"/>
+            <a:ext cx="7716301" cy="2741868"/>
+            <a:chOff x="1576702" y="1339531"/>
+            <a:chExt cx="7716301" cy="2741868"/>
+          </a:xfrm>
+        </p:grpSpPr>
+        <p:pic>
+          <p:nvPicPr>
+            <p:cNvPr id="6" name="Picture 5">
+              <a:extLst>
+                <a:ext uri="{FF2B5EF4-FFF2-40B4-BE49-F238E27FC236}">
+                  <a16:creationId xmlns:a16="http://schemas.microsoft.com/office/drawing/2014/main" id="{CBA0758D-EA4D-49FD-8F8D-F63E701D1071}"/>
+                </a:ext>
+              </a:extLst>
+            </p:cNvPr>
+            <p:cNvPicPr>
+              <a:picLocks noChangeAspect="1"/>
+            </p:cNvPicPr>
+            <p:nvPr/>
+          </p:nvPicPr>
+          <p:blipFill>
+            <a:blip r:embed="rId2" cstate="screen">
+              <a:extLst>
+                <a:ext uri="{28A0092B-C50C-407E-A947-70E740481C1C}">
+                  <a14:useLocalDpi xmlns:a14="http://schemas.microsoft.com/office/drawing/2010/main"/>
+                </a:ext>
+              </a:extLst>
+            </a:blip>
+            <a:stretch>
+              <a:fillRect/>
+            </a:stretch>
+          </p:blipFill>
+          <p:spPr>
+            <a:xfrm>
+              <a:off x="2028092" y="1902917"/>
+              <a:ext cx="757053" cy="444470"/>
+            </a:xfrm>
+            <a:prstGeom prst="rect">
+              <a:avLst/>
+            </a:prstGeom>
+          </p:spPr>
+        </p:pic>
+        <p:pic>
+          <p:nvPicPr>
+            <p:cNvPr id="11" name="Picture 10">
+              <a:extLst>
+                <a:ext uri="{FF2B5EF4-FFF2-40B4-BE49-F238E27FC236}">
+                  <a16:creationId xmlns:a16="http://schemas.microsoft.com/office/drawing/2014/main" id="{293FCF5E-740C-442E-9B2F-C8F0E3426230}"/>
+                </a:ext>
+              </a:extLst>
+            </p:cNvPr>
+            <p:cNvPicPr>
+              <a:picLocks noChangeAspect="1"/>
+            </p:cNvPicPr>
+            <p:nvPr/>
+          </p:nvPicPr>
+          <p:blipFill>
+            <a:blip r:embed="rId3" cstate="screen">
+              <a:extLst>
+                <a:ext uri="{28A0092B-C50C-407E-A947-70E740481C1C}">
+                  <a14:useLocalDpi xmlns:a14="http://schemas.microsoft.com/office/drawing/2010/main"/>
+                </a:ext>
+              </a:extLst>
+            </a:blip>
+            <a:stretch>
+              <a:fillRect/>
+            </a:stretch>
+          </p:blipFill>
+          <p:spPr>
+            <a:xfrm>
+              <a:off x="1801175" y="3572807"/>
+              <a:ext cx="842064" cy="274656"/>
+            </a:xfrm>
+            <a:prstGeom prst="rect">
+              <a:avLst/>
+            </a:prstGeom>
+          </p:spPr>
+        </p:pic>
+        <p:cxnSp>
+          <p:nvCxnSpPr>
+            <p:cNvPr id="12" name="Straight Arrow Connector 11">
+              <a:extLst>
+                <a:ext uri="{FF2B5EF4-FFF2-40B4-BE49-F238E27FC236}">
+                  <a16:creationId xmlns:a16="http://schemas.microsoft.com/office/drawing/2014/main" id="{B1D4A722-D398-42B3-A261-2596E8AA147A}"/>
+                </a:ext>
+              </a:extLst>
+            </p:cNvPr>
+            <p:cNvCxnSpPr>
+              <a:cxnSpLocks/>
+            </p:cNvCxnSpPr>
+            <p:nvPr/>
+          </p:nvCxnSpPr>
+          <p:spPr bwMode="auto">
+            <a:xfrm flipV="1">
+              <a:off x="2766712" y="3379749"/>
+              <a:ext cx="783075" cy="334434"/>
+            </a:xfrm>
+            <a:prstGeom prst="straightConnector1">
+              <a:avLst/>
+            </a:prstGeom>
+            <a:ln w="76200">
+              <a:solidFill>
+                <a:srgbClr val="1DD783"/>
+              </a:solidFill>
+              <a:headEnd type="triangle" w="med" len="med"/>
+              <a:tailEnd type="triangle" w="med" len="med"/>
+            </a:ln>
+          </p:spPr>
+          <p:style>
+            <a:lnRef idx="1">
+              <a:schemeClr val="dk1"/>
+            </a:lnRef>
+            <a:fillRef idx="0">
+              <a:schemeClr val="dk1"/>
+            </a:fillRef>
+            <a:effectRef idx="0">
+              <a:schemeClr val="dk1"/>
+            </a:effectRef>
+            <a:fontRef idx="minor">
+              <a:schemeClr val="tx1"/>
+            </a:fontRef>
+          </p:style>
+        </p:cxnSp>
+        <p:cxnSp>
+          <p:nvCxnSpPr>
+            <p:cNvPr id="14" name="Straight Arrow Connector 13">
+              <a:extLst>
+                <a:ext uri="{FF2B5EF4-FFF2-40B4-BE49-F238E27FC236}">
+                  <a16:creationId xmlns:a16="http://schemas.microsoft.com/office/drawing/2014/main" id="{56833AB2-E792-44A9-8D10-D060D9431A47}"/>
+                </a:ext>
+              </a:extLst>
+            </p:cNvPr>
+            <p:cNvCxnSpPr>
+              <a:cxnSpLocks/>
+            </p:cNvCxnSpPr>
+            <p:nvPr/>
+          </p:nvCxnSpPr>
+          <p:spPr bwMode="auto">
+            <a:xfrm>
+              <a:off x="2785145" y="2122415"/>
+              <a:ext cx="828337" cy="382506"/>
+            </a:xfrm>
+            <a:prstGeom prst="straightConnector1">
+              <a:avLst/>
+            </a:prstGeom>
+            <a:ln w="76200">
+              <a:solidFill>
+                <a:srgbClr val="98A7D4"/>
+              </a:solidFill>
+              <a:headEnd type="triangle" w="med" len="med"/>
+              <a:tailEnd type="triangle" w="med" len="med"/>
+            </a:ln>
+          </p:spPr>
+          <p:style>
+            <a:lnRef idx="1">
+              <a:schemeClr val="dk1"/>
+            </a:lnRef>
+            <a:fillRef idx="0">
+              <a:schemeClr val="dk1"/>
+            </a:fillRef>
+            <a:effectRef idx="0">
+              <a:schemeClr val="dk1"/>
+            </a:effectRef>
+            <a:fontRef idx="minor">
+              <a:schemeClr val="tx1"/>
+            </a:fontRef>
+          </p:style>
+        </p:cxnSp>
+        <p:sp>
+          <p:nvSpPr>
+            <p:cNvPr id="22" name="TextBox 21">
+              <a:extLst>
+                <a:ext uri="{FF2B5EF4-FFF2-40B4-BE49-F238E27FC236}">
+                  <a16:creationId xmlns:a16="http://schemas.microsoft.com/office/drawing/2014/main" id="{37C24B8A-B1B7-48DB-ACFF-383AD07B07C3}"/>
+                </a:ext>
+              </a:extLst>
+            </p:cNvPr>
+            <p:cNvSpPr txBox="1"/>
+            <p:nvPr/>
+          </p:nvSpPr>
+          <p:spPr>
+            <a:xfrm>
+              <a:off x="7396009" y="2836544"/>
+              <a:ext cx="1896994" cy="471924"/>
+            </a:xfrm>
+            <a:prstGeom prst="rect">
+              <a:avLst/>
+            </a:prstGeom>
+            <a:noFill/>
+            <a:ln w="12700" cap="flat">
+              <a:noFill/>
+              <a:miter lim="400000"/>
+            </a:ln>
+            <a:effectLst/>
+            <a:sp3d/>
+          </p:spPr>
+          <p:style>
+            <a:lnRef idx="0">
+              <a:scrgbClr r="0" g="0" b="0"/>
+            </a:lnRef>
+            <a:fillRef idx="0">
+              <a:scrgbClr r="0" g="0" b="0"/>
+            </a:fillRef>
+            <a:effectRef idx="0">
+              <a:scrgbClr r="0" g="0" b="0"/>
+            </a:effectRef>
+            <a:fontRef idx="none"/>
+          </p:style>
+          <p:txBody>
+            <a:bodyPr rot="0" spcFirstLastPara="1" vertOverflow="overflow" horzOverflow="overflow" vert="horz" wrap="none" lIns="50800" tIns="50800" rIns="50800" bIns="50800" numCol="1" spcCol="38100" rtlCol="0" anchor="ctr">
+              <a:spAutoFit/>
+            </a:bodyPr>
+            <a:lstStyle/>
+            <a:p>
+              <a:pPr marL="0" marR="0" indent="0" algn="ctr" defTabSz="819150" rtl="0" fontAlgn="auto" latinLnBrk="0" hangingPunct="0">
+                <a:lnSpc>
+                  <a:spcPct val="100000"/>
+                </a:lnSpc>
+                <a:spcBef>
+                  <a:spcPts val="0"/>
+                </a:spcBef>
+                <a:spcAft>
+                  <a:spcPts val="0"/>
+                </a:spcAft>
+                <a:buClrTx/>
+                <a:buSzTx/>
+                <a:buFontTx/>
+                <a:buNone/>
+                <a:tabLst/>
+              </a:pPr>
+              <a:r>
+                <a:rPr kumimoji="0" lang="en-CA" sz="2400" b="0" i="0" u="none" strike="noStrike" cap="none" spc="0" normalizeH="0" baseline="0" dirty="0">
+                  <a:ln>
+                    <a:noFill/>
+                  </a:ln>
+                  <a:solidFill>
+                    <a:srgbClr val="000000"/>
+                  </a:solidFill>
+                  <a:effectLst/>
+                  <a:uFillTx/>
+                  <a:latin typeface="Gill Sans"/>
+                  <a:ea typeface="Gill Sans"/>
+                  <a:cs typeface="Gill Sans"/>
+                  <a:sym typeface="Gill Sans"/>
+                </a:rPr>
+                <a:t>AWS Resource</a:t>
+              </a:r>
+            </a:p>
+          </p:txBody>
+        </p:sp>
+        <p:cxnSp>
+          <p:nvCxnSpPr>
+            <p:cNvPr id="30" name="Straight Arrow Connector 29">
+              <a:extLst>
+                <a:ext uri="{FF2B5EF4-FFF2-40B4-BE49-F238E27FC236}">
+                  <a16:creationId xmlns:a16="http://schemas.microsoft.com/office/drawing/2014/main" id="{299D8964-064B-4D09-B1AC-A8C006F83F8D}"/>
+                </a:ext>
+              </a:extLst>
+            </p:cNvPr>
+            <p:cNvCxnSpPr>
+              <a:cxnSpLocks/>
+            </p:cNvCxnSpPr>
+            <p:nvPr/>
+          </p:nvCxnSpPr>
+          <p:spPr bwMode="auto">
+            <a:xfrm flipV="1">
+              <a:off x="5756036" y="3041847"/>
+              <a:ext cx="616189" cy="7514"/>
+            </a:xfrm>
+            <a:prstGeom prst="straightConnector1">
+              <a:avLst/>
+            </a:prstGeom>
+            <a:ln w="76200">
+              <a:solidFill>
+                <a:srgbClr val="003469"/>
+              </a:solidFill>
+              <a:headEnd type="triangle" w="med" len="med"/>
+              <a:tailEnd type="triangle" w="med" len="med"/>
+            </a:ln>
+          </p:spPr>
+          <p:style>
+            <a:lnRef idx="1">
+              <a:schemeClr val="dk1"/>
+            </a:lnRef>
+            <a:fillRef idx="0">
+              <a:schemeClr val="dk1"/>
+            </a:fillRef>
+            <a:effectRef idx="0">
+              <a:schemeClr val="dk1"/>
+            </a:effectRef>
+            <a:fontRef idx="minor">
+              <a:schemeClr val="tx1"/>
+            </a:fontRef>
+          </p:style>
+        </p:cxnSp>
+        <p:cxnSp>
+          <p:nvCxnSpPr>
+            <p:cNvPr id="35" name="Straight Arrow Connector 34">
+              <a:extLst>
+                <a:ext uri="{FF2B5EF4-FFF2-40B4-BE49-F238E27FC236}">
+                  <a16:creationId xmlns:a16="http://schemas.microsoft.com/office/drawing/2014/main" id="{72817912-0E24-4300-A91A-7A09D1A223A8}"/>
+                </a:ext>
+              </a:extLst>
+            </p:cNvPr>
+            <p:cNvCxnSpPr>
+              <a:cxnSpLocks/>
+            </p:cNvCxnSpPr>
+            <p:nvPr/>
+          </p:nvCxnSpPr>
+          <p:spPr bwMode="auto">
+            <a:xfrm flipV="1">
+              <a:off x="2757653" y="3206444"/>
+              <a:ext cx="761828" cy="173305"/>
+            </a:xfrm>
+            <a:prstGeom prst="straightConnector1">
+              <a:avLst/>
+            </a:prstGeom>
+            <a:ln w="76200">
+              <a:solidFill>
+                <a:srgbClr val="62AA37"/>
+              </a:solidFill>
+              <a:headEnd type="triangle" w="med" len="med"/>
+              <a:tailEnd type="triangle" w="med" len="med"/>
+            </a:ln>
+          </p:spPr>
+          <p:style>
+            <a:lnRef idx="1">
+              <a:schemeClr val="dk1"/>
+            </a:lnRef>
+            <a:fillRef idx="0">
+              <a:schemeClr val="dk1"/>
+            </a:fillRef>
+            <a:effectRef idx="0">
+              <a:schemeClr val="dk1"/>
+            </a:effectRef>
+            <a:fontRef idx="minor">
+              <a:schemeClr val="tx1"/>
+            </a:fontRef>
+          </p:style>
+        </p:cxnSp>
+        <p:cxnSp>
+          <p:nvCxnSpPr>
+            <p:cNvPr id="36" name="Straight Arrow Connector 35">
+              <a:extLst>
+                <a:ext uri="{FF2B5EF4-FFF2-40B4-BE49-F238E27FC236}">
+                  <a16:creationId xmlns:a16="http://schemas.microsoft.com/office/drawing/2014/main" id="{BAFA008F-D023-4D3A-AC6A-1229160682ED}"/>
+                </a:ext>
+              </a:extLst>
+            </p:cNvPr>
+            <p:cNvCxnSpPr>
+              <a:cxnSpLocks/>
+            </p:cNvCxnSpPr>
+            <p:nvPr/>
+          </p:nvCxnSpPr>
+          <p:spPr bwMode="auto">
+            <a:xfrm>
+              <a:off x="2755216" y="2517084"/>
+              <a:ext cx="794394" cy="146673"/>
+            </a:xfrm>
+            <a:prstGeom prst="straightConnector1">
+              <a:avLst/>
+            </a:prstGeom>
+            <a:ln w="76200">
+              <a:solidFill>
+                <a:srgbClr val="9D4BA4"/>
+              </a:solidFill>
+              <a:headEnd type="triangle" w="med" len="med"/>
+              <a:tailEnd type="triangle" w="med" len="med"/>
+            </a:ln>
+          </p:spPr>
+          <p:style>
+            <a:lnRef idx="1">
+              <a:schemeClr val="dk1"/>
+            </a:lnRef>
+            <a:fillRef idx="0">
+              <a:schemeClr val="dk1"/>
+            </a:fillRef>
+            <a:effectRef idx="0">
+              <a:schemeClr val="dk1"/>
+            </a:effectRef>
+            <a:fontRef idx="minor">
+              <a:schemeClr val="tx1"/>
+            </a:fontRef>
+          </p:style>
+        </p:cxnSp>
+        <p:cxnSp>
+          <p:nvCxnSpPr>
+            <p:cNvPr id="37" name="Straight Arrow Connector 36">
+              <a:extLst>
+                <a:ext uri="{FF2B5EF4-FFF2-40B4-BE49-F238E27FC236}">
+                  <a16:creationId xmlns:a16="http://schemas.microsoft.com/office/drawing/2014/main" id="{C7FE17DC-6634-4CD4-BE7F-4AD5A5EDF046}"/>
+                </a:ext>
+              </a:extLst>
+            </p:cNvPr>
+            <p:cNvCxnSpPr>
+              <a:cxnSpLocks/>
+            </p:cNvCxnSpPr>
+            <p:nvPr/>
+          </p:nvCxnSpPr>
+          <p:spPr bwMode="auto">
+            <a:xfrm>
+              <a:off x="2720762" y="2804429"/>
+              <a:ext cx="798719" cy="64231"/>
+            </a:xfrm>
+            <a:prstGeom prst="straightConnector1">
+              <a:avLst/>
+            </a:prstGeom>
+            <a:ln w="76200">
+              <a:solidFill>
+                <a:srgbClr val="003469"/>
+              </a:solidFill>
+              <a:headEnd type="triangle" w="med" len="med"/>
+              <a:tailEnd type="triangle" w="med" len="med"/>
+            </a:ln>
+          </p:spPr>
+          <p:style>
+            <a:lnRef idx="1">
+              <a:schemeClr val="dk1"/>
+            </a:lnRef>
+            <a:fillRef idx="0">
+              <a:schemeClr val="dk1"/>
+            </a:fillRef>
+            <a:effectRef idx="0">
+              <a:schemeClr val="dk1"/>
+            </a:effectRef>
+            <a:fontRef idx="minor">
+              <a:schemeClr val="tx1"/>
+            </a:fontRef>
+          </p:style>
+        </p:cxnSp>
+        <p:cxnSp>
+          <p:nvCxnSpPr>
+            <p:cNvPr id="38" name="Straight Arrow Connector 37">
+              <a:extLst>
+                <a:ext uri="{FF2B5EF4-FFF2-40B4-BE49-F238E27FC236}">
+                  <a16:creationId xmlns:a16="http://schemas.microsoft.com/office/drawing/2014/main" id="{7CB4BD4F-48D7-4F2C-89EB-649F85C6CA17}"/>
+                </a:ext>
+              </a:extLst>
+            </p:cNvPr>
+            <p:cNvCxnSpPr>
+              <a:cxnSpLocks/>
+            </p:cNvCxnSpPr>
+            <p:nvPr/>
+          </p:nvCxnSpPr>
+          <p:spPr bwMode="auto">
+            <a:xfrm flipV="1">
+              <a:off x="2751049" y="3041847"/>
+              <a:ext cx="743950" cy="49620"/>
+            </a:xfrm>
+            <a:prstGeom prst="straightConnector1">
+              <a:avLst/>
+            </a:prstGeom>
+            <a:ln w="76200">
+              <a:solidFill>
+                <a:schemeClr val="tx1"/>
+              </a:solidFill>
+              <a:headEnd type="triangle" w="med" len="med"/>
+              <a:tailEnd type="triangle" w="med" len="med"/>
+            </a:ln>
+          </p:spPr>
+          <p:style>
+            <a:lnRef idx="1">
+              <a:schemeClr val="dk1"/>
+            </a:lnRef>
+            <a:fillRef idx="0">
+              <a:schemeClr val="dk1"/>
+            </a:fillRef>
+            <a:effectRef idx="0">
+              <a:schemeClr val="dk1"/>
+            </a:effectRef>
+            <a:fontRef idx="minor">
+              <a:schemeClr val="tx1"/>
+            </a:fontRef>
+          </p:style>
+        </p:cxnSp>
+        <p:pic>
+          <p:nvPicPr>
+            <p:cNvPr id="58" name="Picture 57">
+              <a:extLst>
+                <a:ext uri="{FF2B5EF4-FFF2-40B4-BE49-F238E27FC236}">
+                  <a16:creationId xmlns:a16="http://schemas.microsoft.com/office/drawing/2014/main" id="{D18B8F13-1FAC-48CF-BDA8-39E256A0D69F}"/>
+                </a:ext>
+              </a:extLst>
+            </p:cNvPr>
+            <p:cNvPicPr>
+              <a:picLocks noChangeAspect="1"/>
+            </p:cNvPicPr>
+            <p:nvPr/>
+          </p:nvPicPr>
+          <p:blipFill>
+            <a:blip r:embed="rId4" cstate="screen">
+              <a:extLst>
+                <a:ext uri="{28A0092B-C50C-407E-A947-70E740481C1C}">
+                  <a14:useLocalDpi xmlns:a14="http://schemas.microsoft.com/office/drawing/2010/main"/>
+                </a:ext>
+              </a:extLst>
+            </a:blip>
+            <a:stretch>
+              <a:fillRect/>
+            </a:stretch>
+          </p:blipFill>
+          <p:spPr>
+            <a:xfrm>
+              <a:off x="1913392" y="2285296"/>
+              <a:ext cx="815372" cy="478710"/>
+            </a:xfrm>
+            <a:prstGeom prst="rect">
+              <a:avLst/>
+            </a:prstGeom>
+          </p:spPr>
+        </p:pic>
+        <p:pic>
+          <p:nvPicPr>
+            <p:cNvPr id="59" name="Picture 58">
+              <a:extLst>
+                <a:ext uri="{FF2B5EF4-FFF2-40B4-BE49-F238E27FC236}">
+                  <a16:creationId xmlns:a16="http://schemas.microsoft.com/office/drawing/2014/main" id="{DA2C50BF-E924-4E72-96DD-8081B8BD20EE}"/>
+                </a:ext>
+              </a:extLst>
+            </p:cNvPr>
+            <p:cNvPicPr>
+              <a:picLocks noChangeAspect="1"/>
+            </p:cNvPicPr>
+            <p:nvPr/>
+          </p:nvPicPr>
+          <p:blipFill>
+            <a:blip r:embed="rId5" cstate="screen">
+              <a:extLst>
+                <a:ext uri="{28A0092B-C50C-407E-A947-70E740481C1C}">
+                  <a14:useLocalDpi xmlns:a14="http://schemas.microsoft.com/office/drawing/2010/main"/>
+                </a:ext>
+              </a:extLst>
+            </a:blip>
+            <a:stretch>
+              <a:fillRect/>
+            </a:stretch>
+          </p:blipFill>
+          <p:spPr>
+            <a:xfrm>
+              <a:off x="1789444" y="2552203"/>
+              <a:ext cx="931318" cy="546782"/>
+            </a:xfrm>
+            <a:prstGeom prst="rect">
+              <a:avLst/>
+            </a:prstGeom>
+          </p:spPr>
+        </p:pic>
+        <p:pic>
+          <p:nvPicPr>
+            <p:cNvPr id="60" name="Picture 59">
+              <a:extLst>
+                <a:ext uri="{FF2B5EF4-FFF2-40B4-BE49-F238E27FC236}">
+                  <a16:creationId xmlns:a16="http://schemas.microsoft.com/office/drawing/2014/main" id="{A426490C-3542-492B-95FA-53E05A19B1DD}"/>
+                </a:ext>
+              </a:extLst>
+            </p:cNvPr>
+            <p:cNvPicPr>
+              <a:picLocks noChangeAspect="1"/>
+            </p:cNvPicPr>
+            <p:nvPr/>
+          </p:nvPicPr>
+          <p:blipFill rotWithShape="1">
+            <a:blip r:embed="rId6" cstate="screen">
+              <a:extLst>
+                <a:ext uri="{28A0092B-C50C-407E-A947-70E740481C1C}">
+                  <a14:useLocalDpi xmlns:a14="http://schemas.microsoft.com/office/drawing/2010/main"/>
+                </a:ext>
+              </a:extLst>
+            </a:blip>
+            <a:srcRect/>
+            <a:stretch/>
+          </p:blipFill>
+          <p:spPr>
+            <a:xfrm>
+              <a:off x="1576702" y="2959253"/>
+              <a:ext cx="1119686" cy="325941"/>
+            </a:xfrm>
+            <a:prstGeom prst="rect">
+              <a:avLst/>
+            </a:prstGeom>
+          </p:spPr>
+        </p:pic>
+        <p:pic>
+          <p:nvPicPr>
+            <p:cNvPr id="61" name="Picture 60">
+              <a:extLst>
+                <a:ext uri="{FF2B5EF4-FFF2-40B4-BE49-F238E27FC236}">
+                  <a16:creationId xmlns:a16="http://schemas.microsoft.com/office/drawing/2014/main" id="{32551081-B374-411F-B030-B214AD783C8D}"/>
+                </a:ext>
+              </a:extLst>
+            </p:cNvPr>
+            <p:cNvPicPr>
+              <a:picLocks noChangeAspect="1"/>
+            </p:cNvPicPr>
+            <p:nvPr/>
+          </p:nvPicPr>
+          <p:blipFill>
+            <a:blip r:embed="rId7" cstate="print">
+              <a:extLst>
+                <a:ext uri="{28A0092B-C50C-407E-A947-70E740481C1C}">
+                  <a14:useLocalDpi xmlns:a14="http://schemas.microsoft.com/office/drawing/2010/main"/>
+                </a:ext>
+              </a:extLst>
+            </a:blip>
+            <a:stretch>
+              <a:fillRect/>
+            </a:stretch>
+          </p:blipFill>
+          <p:spPr>
+            <a:xfrm>
+              <a:off x="1859724" y="3260593"/>
+              <a:ext cx="818133" cy="312214"/>
+            </a:xfrm>
+            <a:prstGeom prst="rect">
+              <a:avLst/>
+            </a:prstGeom>
+          </p:spPr>
+        </p:pic>
+        <p:pic>
+          <p:nvPicPr>
+            <p:cNvPr id="64" name="Picture 63">
+              <a:extLst>
+                <a:ext uri="{FF2B5EF4-FFF2-40B4-BE49-F238E27FC236}">
+                  <a16:creationId xmlns:a16="http://schemas.microsoft.com/office/drawing/2014/main" id="{C6B240CA-710D-47DA-ABBD-F584754D0320}"/>
+                </a:ext>
+              </a:extLst>
+            </p:cNvPr>
+            <p:cNvPicPr>
+              <a:picLocks noChangeAspect="1"/>
+            </p:cNvPicPr>
+            <p:nvPr/>
+          </p:nvPicPr>
+          <p:blipFill>
+            <a:blip r:embed="rId8">
+              <a:extLst>
+                <a:ext uri="{28A0092B-C50C-407E-A947-70E740481C1C}">
+                  <a14:useLocalDpi xmlns:a14="http://schemas.microsoft.com/office/drawing/2010/main" val="0"/>
+                </a:ext>
+              </a:extLst>
+            </a:blip>
+            <a:stretch>
+              <a:fillRect/>
+            </a:stretch>
+          </p:blipFill>
+          <p:spPr>
+            <a:xfrm>
+              <a:off x="6335652" y="2727570"/>
+              <a:ext cx="436327" cy="625640"/>
+            </a:xfrm>
+            <a:prstGeom prst="rect">
+              <a:avLst/>
+            </a:prstGeom>
+          </p:spPr>
+        </p:pic>
+        <p:cxnSp>
+          <p:nvCxnSpPr>
+            <p:cNvPr id="66" name="Straight Arrow Connector 65">
+              <a:extLst>
+                <a:ext uri="{FF2B5EF4-FFF2-40B4-BE49-F238E27FC236}">
+                  <a16:creationId xmlns:a16="http://schemas.microsoft.com/office/drawing/2014/main" id="{F8FBD342-ACF1-4D5F-98CD-FC9A17C476FC}"/>
+                </a:ext>
+              </a:extLst>
+            </p:cNvPr>
+            <p:cNvCxnSpPr>
+              <a:cxnSpLocks/>
+            </p:cNvCxnSpPr>
+            <p:nvPr/>
+          </p:nvCxnSpPr>
+          <p:spPr bwMode="auto">
+            <a:xfrm>
+              <a:off x="6771979" y="3030869"/>
+              <a:ext cx="624030" cy="18491"/>
+            </a:xfrm>
+            <a:prstGeom prst="straightConnector1">
+              <a:avLst/>
+            </a:prstGeom>
+            <a:ln w="76200">
+              <a:solidFill>
+                <a:srgbClr val="003469"/>
+              </a:solidFill>
+              <a:headEnd type="triangle" w="med" len="med"/>
+              <a:tailEnd type="triangle" w="med" len="med"/>
+            </a:ln>
+          </p:spPr>
+          <p:style>
+            <a:lnRef idx="1">
+              <a:schemeClr val="dk1"/>
+            </a:lnRef>
+            <a:fillRef idx="0">
+              <a:schemeClr val="dk1"/>
+            </a:fillRef>
+            <a:effectRef idx="0">
+              <a:schemeClr val="dk1"/>
+            </a:effectRef>
+            <a:fontRef idx="minor">
+              <a:schemeClr val="tx1"/>
+            </a:fontRef>
+          </p:style>
+        </p:cxnSp>
+        <p:sp>
+          <p:nvSpPr>
+            <p:cNvPr id="67" name="Oval 66">
+              <a:extLst>
+                <a:ext uri="{FF2B5EF4-FFF2-40B4-BE49-F238E27FC236}">
+                  <a16:creationId xmlns:a16="http://schemas.microsoft.com/office/drawing/2014/main" id="{9AEEF18B-69A2-4740-97CD-277EA0BB6712}"/>
+                </a:ext>
+              </a:extLst>
+            </p:cNvPr>
+            <p:cNvSpPr/>
+            <p:nvPr/>
+          </p:nvSpPr>
+          <p:spPr>
+            <a:xfrm>
+              <a:off x="3519481" y="1925985"/>
+              <a:ext cx="2192141" cy="2155414"/>
+            </a:xfrm>
+            <a:prstGeom prst="ellipse">
+              <a:avLst/>
+            </a:prstGeom>
+            <a:noFill/>
+            <a:ln w="76200">
+              <a:solidFill>
+                <a:srgbClr val="1CD8A7"/>
+              </a:solidFill>
+            </a:ln>
+          </p:spPr>
+          <p:style>
+            <a:lnRef idx="2">
+              <a:schemeClr val="accent1">
+                <a:shade val="50000"/>
+              </a:schemeClr>
+            </a:lnRef>
+            <a:fillRef idx="1">
+              <a:schemeClr val="accent1"/>
+            </a:fillRef>
+            <a:effectRef idx="0">
+              <a:schemeClr val="accent1"/>
+            </a:effectRef>
+            <a:fontRef idx="minor">
+              <a:schemeClr val="lt1"/>
+            </a:fontRef>
+          </p:style>
+          <p:txBody>
+            <a:bodyPr rtlCol="0" anchor="ctr"/>
+            <a:lstStyle/>
+            <a:p>
+              <a:pPr algn="ctr"/>
+              <a:endParaRPr lang="en-CA"/>
+            </a:p>
+          </p:txBody>
+        </p:sp>
+        <p:sp>
+          <p:nvSpPr>
+            <p:cNvPr id="68" name="TextBox 67">
+              <a:extLst>
+                <a:ext uri="{FF2B5EF4-FFF2-40B4-BE49-F238E27FC236}">
+                  <a16:creationId xmlns:a16="http://schemas.microsoft.com/office/drawing/2014/main" id="{78F59B3A-E3B3-4823-91DD-2DFC625374AA}"/>
+                </a:ext>
+              </a:extLst>
+            </p:cNvPr>
+            <p:cNvSpPr txBox="1"/>
+            <p:nvPr/>
+          </p:nvSpPr>
+          <p:spPr>
+            <a:xfrm>
+              <a:off x="4099687" y="1339531"/>
+              <a:ext cx="1335109" cy="523220"/>
+            </a:xfrm>
+            <a:prstGeom prst="rect">
+              <a:avLst/>
+            </a:prstGeom>
+            <a:noFill/>
+          </p:spPr>
+          <p:txBody>
+            <a:bodyPr wrap="none" rtlCol="0">
+              <a:spAutoFit/>
+            </a:bodyPr>
+            <a:lstStyle/>
+            <a:p>
+              <a:r>
+                <a:rPr lang="en-CA" sz="1400" dirty="0"/>
+                <a:t>Solace </a:t>
+              </a:r>
+            </a:p>
+            <a:p>
+              <a:r>
+                <a:rPr lang="en-CA" sz="1400" dirty="0"/>
+                <a:t>message broker</a:t>
+              </a:r>
+            </a:p>
+          </p:txBody>
+        </p:sp>
+        <p:sp>
+          <p:nvSpPr>
+            <p:cNvPr id="69" name="TextBox 68">
+              <a:extLst>
+                <a:ext uri="{FF2B5EF4-FFF2-40B4-BE49-F238E27FC236}">
+                  <a16:creationId xmlns:a16="http://schemas.microsoft.com/office/drawing/2014/main" id="{6BE5982C-9FD6-4411-9E56-2726D849F9E3}"/>
+                </a:ext>
+              </a:extLst>
+            </p:cNvPr>
+            <p:cNvSpPr txBox="1"/>
+            <p:nvPr/>
+          </p:nvSpPr>
+          <p:spPr>
+            <a:xfrm>
+              <a:off x="1908903" y="1355646"/>
+              <a:ext cx="1468672" cy="523220"/>
+            </a:xfrm>
+            <a:prstGeom prst="rect">
+              <a:avLst/>
+            </a:prstGeom>
+            <a:noFill/>
+          </p:spPr>
+          <p:txBody>
+            <a:bodyPr wrap="none" rtlCol="0">
+              <a:spAutoFit/>
+            </a:bodyPr>
+            <a:lstStyle/>
+            <a:p>
+              <a:r>
+                <a:rPr lang="en-CA" sz="1400" dirty="0"/>
+                <a:t>Open/Messaging </a:t>
+              </a:r>
+            </a:p>
+            <a:p>
+              <a:r>
+                <a:rPr lang="en-CA" sz="1400" dirty="0"/>
+                <a:t>Protocols</a:t>
+              </a:r>
+            </a:p>
+          </p:txBody>
+        </p:sp>
+        <p:sp>
+          <p:nvSpPr>
+            <p:cNvPr id="72" name="Rectangle: Rounded Corners 71">
+              <a:extLst>
+                <a:ext uri="{FF2B5EF4-FFF2-40B4-BE49-F238E27FC236}">
+                  <a16:creationId xmlns:a16="http://schemas.microsoft.com/office/drawing/2014/main" id="{196A84F9-7FE5-41E5-83BD-DB46DC7BEAD3}"/>
+                </a:ext>
+              </a:extLst>
+            </p:cNvPr>
+            <p:cNvSpPr/>
+            <p:nvPr/>
+          </p:nvSpPr>
+          <p:spPr>
+            <a:xfrm>
+              <a:off x="4877126" y="2843078"/>
+              <a:ext cx="368035" cy="402015"/>
+            </a:xfrm>
+            <a:prstGeom prst="roundRect">
+              <a:avLst/>
+            </a:prstGeom>
+            <a:noFill/>
+            <a:ln>
+              <a:solidFill>
+                <a:srgbClr val="1DD783"/>
+              </a:solidFill>
+            </a:ln>
+          </p:spPr>
+          <p:style>
+            <a:lnRef idx="2">
+              <a:schemeClr val="accent1">
+                <a:shade val="50000"/>
+              </a:schemeClr>
+            </a:lnRef>
+            <a:fillRef idx="1">
+              <a:schemeClr val="accent1"/>
+            </a:fillRef>
+            <a:effectRef idx="0">
+              <a:schemeClr val="accent1"/>
+            </a:effectRef>
+            <a:fontRef idx="minor">
+              <a:schemeClr val="lt1"/>
+            </a:fontRef>
+          </p:style>
+          <p:txBody>
+            <a:bodyPr rtlCol="0" anchor="ctr"/>
+            <a:lstStyle/>
+            <a:p>
+              <a:pPr algn="ctr"/>
+              <a:endParaRPr lang="en-CA"/>
+            </a:p>
+          </p:txBody>
+        </p:sp>
+        <p:grpSp>
+          <p:nvGrpSpPr>
+            <p:cNvPr id="79" name="Group 78">
+              <a:extLst>
+                <a:ext uri="{FF2B5EF4-FFF2-40B4-BE49-F238E27FC236}">
+                  <a16:creationId xmlns:a16="http://schemas.microsoft.com/office/drawing/2014/main" id="{260AED25-BA54-4912-8336-84DE9E6895AE}"/>
+                </a:ext>
+              </a:extLst>
+            </p:cNvPr>
+            <p:cNvGrpSpPr/>
+            <p:nvPr/>
+          </p:nvGrpSpPr>
+          <p:grpSpPr>
+            <a:xfrm>
+              <a:off x="4096317" y="2864679"/>
+              <a:ext cx="184992" cy="337846"/>
+              <a:chOff x="2980603" y="5029982"/>
+              <a:chExt cx="184992" cy="337846"/>
+            </a:xfrm>
+          </p:grpSpPr>
+          <p:sp>
+            <p:nvSpPr>
+              <p:cNvPr id="74" name="Rectangle 73">
+                <a:extLst>
+                  <a:ext uri="{FF2B5EF4-FFF2-40B4-BE49-F238E27FC236}">
+                    <a16:creationId xmlns:a16="http://schemas.microsoft.com/office/drawing/2014/main" id="{CD08CA98-2D44-4F2E-856A-CAE4124F88A1}"/>
+                  </a:ext>
+                </a:extLst>
+              </p:cNvPr>
+              <p:cNvSpPr/>
+              <p:nvPr/>
+            </p:nvSpPr>
+            <p:spPr>
+              <a:xfrm>
+                <a:off x="2980603" y="5031120"/>
+                <a:ext cx="45965" cy="336708"/>
+              </a:xfrm>
+              <a:prstGeom prst="rect">
+                <a:avLst/>
+              </a:prstGeom>
+              <a:noFill/>
+              <a:ln>
+                <a:solidFill>
+                  <a:srgbClr val="1CD8A7"/>
+                </a:solidFill>
+              </a:ln>
+            </p:spPr>
+            <p:style>
+              <a:lnRef idx="2">
+                <a:schemeClr val="accent1">
+                  <a:shade val="50000"/>
+                </a:schemeClr>
+              </a:lnRef>
+              <a:fillRef idx="1">
+                <a:schemeClr val="accent1"/>
+              </a:fillRef>
+              <a:effectRef idx="0">
+                <a:schemeClr val="accent1"/>
+              </a:effectRef>
+              <a:fontRef idx="minor">
+                <a:schemeClr val="lt1"/>
+              </a:fontRef>
+            </p:style>
+            <p:txBody>
+              <a:bodyPr rtlCol="0" anchor="ctr"/>
+              <a:lstStyle/>
+              <a:p>
+                <a:pPr algn="ctr"/>
+                <a:endParaRPr lang="en-CA"/>
+              </a:p>
+            </p:txBody>
+          </p:sp>
+          <p:sp>
+            <p:nvSpPr>
+              <p:cNvPr id="76" name="Rectangle 75">
+                <a:extLst>
+                  <a:ext uri="{FF2B5EF4-FFF2-40B4-BE49-F238E27FC236}">
+                    <a16:creationId xmlns:a16="http://schemas.microsoft.com/office/drawing/2014/main" id="{A65B9FA0-9559-4FFD-B64D-9DF485AF210E}"/>
+                  </a:ext>
+                </a:extLst>
+              </p:cNvPr>
+              <p:cNvSpPr/>
+              <p:nvPr/>
+            </p:nvSpPr>
+            <p:spPr>
+              <a:xfrm>
+                <a:off x="3026569" y="5029982"/>
+                <a:ext cx="45966" cy="336709"/>
+              </a:xfrm>
+              <a:prstGeom prst="rect">
+                <a:avLst/>
+              </a:prstGeom>
+              <a:noFill/>
+              <a:ln>
+                <a:solidFill>
+                  <a:srgbClr val="1CD8A7"/>
+                </a:solidFill>
+              </a:ln>
+            </p:spPr>
+            <p:style>
+              <a:lnRef idx="2">
+                <a:schemeClr val="accent1">
+                  <a:shade val="50000"/>
+                </a:schemeClr>
+              </a:lnRef>
+              <a:fillRef idx="1">
+                <a:schemeClr val="accent1"/>
+              </a:fillRef>
+              <a:effectRef idx="0">
+                <a:schemeClr val="accent1"/>
+              </a:effectRef>
+              <a:fontRef idx="minor">
+                <a:schemeClr val="lt1"/>
+              </a:fontRef>
+            </p:style>
+            <p:txBody>
+              <a:bodyPr rtlCol="0" anchor="ctr"/>
+              <a:lstStyle/>
+              <a:p>
+                <a:pPr algn="ctr"/>
+                <a:endParaRPr lang="en-CA"/>
+              </a:p>
+            </p:txBody>
+          </p:sp>
+          <p:sp>
+            <p:nvSpPr>
+              <p:cNvPr id="77" name="Rectangle 76">
+                <a:extLst>
+                  <a:ext uri="{FF2B5EF4-FFF2-40B4-BE49-F238E27FC236}">
+                    <a16:creationId xmlns:a16="http://schemas.microsoft.com/office/drawing/2014/main" id="{2671CB54-298C-4848-9EA4-8B6D77E3EF7B}"/>
+                  </a:ext>
+                </a:extLst>
+              </p:cNvPr>
+              <p:cNvSpPr/>
+              <p:nvPr/>
+            </p:nvSpPr>
+            <p:spPr>
+              <a:xfrm>
+                <a:off x="3072534" y="5031120"/>
+                <a:ext cx="45720" cy="336708"/>
+              </a:xfrm>
+              <a:prstGeom prst="rect">
+                <a:avLst/>
+              </a:prstGeom>
+              <a:noFill/>
+              <a:ln>
+                <a:solidFill>
+                  <a:srgbClr val="1CD8A7"/>
+                </a:solidFill>
+              </a:ln>
+            </p:spPr>
+            <p:style>
+              <a:lnRef idx="2">
+                <a:schemeClr val="accent1">
+                  <a:shade val="50000"/>
+                </a:schemeClr>
+              </a:lnRef>
+              <a:fillRef idx="1">
+                <a:schemeClr val="accent1"/>
+              </a:fillRef>
+              <a:effectRef idx="0">
+                <a:schemeClr val="accent1"/>
+              </a:effectRef>
+              <a:fontRef idx="minor">
+                <a:schemeClr val="lt1"/>
+              </a:fontRef>
+            </p:style>
+            <p:txBody>
+              <a:bodyPr rtlCol="0" anchor="ctr"/>
+              <a:lstStyle/>
+              <a:p>
+                <a:pPr algn="ctr"/>
+                <a:endParaRPr lang="en-CA"/>
+              </a:p>
+            </p:txBody>
+          </p:sp>
+          <p:sp>
+            <p:nvSpPr>
+              <p:cNvPr id="78" name="Rectangle 77">
+                <a:extLst>
+                  <a:ext uri="{FF2B5EF4-FFF2-40B4-BE49-F238E27FC236}">
+                    <a16:creationId xmlns:a16="http://schemas.microsoft.com/office/drawing/2014/main" id="{C2FD0A3C-DF41-41E8-A644-933A13F8ACF4}"/>
+                  </a:ext>
+                </a:extLst>
+              </p:cNvPr>
+              <p:cNvSpPr/>
+              <p:nvPr/>
+            </p:nvSpPr>
+            <p:spPr>
+              <a:xfrm>
+                <a:off x="3119876" y="5031119"/>
+                <a:ext cx="45719" cy="336709"/>
+              </a:xfrm>
+              <a:prstGeom prst="rect">
+                <a:avLst/>
+              </a:prstGeom>
+              <a:noFill/>
+              <a:ln>
+                <a:solidFill>
+                  <a:srgbClr val="1CD8A7"/>
+                </a:solidFill>
+              </a:ln>
+            </p:spPr>
+            <p:style>
+              <a:lnRef idx="2">
+                <a:schemeClr val="accent1">
+                  <a:shade val="50000"/>
+                </a:schemeClr>
+              </a:lnRef>
+              <a:fillRef idx="1">
+                <a:schemeClr val="accent1"/>
+              </a:fillRef>
+              <a:effectRef idx="0">
+                <a:schemeClr val="accent1"/>
+              </a:effectRef>
+              <a:fontRef idx="minor">
+                <a:schemeClr val="lt1"/>
+              </a:fontRef>
+            </p:style>
+            <p:txBody>
+              <a:bodyPr rtlCol="0" anchor="ctr"/>
+              <a:lstStyle/>
+              <a:p>
+                <a:pPr algn="ctr"/>
+                <a:endParaRPr lang="en-CA"/>
+              </a:p>
+            </p:txBody>
+          </p:sp>
+        </p:grpSp>
+        <p:cxnSp>
+          <p:nvCxnSpPr>
+            <p:cNvPr id="81" name="Straight Arrow Connector 80">
+              <a:extLst>
+                <a:ext uri="{FF2B5EF4-FFF2-40B4-BE49-F238E27FC236}">
+                  <a16:creationId xmlns:a16="http://schemas.microsoft.com/office/drawing/2014/main" id="{2DA267AF-025F-48F5-A7F2-89C3AD736188}"/>
+                </a:ext>
+              </a:extLst>
+            </p:cNvPr>
+            <p:cNvCxnSpPr>
+              <a:cxnSpLocks/>
+              <a:endCxn id="74" idx="1"/>
+            </p:cNvCxnSpPr>
+            <p:nvPr/>
+          </p:nvCxnSpPr>
+          <p:spPr>
+            <a:xfrm>
+              <a:off x="3674480" y="2552203"/>
+              <a:ext cx="421837" cy="481968"/>
+            </a:xfrm>
+            <a:prstGeom prst="straightConnector1">
+              <a:avLst/>
+            </a:prstGeom>
+            <a:ln>
+              <a:solidFill>
+                <a:srgbClr val="1DD783"/>
+              </a:solidFill>
+              <a:headEnd type="triangle" w="med" len="med"/>
+              <a:tailEnd type="triangle" w="med" len="med"/>
+            </a:ln>
+          </p:spPr>
+          <p:style>
+            <a:lnRef idx="1">
+              <a:schemeClr val="accent1"/>
+            </a:lnRef>
+            <a:fillRef idx="0">
+              <a:schemeClr val="accent1"/>
+            </a:fillRef>
+            <a:effectRef idx="0">
+              <a:schemeClr val="accent1"/>
+            </a:effectRef>
+            <a:fontRef idx="minor">
+              <a:schemeClr val="tx1"/>
+            </a:fontRef>
+          </p:style>
+        </p:cxnSp>
+        <p:cxnSp>
+          <p:nvCxnSpPr>
+            <p:cNvPr id="83" name="Straight Arrow Connector 82">
+              <a:extLst>
+                <a:ext uri="{FF2B5EF4-FFF2-40B4-BE49-F238E27FC236}">
+                  <a16:creationId xmlns:a16="http://schemas.microsoft.com/office/drawing/2014/main" id="{19629EFE-CB2F-4EDC-830A-F227D6FBBDA1}"/>
+                </a:ext>
+              </a:extLst>
+            </p:cNvPr>
+            <p:cNvCxnSpPr>
+              <a:cxnSpLocks/>
+              <a:endCxn id="74" idx="1"/>
+            </p:cNvCxnSpPr>
+            <p:nvPr/>
+          </p:nvCxnSpPr>
+          <p:spPr>
+            <a:xfrm>
+              <a:off x="3610998" y="2701351"/>
+              <a:ext cx="485319" cy="332820"/>
+            </a:xfrm>
+            <a:prstGeom prst="straightConnector1">
+              <a:avLst/>
+            </a:prstGeom>
+            <a:ln>
+              <a:solidFill>
+                <a:srgbClr val="1DD783"/>
+              </a:solidFill>
+              <a:headEnd type="triangle" w="med" len="med"/>
+              <a:tailEnd type="none" w="med" len="med"/>
+            </a:ln>
+          </p:spPr>
+          <p:style>
+            <a:lnRef idx="1">
+              <a:schemeClr val="accent1"/>
+            </a:lnRef>
+            <a:fillRef idx="0">
+              <a:schemeClr val="accent1"/>
+            </a:fillRef>
+            <a:effectRef idx="0">
+              <a:schemeClr val="accent1"/>
+            </a:effectRef>
+            <a:fontRef idx="minor">
+              <a:schemeClr val="tx1"/>
+            </a:fontRef>
+          </p:style>
+        </p:cxnSp>
+        <p:cxnSp>
+          <p:nvCxnSpPr>
+            <p:cNvPr id="85" name="Straight Arrow Connector 84">
+              <a:extLst>
+                <a:ext uri="{FF2B5EF4-FFF2-40B4-BE49-F238E27FC236}">
+                  <a16:creationId xmlns:a16="http://schemas.microsoft.com/office/drawing/2014/main" id="{C99F597C-5FFB-44ED-B288-09A81F6BFFAA}"/>
+                </a:ext>
+              </a:extLst>
+            </p:cNvPr>
+            <p:cNvCxnSpPr>
+              <a:cxnSpLocks/>
+              <a:endCxn id="74" idx="1"/>
+            </p:cNvCxnSpPr>
+            <p:nvPr/>
+          </p:nvCxnSpPr>
+          <p:spPr>
+            <a:xfrm>
+              <a:off x="3572630" y="2868660"/>
+              <a:ext cx="523687" cy="165511"/>
+            </a:xfrm>
+            <a:prstGeom prst="straightConnector1">
+              <a:avLst/>
+            </a:prstGeom>
+            <a:ln>
+              <a:solidFill>
+                <a:srgbClr val="1DD783"/>
+              </a:solidFill>
+              <a:headEnd type="triangle" w="med" len="med"/>
+              <a:tailEnd type="none" w="med" len="med"/>
+            </a:ln>
+          </p:spPr>
+          <p:style>
+            <a:lnRef idx="1">
+              <a:schemeClr val="accent1"/>
+            </a:lnRef>
+            <a:fillRef idx="0">
+              <a:schemeClr val="accent1"/>
+            </a:fillRef>
+            <a:effectRef idx="0">
+              <a:schemeClr val="accent1"/>
+            </a:effectRef>
+            <a:fontRef idx="minor">
+              <a:schemeClr val="tx1"/>
+            </a:fontRef>
+          </p:style>
+        </p:cxnSp>
+        <p:cxnSp>
+          <p:nvCxnSpPr>
+            <p:cNvPr id="87" name="Straight Arrow Connector 86">
+              <a:extLst>
+                <a:ext uri="{FF2B5EF4-FFF2-40B4-BE49-F238E27FC236}">
+                  <a16:creationId xmlns:a16="http://schemas.microsoft.com/office/drawing/2014/main" id="{CCCE4286-154A-4B0B-8B68-33796CADC416}"/>
+                </a:ext>
+              </a:extLst>
+            </p:cNvPr>
+            <p:cNvCxnSpPr>
+              <a:cxnSpLocks/>
+              <a:endCxn id="74" idx="1"/>
+            </p:cNvCxnSpPr>
+            <p:nvPr/>
+          </p:nvCxnSpPr>
+          <p:spPr>
+            <a:xfrm>
+              <a:off x="3579750" y="3027496"/>
+              <a:ext cx="516567" cy="6675"/>
+            </a:xfrm>
+            <a:prstGeom prst="straightConnector1">
+              <a:avLst/>
+            </a:prstGeom>
+            <a:ln>
+              <a:solidFill>
+                <a:srgbClr val="1DD783"/>
+              </a:solidFill>
+              <a:headEnd type="triangle" w="med" len="med"/>
+              <a:tailEnd type="none" w="med" len="med"/>
+            </a:ln>
+          </p:spPr>
+          <p:style>
+            <a:lnRef idx="1">
+              <a:schemeClr val="accent1"/>
+            </a:lnRef>
+            <a:fillRef idx="0">
+              <a:schemeClr val="accent1"/>
+            </a:fillRef>
+            <a:effectRef idx="0">
+              <a:schemeClr val="accent1"/>
+            </a:effectRef>
+            <a:fontRef idx="minor">
+              <a:schemeClr val="tx1"/>
+            </a:fontRef>
+          </p:style>
+        </p:cxnSp>
+        <p:cxnSp>
+          <p:nvCxnSpPr>
+            <p:cNvPr id="89" name="Straight Arrow Connector 88">
+              <a:extLst>
+                <a:ext uri="{FF2B5EF4-FFF2-40B4-BE49-F238E27FC236}">
+                  <a16:creationId xmlns:a16="http://schemas.microsoft.com/office/drawing/2014/main" id="{FAC4AE19-D5C4-4168-B232-F88F1F4C071E}"/>
+                </a:ext>
+              </a:extLst>
+            </p:cNvPr>
+            <p:cNvCxnSpPr>
+              <a:cxnSpLocks/>
+              <a:endCxn id="74" idx="1"/>
+            </p:cNvCxnSpPr>
+            <p:nvPr/>
+          </p:nvCxnSpPr>
+          <p:spPr>
+            <a:xfrm flipV="1">
+              <a:off x="3567111" y="3034171"/>
+              <a:ext cx="529206" cy="142922"/>
+            </a:xfrm>
+            <a:prstGeom prst="straightConnector1">
+              <a:avLst/>
+            </a:prstGeom>
+            <a:ln>
+              <a:solidFill>
+                <a:srgbClr val="1DD783"/>
+              </a:solidFill>
+              <a:headEnd type="triangle" w="med" len="med"/>
+              <a:tailEnd type="none" w="med" len="med"/>
+            </a:ln>
+          </p:spPr>
+          <p:style>
+            <a:lnRef idx="1">
+              <a:schemeClr val="accent1"/>
+            </a:lnRef>
+            <a:fillRef idx="0">
+              <a:schemeClr val="accent1"/>
+            </a:fillRef>
+            <a:effectRef idx="0">
+              <a:schemeClr val="accent1"/>
+            </a:effectRef>
+            <a:fontRef idx="minor">
+              <a:schemeClr val="tx1"/>
+            </a:fontRef>
+          </p:style>
+        </p:cxnSp>
+        <p:cxnSp>
+          <p:nvCxnSpPr>
+            <p:cNvPr id="92" name="Straight Arrow Connector 91">
+              <a:extLst>
+                <a:ext uri="{FF2B5EF4-FFF2-40B4-BE49-F238E27FC236}">
+                  <a16:creationId xmlns:a16="http://schemas.microsoft.com/office/drawing/2014/main" id="{B456D24D-76B9-40EB-87AC-8D251BADF7DE}"/>
+                </a:ext>
+              </a:extLst>
+            </p:cNvPr>
+            <p:cNvCxnSpPr>
+              <a:cxnSpLocks/>
+              <a:endCxn id="74" idx="1"/>
+            </p:cNvCxnSpPr>
+            <p:nvPr/>
+          </p:nvCxnSpPr>
+          <p:spPr>
+            <a:xfrm flipV="1">
+              <a:off x="3607318" y="3034171"/>
+              <a:ext cx="488999" cy="319039"/>
+            </a:xfrm>
+            <a:prstGeom prst="straightConnector1">
+              <a:avLst/>
+            </a:prstGeom>
+            <a:ln>
+              <a:solidFill>
+                <a:srgbClr val="1DD783"/>
+              </a:solidFill>
+              <a:headEnd type="triangle" w="med" len="med"/>
+              <a:tailEnd type="triangle" w="med" len="med"/>
+            </a:ln>
+          </p:spPr>
+          <p:style>
+            <a:lnRef idx="1">
+              <a:schemeClr val="accent1"/>
+            </a:lnRef>
+            <a:fillRef idx="0">
+              <a:schemeClr val="accent1"/>
+            </a:fillRef>
+            <a:effectRef idx="0">
+              <a:schemeClr val="accent1"/>
+            </a:effectRef>
+            <a:fontRef idx="minor">
+              <a:schemeClr val="tx1"/>
+            </a:fontRef>
+          </p:style>
+        </p:cxnSp>
+        <p:sp>
+          <p:nvSpPr>
+            <p:cNvPr id="98" name="TextBox 97">
+              <a:extLst>
+                <a:ext uri="{FF2B5EF4-FFF2-40B4-BE49-F238E27FC236}">
+                  <a16:creationId xmlns:a16="http://schemas.microsoft.com/office/drawing/2014/main" id="{5A6F0D04-817A-467F-82F9-41418B49DBB7}"/>
+                </a:ext>
+              </a:extLst>
+            </p:cNvPr>
+            <p:cNvSpPr txBox="1"/>
+            <p:nvPr/>
+          </p:nvSpPr>
+          <p:spPr>
+            <a:xfrm>
+              <a:off x="3890104" y="2348730"/>
+              <a:ext cx="623889" cy="461665"/>
+            </a:xfrm>
+            <a:prstGeom prst="rect">
+              <a:avLst/>
+            </a:prstGeom>
+            <a:noFill/>
+          </p:spPr>
+          <p:txBody>
+            <a:bodyPr wrap="none" rtlCol="0">
+              <a:spAutoFit/>
+            </a:bodyPr>
+            <a:lstStyle/>
+            <a:p>
+              <a:r>
+                <a:rPr lang="en-CA" sz="1200" dirty="0"/>
+                <a:t>Solace </a:t>
+              </a:r>
+            </a:p>
+            <a:p>
+              <a:r>
+                <a:rPr lang="en-CA" sz="1200" dirty="0"/>
+                <a:t>Queue</a:t>
+              </a:r>
+            </a:p>
+          </p:txBody>
+        </p:sp>
+        <p:cxnSp>
+          <p:nvCxnSpPr>
+            <p:cNvPr id="99" name="Straight Arrow Connector 98">
+              <a:extLst>
+                <a:ext uri="{FF2B5EF4-FFF2-40B4-BE49-F238E27FC236}">
+                  <a16:creationId xmlns:a16="http://schemas.microsoft.com/office/drawing/2014/main" id="{C026D86C-4F4B-4BAE-8B1F-087BF02A3D41}"/>
+                </a:ext>
+              </a:extLst>
+            </p:cNvPr>
+            <p:cNvCxnSpPr>
+              <a:cxnSpLocks/>
+              <a:endCxn id="72" idx="1"/>
+            </p:cNvCxnSpPr>
+            <p:nvPr/>
+          </p:nvCxnSpPr>
+          <p:spPr>
+            <a:xfrm flipV="1">
+              <a:off x="4288148" y="3044086"/>
+              <a:ext cx="588978" cy="5274"/>
+            </a:xfrm>
+            <a:prstGeom prst="straightConnector1">
+              <a:avLst/>
+            </a:prstGeom>
+            <a:ln>
+              <a:solidFill>
+                <a:srgbClr val="1DD783"/>
+              </a:solidFill>
+              <a:headEnd type="triangle" w="med" len="med"/>
+              <a:tailEnd type="triangle" w="med" len="med"/>
+            </a:ln>
+          </p:spPr>
+          <p:style>
+            <a:lnRef idx="1">
+              <a:schemeClr val="accent1"/>
+            </a:lnRef>
+            <a:fillRef idx="0">
+              <a:schemeClr val="accent1"/>
+            </a:fillRef>
+            <a:effectRef idx="0">
+              <a:schemeClr val="accent1"/>
+            </a:effectRef>
+            <a:fontRef idx="minor">
+              <a:schemeClr val="tx1"/>
+            </a:fontRef>
+          </p:style>
+        </p:cxnSp>
+        <p:sp>
+          <p:nvSpPr>
+            <p:cNvPr id="101" name="TextBox 100">
+              <a:extLst>
+                <a:ext uri="{FF2B5EF4-FFF2-40B4-BE49-F238E27FC236}">
+                  <a16:creationId xmlns:a16="http://schemas.microsoft.com/office/drawing/2014/main" id="{0F754A6E-90A4-4233-9296-BBAE24554A99}"/>
+                </a:ext>
+              </a:extLst>
+            </p:cNvPr>
+            <p:cNvSpPr txBox="1"/>
+            <p:nvPr/>
+          </p:nvSpPr>
+          <p:spPr>
+            <a:xfrm>
+              <a:off x="4767242" y="2179263"/>
+              <a:ext cx="747512" cy="646331"/>
+            </a:xfrm>
+            <a:prstGeom prst="rect">
+              <a:avLst/>
+            </a:prstGeom>
+            <a:noFill/>
+          </p:spPr>
+          <p:txBody>
+            <a:bodyPr wrap="none" rtlCol="0">
+              <a:spAutoFit/>
+            </a:bodyPr>
+            <a:lstStyle/>
+            <a:p>
+              <a:r>
+                <a:rPr lang="en-CA" sz="1200" dirty="0"/>
+                <a:t>REST</a:t>
+              </a:r>
+            </a:p>
+            <a:p>
+              <a:r>
+                <a:rPr lang="en-CA" sz="1200" dirty="0"/>
+                <a:t>Delivery</a:t>
+              </a:r>
+            </a:p>
+            <a:p>
+              <a:r>
+                <a:rPr lang="en-CA" sz="1200" dirty="0"/>
+                <a:t>Endpoint</a:t>
+              </a:r>
+            </a:p>
+          </p:txBody>
+        </p:sp>
+        <p:cxnSp>
+          <p:nvCxnSpPr>
+            <p:cNvPr id="102" name="Straight Arrow Connector 101">
+              <a:extLst>
+                <a:ext uri="{FF2B5EF4-FFF2-40B4-BE49-F238E27FC236}">
+                  <a16:creationId xmlns:a16="http://schemas.microsoft.com/office/drawing/2014/main" id="{2A8AC3B6-EB23-40CA-B587-D56E0BCB4263}"/>
+                </a:ext>
+              </a:extLst>
+            </p:cNvPr>
+            <p:cNvCxnSpPr>
+              <a:cxnSpLocks/>
+              <a:stCxn id="72" idx="3"/>
+            </p:cNvCxnSpPr>
+            <p:nvPr/>
+          </p:nvCxnSpPr>
+          <p:spPr>
+            <a:xfrm flipV="1">
+              <a:off x="5245161" y="3042342"/>
+              <a:ext cx="430868" cy="1744"/>
+            </a:xfrm>
+            <a:prstGeom prst="straightConnector1">
+              <a:avLst/>
+            </a:prstGeom>
+            <a:ln>
+              <a:solidFill>
+                <a:srgbClr val="002060"/>
+              </a:solidFill>
+              <a:headEnd type="triangle" w="med" len="med"/>
+              <a:tailEnd type="triangle" w="med" len="med"/>
+            </a:ln>
+          </p:spPr>
+          <p:style>
+            <a:lnRef idx="1">
+              <a:schemeClr val="accent1"/>
+            </a:lnRef>
+            <a:fillRef idx="0">
+              <a:schemeClr val="accent1"/>
+            </a:fillRef>
+            <a:effectRef idx="0">
+              <a:schemeClr val="accent1"/>
+            </a:effectRef>
+            <a:fontRef idx="minor">
+              <a:schemeClr val="tx1"/>
+            </a:fontRef>
+          </p:style>
+        </p:cxnSp>
+        <p:sp>
+          <p:nvSpPr>
+            <p:cNvPr id="116" name="TextBox 115">
+              <a:extLst>
+                <a:ext uri="{FF2B5EF4-FFF2-40B4-BE49-F238E27FC236}">
+                  <a16:creationId xmlns:a16="http://schemas.microsoft.com/office/drawing/2014/main" id="{105CBEDC-41A3-44E6-818B-0284C0D3E4B4}"/>
+                </a:ext>
+              </a:extLst>
+            </p:cNvPr>
+            <p:cNvSpPr txBox="1"/>
+            <p:nvPr/>
+          </p:nvSpPr>
+          <p:spPr>
+            <a:xfrm>
+              <a:off x="5953050" y="1339531"/>
+              <a:ext cx="1442959" cy="738664"/>
+            </a:xfrm>
+            <a:prstGeom prst="rect">
+              <a:avLst/>
+            </a:prstGeom>
+            <a:noFill/>
+          </p:spPr>
+          <p:txBody>
+            <a:bodyPr wrap="none" rtlCol="0">
+              <a:spAutoFit/>
+            </a:bodyPr>
+            <a:lstStyle/>
+            <a:p>
+              <a:r>
+                <a:rPr lang="en-CA" sz="1400" dirty="0"/>
+                <a:t>AWS </a:t>
+              </a:r>
+              <a:r>
+                <a:rPr lang="en-CA" sz="1400" dirty="0" err="1"/>
+                <a:t>APIGateway</a:t>
+              </a:r>
+              <a:endParaRPr lang="en-CA" sz="1400" dirty="0"/>
+            </a:p>
+            <a:p>
+              <a:r>
+                <a:rPr lang="en-CA" sz="1400" dirty="0"/>
+                <a:t>Web Hook</a:t>
+              </a:r>
+            </a:p>
+            <a:p>
+              <a:r>
+                <a:rPr lang="en-CA" sz="1400" dirty="0"/>
+                <a:t>Interface</a:t>
+              </a:r>
+            </a:p>
+          </p:txBody>
+        </p:sp>
+      </p:grpSp>
+    </p:spTree>
+    <p:extLst>
+      <p:ext uri="{BB962C8B-B14F-4D97-AF65-F5344CB8AC3E}">
+        <p14:creationId xmlns:p14="http://schemas.microsoft.com/office/powerpoint/2010/main" val="3427598404"/>
+      </p:ext>
+    </p:extLst>
+  </p:cSld>
+  <p:clrMapOvr>
+    <a:masterClrMapping/>
+  </p:clrMapOvr>
+</p:sld>
+</file>
+
+<file path=ppt/slides/slide3.xml><?xml version="1.0" encoding="utf-8"?>
+<p:sld xmlns:a="http://schemas.openxmlformats.org/drawingml/2006/main" xmlns:r="http://schemas.openxmlformats.org/officeDocument/2006/relationships" xmlns:p="http://schemas.openxmlformats.org/presentationml/2006/main">
+  <p:cSld>
+    <p:spTree>
+      <p:nvGrpSpPr>
+        <p:cNvPr id="1" name=""/>
+        <p:cNvGrpSpPr/>
+        <p:nvPr/>
+      </p:nvGrpSpPr>
+      <p:grpSpPr>
+        <a:xfrm>
+          <a:off x="0" y="0"/>
+          <a:ext cx="0" cy="0"/>
+          <a:chOff x="0" y="0"/>
+          <a:chExt cx="0" cy="0"/>
+        </a:xfrm>
+      </p:grpSpPr>
+      <p:grpSp>
+        <p:nvGrpSpPr>
           <p:cNvPr id="2" name="Group 1">
             <a:extLst>
               <a:ext uri="{FF2B5EF4-FFF2-40B4-BE49-F238E27FC236}">
@@ -6320,7 +7988,7 @@
 </p:sld>
 </file>
 
-<file path=ppt/slides/slide3.xml><?xml version="1.0" encoding="utf-8"?>
+<file path=ppt/slides/slide4.xml><?xml version="1.0" encoding="utf-8"?>
 <p:sld xmlns:a="http://schemas.openxmlformats.org/drawingml/2006/main" xmlns:r="http://schemas.openxmlformats.org/officeDocument/2006/relationships" xmlns:p="http://schemas.openxmlformats.org/presentationml/2006/main">
   <p:cSld>
     <p:spTree>

</xml_diff>

<commit_message>
Updated templates, added public integration option, updated documentation, added quick start
</commit_message>
<xml_diff>
--- a/images/source_images.pptx
+++ b/images/source_images.pptx
@@ -8,7 +8,7 @@
     <p:sldId id="256" r:id="rId2"/>
     <p:sldId id="259" r:id="rId3"/>
     <p:sldId id="257" r:id="rId4"/>
-    <p:sldId id="258" r:id="rId5"/>
+    <p:sldId id="260" r:id="rId5"/>
   </p:sldIdLst>
   <p:sldSz cx="12192000" cy="6858000"/>
   <p:notesSz cx="6858000" cy="9144000"/>
@@ -843,7 +843,7 @@
           <a:p>
             <a:fld id="{D7078A92-8A65-4E12-AE5D-AB4AEDE49790}" type="datetimeFigureOut">
               <a:rPr lang="en-CA" smtClean="0"/>
-              <a:t>2018-11-27</a:t>
+              <a:t>2020-08-05</a:t>
             </a:fld>
             <a:endParaRPr lang="en-CA"/>
           </a:p>
@@ -1043,7 +1043,7 @@
           <a:p>
             <a:fld id="{D7078A92-8A65-4E12-AE5D-AB4AEDE49790}" type="datetimeFigureOut">
               <a:rPr lang="en-CA" smtClean="0"/>
-              <a:t>2018-11-27</a:t>
+              <a:t>2020-08-05</a:t>
             </a:fld>
             <a:endParaRPr lang="en-CA"/>
           </a:p>
@@ -1253,7 +1253,7 @@
           <a:p>
             <a:fld id="{D7078A92-8A65-4E12-AE5D-AB4AEDE49790}" type="datetimeFigureOut">
               <a:rPr lang="en-CA" smtClean="0"/>
-              <a:t>2018-11-27</a:t>
+              <a:t>2020-08-05</a:t>
             </a:fld>
             <a:endParaRPr lang="en-CA"/>
           </a:p>
@@ -1453,7 +1453,7 @@
           <a:p>
             <a:fld id="{D7078A92-8A65-4E12-AE5D-AB4AEDE49790}" type="datetimeFigureOut">
               <a:rPr lang="en-CA" smtClean="0"/>
-              <a:t>2018-11-27</a:t>
+              <a:t>2020-08-05</a:t>
             </a:fld>
             <a:endParaRPr lang="en-CA"/>
           </a:p>
@@ -1729,7 +1729,7 @@
           <a:p>
             <a:fld id="{D7078A92-8A65-4E12-AE5D-AB4AEDE49790}" type="datetimeFigureOut">
               <a:rPr lang="en-CA" smtClean="0"/>
-              <a:t>2018-11-27</a:t>
+              <a:t>2020-08-05</a:t>
             </a:fld>
             <a:endParaRPr lang="en-CA"/>
           </a:p>
@@ -1997,7 +1997,7 @@
           <a:p>
             <a:fld id="{D7078A92-8A65-4E12-AE5D-AB4AEDE49790}" type="datetimeFigureOut">
               <a:rPr lang="en-CA" smtClean="0"/>
-              <a:t>2018-11-27</a:t>
+              <a:t>2020-08-05</a:t>
             </a:fld>
             <a:endParaRPr lang="en-CA"/>
           </a:p>
@@ -2412,7 +2412,7 @@
           <a:p>
             <a:fld id="{D7078A92-8A65-4E12-AE5D-AB4AEDE49790}" type="datetimeFigureOut">
               <a:rPr lang="en-CA" smtClean="0"/>
-              <a:t>2018-11-27</a:t>
+              <a:t>2020-08-05</a:t>
             </a:fld>
             <a:endParaRPr lang="en-CA"/>
           </a:p>
@@ -2554,7 +2554,7 @@
           <a:p>
             <a:fld id="{D7078A92-8A65-4E12-AE5D-AB4AEDE49790}" type="datetimeFigureOut">
               <a:rPr lang="en-CA" smtClean="0"/>
-              <a:t>2018-11-27</a:t>
+              <a:t>2020-08-05</a:t>
             </a:fld>
             <a:endParaRPr lang="en-CA"/>
           </a:p>
@@ -2667,7 +2667,7 @@
           <a:p>
             <a:fld id="{D7078A92-8A65-4E12-AE5D-AB4AEDE49790}" type="datetimeFigureOut">
               <a:rPr lang="en-CA" smtClean="0"/>
-              <a:t>2018-11-27</a:t>
+              <a:t>2020-08-05</a:t>
             </a:fld>
             <a:endParaRPr lang="en-CA"/>
           </a:p>
@@ -2980,7 +2980,7 @@
           <a:p>
             <a:fld id="{D7078A92-8A65-4E12-AE5D-AB4AEDE49790}" type="datetimeFigureOut">
               <a:rPr lang="en-CA" smtClean="0"/>
-              <a:t>2018-11-27</a:t>
+              <a:t>2020-08-05</a:t>
             </a:fld>
             <a:endParaRPr lang="en-CA"/>
           </a:p>
@@ -3269,7 +3269,7 @@
           <a:p>
             <a:fld id="{D7078A92-8A65-4E12-AE5D-AB4AEDE49790}" type="datetimeFigureOut">
               <a:rPr lang="en-CA" smtClean="0"/>
-              <a:t>2018-11-27</a:t>
+              <a:t>2020-08-05</a:t>
             </a:fld>
             <a:endParaRPr lang="en-CA"/>
           </a:p>
@@ -3512,7 +3512,7 @@
           <a:p>
             <a:fld id="{D7078A92-8A65-4E12-AE5D-AB4AEDE49790}" type="datetimeFigureOut">
               <a:rPr lang="en-CA" smtClean="0"/>
-              <a:t>2018-11-27</a:t>
+              <a:t>2020-08-05</a:t>
             </a:fld>
             <a:endParaRPr lang="en-CA"/>
           </a:p>
@@ -3931,10 +3931,10 @@
       </p:grpSpPr>
       <p:grpSp>
         <p:nvGrpSpPr>
-          <p:cNvPr id="35" name="Group 34">
+          <p:cNvPr id="41" name="Group 40">
             <a:extLst>
               <a:ext uri="{FF2B5EF4-FFF2-40B4-BE49-F238E27FC236}">
-                <a16:creationId xmlns:a16="http://schemas.microsoft.com/office/drawing/2014/main" id="{E88FE79B-057F-4234-9EE3-3098E99CE1F7}"/>
+                <a16:creationId xmlns:a16="http://schemas.microsoft.com/office/drawing/2014/main" id="{2E6A4A38-C7B5-410E-9EC5-2EB568E0F58D}"/>
               </a:ext>
             </a:extLst>
           </p:cNvPr>
@@ -3944,9 +3944,9 @@
         <p:grpSpPr>
           <a:xfrm>
             <a:off x="90393" y="175088"/>
-            <a:ext cx="9704906" cy="5630093"/>
+            <a:ext cx="9935517" cy="5630093"/>
             <a:chOff x="90393" y="175088"/>
-            <a:chExt cx="9704906" cy="5630093"/>
+            <a:chExt cx="9935517" cy="5630093"/>
           </a:xfrm>
         </p:grpSpPr>
         <p:pic>
@@ -4486,8 +4486,8 @@
           </p:nvCxnSpPr>
           <p:spPr bwMode="auto">
             <a:xfrm flipV="1">
-              <a:off x="5393031" y="1026828"/>
-              <a:ext cx="2052163" cy="1303463"/>
+              <a:off x="5393031" y="1157268"/>
+              <a:ext cx="2030357" cy="1173024"/>
             </a:xfrm>
             <a:prstGeom prst="straightConnector1">
               <a:avLst/>
@@ -4543,7 +4543,7 @@
           </p:blipFill>
           <p:spPr>
             <a:xfrm>
-              <a:off x="7506747" y="2750045"/>
+              <a:off x="7743784" y="3285010"/>
               <a:ext cx="575638" cy="702427"/>
             </a:xfrm>
             <a:prstGeom prst="rect">
@@ -4565,7 +4565,7 @@
           </p:nvSpPr>
           <p:spPr>
             <a:xfrm>
-              <a:off x="8248026" y="2628596"/>
+              <a:off x="8485063" y="3163561"/>
               <a:ext cx="1194238" cy="841256"/>
             </a:xfrm>
             <a:prstGeom prst="rect">
@@ -4682,7 +4682,7 @@
           </p:nvSpPr>
           <p:spPr>
             <a:xfrm>
-              <a:off x="8285770" y="1799600"/>
+              <a:off x="8516381" y="2112550"/>
               <a:ext cx="1299908" cy="471924"/>
             </a:xfrm>
             <a:prstGeom prst="rect">
@@ -4764,7 +4764,7 @@
           </p:nvSpPr>
           <p:spPr>
             <a:xfrm>
-              <a:off x="8296491" y="695624"/>
+              <a:off x="8527102" y="921306"/>
               <a:ext cx="1498808" cy="471924"/>
             </a:xfrm>
             <a:prstGeom prst="rect">
@@ -4860,7 +4860,7 @@
           </p:blipFill>
           <p:spPr>
             <a:xfrm>
-              <a:off x="7613104" y="3845069"/>
+              <a:off x="7843715" y="4741311"/>
               <a:ext cx="475707" cy="579268"/>
             </a:xfrm>
             <a:prstGeom prst="rect">
@@ -4882,7 +4882,7 @@
           </p:nvSpPr>
           <p:spPr>
             <a:xfrm>
-              <a:off x="8284512" y="3665755"/>
+              <a:off x="8515123" y="4561997"/>
               <a:ext cx="1413849" cy="841256"/>
             </a:xfrm>
             <a:prstGeom prst="rect">
@@ -5013,7 +5013,7 @@
           </p:blipFill>
           <p:spPr>
             <a:xfrm>
-              <a:off x="7448094" y="558963"/>
+              <a:off x="7678705" y="784645"/>
               <a:ext cx="693132" cy="745246"/>
             </a:xfrm>
             <a:prstGeom prst="rect">
@@ -5049,7 +5049,7 @@
           </p:blipFill>
           <p:spPr>
             <a:xfrm>
-              <a:off x="7412797" y="1819181"/>
+              <a:off x="7643408" y="2132131"/>
               <a:ext cx="728429" cy="542402"/>
             </a:xfrm>
             <a:prstGeom prst="rect">
@@ -5057,159 +5057,6 @@
             </a:prstGeom>
           </p:spPr>
         </p:pic>
-        <p:pic>
-          <p:nvPicPr>
-            <p:cNvPr id="29" name="Picture 28">
-              <a:extLst>
-                <a:ext uri="{FF2B5EF4-FFF2-40B4-BE49-F238E27FC236}">
-                  <a16:creationId xmlns:a16="http://schemas.microsoft.com/office/drawing/2014/main" id="{A3FA1783-9B74-4370-BB66-AFA27BDCBA15}"/>
-                </a:ext>
-              </a:extLst>
-            </p:cNvPr>
-            <p:cNvPicPr>
-              <a:picLocks noChangeAspect="1"/>
-            </p:cNvPicPr>
-            <p:nvPr/>
-          </p:nvPicPr>
-          <p:blipFill>
-            <a:blip r:embed="rId13">
-              <a:extLst>
-                <a:ext uri="{28A0092B-C50C-407E-A947-70E740481C1C}">
-                  <a14:useLocalDpi xmlns:a14="http://schemas.microsoft.com/office/drawing/2010/main" val="0"/>
-                </a:ext>
-              </a:extLst>
-            </a:blip>
-            <a:stretch>
-              <a:fillRect/>
-            </a:stretch>
-          </p:blipFill>
-          <p:spPr>
-            <a:xfrm>
-              <a:off x="7619530" y="4813739"/>
-              <a:ext cx="462855" cy="573683"/>
-            </a:xfrm>
-            <a:prstGeom prst="rect">
-              <a:avLst/>
-            </a:prstGeom>
-          </p:spPr>
-        </p:pic>
-        <p:sp>
-          <p:nvSpPr>
-            <p:cNvPr id="30" name="TextBox 29">
-              <a:extLst>
-                <a:ext uri="{FF2B5EF4-FFF2-40B4-BE49-F238E27FC236}">
-                  <a16:creationId xmlns:a16="http://schemas.microsoft.com/office/drawing/2014/main" id="{690293D5-9093-4460-ADF5-7B4EDC931F5F}"/>
-                </a:ext>
-              </a:extLst>
-            </p:cNvPr>
-            <p:cNvSpPr txBox="1"/>
-            <p:nvPr/>
-          </p:nvSpPr>
-          <p:spPr>
-            <a:xfrm>
-              <a:off x="8310982" y="4679952"/>
-              <a:ext cx="1116459" cy="841256"/>
-            </a:xfrm>
-            <a:prstGeom prst="rect">
-              <a:avLst/>
-            </a:prstGeom>
-            <a:noFill/>
-            <a:ln w="12700" cap="flat">
-              <a:noFill/>
-              <a:miter lim="400000"/>
-            </a:ln>
-            <a:effectLst/>
-            <a:sp3d/>
-          </p:spPr>
-          <p:style>
-            <a:lnRef idx="0">
-              <a:scrgbClr r="0" g="0" b="0"/>
-            </a:lnRef>
-            <a:fillRef idx="0">
-              <a:scrgbClr r="0" g="0" b="0"/>
-            </a:fillRef>
-            <a:effectRef idx="0">
-              <a:scrgbClr r="0" g="0" b="0"/>
-            </a:effectRef>
-            <a:fontRef idx="none"/>
-          </p:style>
-          <p:txBody>
-            <a:bodyPr rot="0" spcFirstLastPara="1" vertOverflow="overflow" horzOverflow="overflow" vert="horz" wrap="none" lIns="50800" tIns="50800" rIns="50800" bIns="50800" numCol="1" spcCol="38100" rtlCol="0" anchor="ctr">
-              <a:spAutoFit/>
-            </a:bodyPr>
-            <a:lstStyle/>
-            <a:p>
-              <a:pPr marL="0" marR="0" indent="0" algn="ctr" defTabSz="819150" rtl="0" fontAlgn="auto" latinLnBrk="0" hangingPunct="0">
-                <a:lnSpc>
-                  <a:spcPct val="100000"/>
-                </a:lnSpc>
-                <a:spcBef>
-                  <a:spcPts val="0"/>
-                </a:spcBef>
-                <a:spcAft>
-                  <a:spcPts val="0"/>
-                </a:spcAft>
-                <a:buClrTx/>
-                <a:buSzTx/>
-                <a:buFontTx/>
-                <a:buNone/>
-                <a:tabLst/>
-              </a:pPr>
-              <a:r>
-                <a:rPr kumimoji="0" lang="en-CA" sz="2400" b="0" i="0" u="none" strike="noStrike" cap="none" spc="0" normalizeH="0" baseline="0" dirty="0">
-                  <a:ln>
-                    <a:noFill/>
-                  </a:ln>
-                  <a:solidFill>
-                    <a:srgbClr val="000000"/>
-                  </a:solidFill>
-                  <a:effectLst/>
-                  <a:uFillTx/>
-                  <a:latin typeface="Gill Sans"/>
-                  <a:ea typeface="Gill Sans"/>
-                  <a:cs typeface="Gill Sans"/>
-                  <a:sym typeface="Gill Sans"/>
-                </a:rPr>
-                <a:t>Kinesis </a:t>
-              </a:r>
-            </a:p>
-            <a:p>
-              <a:pPr marL="0" marR="0" indent="0" algn="ctr" defTabSz="819150" rtl="0" fontAlgn="auto" latinLnBrk="0" hangingPunct="0">
-                <a:lnSpc>
-                  <a:spcPct val="100000"/>
-                </a:lnSpc>
-                <a:spcBef>
-                  <a:spcPts val="0"/>
-                </a:spcBef>
-                <a:spcAft>
-                  <a:spcPts val="0"/>
-                </a:spcAft>
-                <a:buClrTx/>
-                <a:buSzTx/>
-                <a:buFontTx/>
-                <a:buNone/>
-                <a:tabLst/>
-              </a:pPr>
-              <a:r>
-                <a:rPr kumimoji="0" lang="en-CA" sz="2400" b="0" i="0" u="none" strike="noStrike" cap="none" spc="0" normalizeH="0" baseline="0" dirty="0">
-                  <a:ln>
-                    <a:noFill/>
-                  </a:ln>
-                  <a:solidFill>
-                    <a:srgbClr val="000000"/>
-                  </a:solidFill>
-                  <a:effectLst/>
-                  <a:uFillTx/>
-                  <a:latin typeface="Gill Sans"/>
-                  <a:ea typeface="Gill Sans"/>
-                  <a:cs typeface="Gill Sans"/>
-                  <a:sym typeface="Gill Sans"/>
-                </a:rPr>
-                <a:t>Streams</a:t>
-              </a:r>
-            </a:p>
-          </p:txBody>
-        </p:sp>
         <p:cxnSp>
           <p:nvCxnSpPr>
             <p:cNvPr id="31" name="Straight Arrow Connector 30">
@@ -5226,8 +5073,8 @@
           </p:nvCxnSpPr>
           <p:spPr bwMode="auto">
             <a:xfrm flipV="1">
-              <a:off x="5609579" y="2107079"/>
-              <a:ext cx="1835614" cy="642966"/>
+              <a:off x="5628422" y="2403332"/>
+              <a:ext cx="1877125" cy="420839"/>
             </a:xfrm>
             <a:prstGeom prst="straightConnector1">
               <a:avLst/>
@@ -5266,14 +5113,13 @@
             </p:cNvPr>
             <p:cNvCxnSpPr>
               <a:cxnSpLocks/>
-              <a:endCxn id="21" idx="1"/>
             </p:cNvCxnSpPr>
             <p:nvPr/>
           </p:nvCxnSpPr>
           <p:spPr bwMode="auto">
-            <a:xfrm flipV="1">
-              <a:off x="5671133" y="3101259"/>
-              <a:ext cx="1835614" cy="41931"/>
+            <a:xfrm>
+              <a:off x="5628422" y="3193102"/>
+              <a:ext cx="1977501" cy="391087"/>
             </a:xfrm>
             <a:prstGeom prst="straightConnector1">
               <a:avLst/>
@@ -5312,14 +5158,13 @@
             </p:cNvPr>
             <p:cNvCxnSpPr>
               <a:cxnSpLocks/>
-              <a:endCxn id="25" idx="1"/>
             </p:cNvCxnSpPr>
             <p:nvPr/>
           </p:nvCxnSpPr>
           <p:spPr bwMode="auto">
             <a:xfrm>
-              <a:off x="5549774" y="3503357"/>
-              <a:ext cx="2063330" cy="631346"/>
+              <a:off x="5480611" y="3676097"/>
+              <a:ext cx="2088366" cy="1230137"/>
             </a:xfrm>
             <a:prstGeom prst="straightConnector1">
               <a:avLst/>
@@ -5328,52 +5173,6 @@
               <a:solidFill>
                 <a:srgbClr val="003469"/>
               </a:solidFill>
-              <a:headEnd type="triangle" w="med" len="med"/>
-              <a:tailEnd type="triangle" w="med" len="med"/>
-            </a:ln>
-          </p:spPr>
-          <p:style>
-            <a:lnRef idx="1">
-              <a:schemeClr val="dk1"/>
-            </a:lnRef>
-            <a:fillRef idx="0">
-              <a:schemeClr val="dk1"/>
-            </a:fillRef>
-            <a:effectRef idx="0">
-              <a:schemeClr val="dk1"/>
-            </a:effectRef>
-            <a:fontRef idx="minor">
-              <a:schemeClr val="tx1"/>
-            </a:fontRef>
-          </p:style>
-        </p:cxnSp>
-        <p:cxnSp>
-          <p:nvCxnSpPr>
-            <p:cNvPr id="34" name="Straight Arrow Connector 33">
-              <a:extLst>
-                <a:ext uri="{FF2B5EF4-FFF2-40B4-BE49-F238E27FC236}">
-                  <a16:creationId xmlns:a16="http://schemas.microsoft.com/office/drawing/2014/main" id="{D5148E44-A528-46E7-8403-D1E876FD3B10}"/>
-                </a:ext>
-              </a:extLst>
-            </p:cNvPr>
-            <p:cNvCxnSpPr>
-              <a:cxnSpLocks/>
-            </p:cNvCxnSpPr>
-            <p:nvPr/>
-          </p:nvCxnSpPr>
-          <p:spPr bwMode="auto">
-            <a:xfrm>
-              <a:off x="5376846" y="3714810"/>
-              <a:ext cx="2148546" cy="1253929"/>
-            </a:xfrm>
-            <a:prstGeom prst="straightConnector1">
-              <a:avLst/>
-            </a:prstGeom>
-            <a:ln w="76200">
-              <a:solidFill>
-                <a:srgbClr val="003469"/>
-              </a:solidFill>
-              <a:prstDash val="sysDash"/>
               <a:headEnd type="triangle" w="med" len="med"/>
               <a:tailEnd type="triangle" w="med" len="med"/>
             </a:ln>
@@ -6204,7 +6003,7 @@
           <p:spPr>
             <a:xfrm>
               <a:off x="4099687" y="1339531"/>
-              <a:ext cx="1335109" cy="523220"/>
+              <a:ext cx="1114279" cy="523220"/>
             </a:xfrm>
             <a:prstGeom prst="rect">
               <a:avLst/>
@@ -6218,14 +6017,18 @@
             <a:lstStyle/>
             <a:p>
               <a:r>
+                <a:rPr lang="en-CA" sz="1400" dirty="0" err="1"/>
+                <a:t>PubSub</a:t>
+              </a:r>
+              <a:r>
                 <a:rPr lang="en-CA" sz="1400" dirty="0"/>
-                <a:t>Solace </a:t>
+                <a:t>+ </a:t>
               </a:r>
             </a:p>
             <a:p>
               <a:r>
                 <a:rPr lang="en-CA" sz="1400" dirty="0"/>
-                <a:t>message broker</a:t>
+                <a:t>event broker</a:t>
               </a:r>
             </a:p>
           </p:txBody>
@@ -6291,7 +6094,9 @@
             <a:prstGeom prst="roundRect">
               <a:avLst/>
             </a:prstGeom>
-            <a:noFill/>
+            <a:solidFill>
+              <a:srgbClr val="1DD783"/>
+            </a:solidFill>
             <a:ln>
               <a:solidFill>
                 <a:srgbClr val="1DD783"/>
@@ -6843,7 +6648,7 @@
           <p:spPr>
             <a:xfrm>
               <a:off x="3890104" y="2348730"/>
-              <a:ext cx="623889" cy="461665"/>
+              <a:ext cx="768159" cy="461665"/>
             </a:xfrm>
             <a:prstGeom prst="rect">
               <a:avLst/>
@@ -6857,8 +6662,12 @@
             <a:lstStyle/>
             <a:p>
               <a:r>
+                <a:rPr lang="en-CA" sz="1200" dirty="0" err="1"/>
+                <a:t>PubSub</a:t>
+              </a:r>
+              <a:r>
                 <a:rPr lang="en-CA" sz="1200" dirty="0"/>
-                <a:t>Solace </a:t>
+                <a:t>+ </a:t>
               </a:r>
             </a:p>
             <a:p>
@@ -6930,7 +6739,7 @@
           <p:spPr>
             <a:xfrm>
               <a:off x="4767242" y="2179263"/>
-              <a:ext cx="747512" cy="646331"/>
+              <a:ext cx="895117" cy="646331"/>
             </a:xfrm>
             <a:prstGeom prst="rect">
               <a:avLst/>
@@ -6957,7 +6766,7 @@
             <a:p>
               <a:r>
                 <a:rPr lang="en-CA" sz="1200" dirty="0"/>
-                <a:t>Endpoint</a:t>
+                <a:t>Point (RDP)</a:t>
               </a:r>
             </a:p>
           </p:txBody>
@@ -7022,8 +6831,8 @@
           </p:nvSpPr>
           <p:spPr>
             <a:xfrm>
-              <a:off x="5953050" y="1339531"/>
-              <a:ext cx="1442959" cy="738664"/>
+              <a:off x="5836492" y="2214778"/>
+              <a:ext cx="945900" cy="523220"/>
             </a:xfrm>
             <a:prstGeom prst="rect">
               <a:avLst/>
@@ -7031,21 +6840,10 @@
             <a:noFill/>
           </p:spPr>
           <p:txBody>
-            <a:bodyPr wrap="none" rtlCol="0">
+            <a:bodyPr wrap="square" rtlCol="0">
               <a:spAutoFit/>
             </a:bodyPr>
             <a:lstStyle/>
-            <a:p>
-              <a:r>
-                <a:rPr lang="en-CA" sz="1400" dirty="0"/>
-                <a:t>AWS </a:t>
-              </a:r>
-              <a:r>
-                <a:rPr lang="en-CA" sz="1400" dirty="0" err="1"/>
-                <a:t>APIGateway</a:t>
-              </a:r>
-              <a:endParaRPr lang="en-CA" sz="1400" dirty="0"/>
-            </a:p>
             <a:p>
               <a:r>
                 <a:rPr lang="en-CA" sz="1400" dirty="0"/>
@@ -7060,7 +6858,80 @@
             </a:p>
           </p:txBody>
         </p:sp>
+        <p:sp>
+          <p:nvSpPr>
+            <p:cNvPr id="43" name="TextBox 42">
+              <a:extLst>
+                <a:ext uri="{FF2B5EF4-FFF2-40B4-BE49-F238E27FC236}">
+                  <a16:creationId xmlns:a16="http://schemas.microsoft.com/office/drawing/2014/main" id="{228BF0D0-1CF4-46B6-91D3-969536299307}"/>
+                </a:ext>
+              </a:extLst>
+            </p:cNvPr>
+            <p:cNvSpPr txBox="1"/>
+            <p:nvPr/>
+          </p:nvSpPr>
+          <p:spPr>
+            <a:xfrm>
+              <a:off x="6180369" y="3398387"/>
+              <a:ext cx="837845" cy="523220"/>
+            </a:xfrm>
+            <a:prstGeom prst="rect">
+              <a:avLst/>
+            </a:prstGeom>
+            <a:noFill/>
+          </p:spPr>
+          <p:txBody>
+            <a:bodyPr wrap="square" rtlCol="0">
+              <a:spAutoFit/>
+            </a:bodyPr>
+            <a:lstStyle/>
+            <a:p>
+              <a:r>
+                <a:rPr lang="en-CA" sz="1400" dirty="0"/>
+                <a:t>AWS API Gateway</a:t>
+              </a:r>
+            </a:p>
+          </p:txBody>
+        </p:sp>
       </p:grpSp>
+      <p:cxnSp>
+        <p:nvCxnSpPr>
+          <p:cNvPr id="3" name="Straight Connector 2">
+            <a:extLst>
+              <a:ext uri="{FF2B5EF4-FFF2-40B4-BE49-F238E27FC236}">
+                <a16:creationId xmlns:a16="http://schemas.microsoft.com/office/drawing/2014/main" id="{934B136D-01F0-48EE-A289-B963FE467F1A}"/>
+              </a:ext>
+            </a:extLst>
+          </p:cNvPr>
+          <p:cNvCxnSpPr>
+            <a:cxnSpLocks/>
+          </p:cNvCxnSpPr>
+          <p:nvPr/>
+        </p:nvCxnSpPr>
+        <p:spPr>
+          <a:xfrm>
+            <a:off x="6072555" y="2715037"/>
+            <a:ext cx="0" cy="586562"/>
+          </a:xfrm>
+          <a:prstGeom prst="line">
+            <a:avLst/>
+          </a:prstGeom>
+        </p:spPr>
+        <p:style>
+          <a:lnRef idx="1">
+            <a:schemeClr val="accent1"/>
+          </a:lnRef>
+          <a:fillRef idx="0">
+            <a:schemeClr val="accent1"/>
+          </a:fillRef>
+          <a:effectRef idx="0">
+            <a:schemeClr val="accent1"/>
+          </a:effectRef>
+          <a:fontRef idx="minor">
+            <a:schemeClr val="tx1"/>
+          </a:fontRef>
+        </p:style>
+      </p:cxnSp>
     </p:spTree>
     <p:extLst>
       <p:ext uri="{BB962C8B-B14F-4D97-AF65-F5344CB8AC3E}">
@@ -7093,10 +6964,10 @@
       </p:grpSpPr>
       <p:grpSp>
         <p:nvGrpSpPr>
-          <p:cNvPr id="2" name="Group 1">
+          <p:cNvPr id="13" name="Group 12">
             <a:extLst>
               <a:ext uri="{FF2B5EF4-FFF2-40B4-BE49-F238E27FC236}">
-                <a16:creationId xmlns:a16="http://schemas.microsoft.com/office/drawing/2014/main" id="{0A5C4AAE-228E-4E67-9742-CD8515782C60}"/>
+                <a16:creationId xmlns:a16="http://schemas.microsoft.com/office/drawing/2014/main" id="{2BF7882E-DED4-4559-810E-70769D83AE77}"/>
               </a:ext>
             </a:extLst>
           </p:cNvPr>
@@ -7105,12 +6976,42 @@
         </p:nvGrpSpPr>
         <p:grpSpPr>
           <a:xfrm>
-            <a:off x="1040096" y="1598750"/>
-            <a:ext cx="7624619" cy="3024230"/>
-            <a:chOff x="1040096" y="1598750"/>
-            <a:chExt cx="7624619" cy="3024230"/>
+            <a:off x="1315588" y="447788"/>
+            <a:ext cx="10245878" cy="5269333"/>
+            <a:chOff x="1268696" y="158619"/>
+            <a:chExt cx="10245878" cy="5269333"/>
           </a:xfrm>
         </p:grpSpPr>
+        <p:pic>
+          <p:nvPicPr>
+            <p:cNvPr id="7" name="Picture 6">
+              <a:extLst>
+                <a:ext uri="{FF2B5EF4-FFF2-40B4-BE49-F238E27FC236}">
+                  <a16:creationId xmlns:a16="http://schemas.microsoft.com/office/drawing/2014/main" id="{380508AD-6A7A-4652-8DC7-A2E734D9362C}"/>
+                </a:ext>
+              </a:extLst>
+            </p:cNvPr>
+            <p:cNvPicPr>
+              <a:picLocks noChangeAspect="1"/>
+            </p:cNvPicPr>
+            <p:nvPr/>
+          </p:nvPicPr>
+          <p:blipFill>
+            <a:blip r:embed="rId2"/>
+            <a:stretch>
+              <a:fillRect/>
+            </a:stretch>
+          </p:blipFill>
+          <p:spPr>
+            <a:xfrm>
+              <a:off x="2546033" y="158619"/>
+              <a:ext cx="8968541" cy="5269333"/>
+            </a:xfrm>
+            <a:prstGeom prst="rect">
+              <a:avLst/>
+            </a:prstGeom>
+          </p:spPr>
+        </p:pic>
         <p:grpSp>
           <p:nvGrpSpPr>
             <p:cNvPr id="32" name="Group 31">
@@ -7125,10 +7026,10 @@
           </p:nvGrpSpPr>
           <p:grpSpPr>
             <a:xfrm>
-              <a:off x="1040096" y="1598750"/>
-              <a:ext cx="7624619" cy="3024230"/>
-              <a:chOff x="1040096" y="1598750"/>
-              <a:chExt cx="7624619" cy="3024230"/>
+              <a:off x="1268696" y="1650493"/>
+              <a:ext cx="9035510" cy="3427599"/>
+              <a:chOff x="354296" y="1650493"/>
+              <a:chExt cx="9035510" cy="3427599"/>
             </a:xfrm>
           </p:grpSpPr>
           <p:pic>
@@ -7146,7 +7047,7 @@
               <p:nvPr/>
             </p:nvPicPr>
             <p:blipFill>
-              <a:blip r:embed="rId2" cstate="screen">
+              <a:blip r:embed="rId3" cstate="screen">
                 <a:extLst>
                   <a:ext uri="{28A0092B-C50C-407E-A947-70E740481C1C}">
                     <a14:useLocalDpi xmlns:a14="http://schemas.microsoft.com/office/drawing/2010/main"/>
@@ -7170,78 +7071,6 @@
           </p:pic>
           <p:pic>
             <p:nvPicPr>
-              <p:cNvPr id="9" name="Picture 8">
-                <a:extLst>
-                  <a:ext uri="{FF2B5EF4-FFF2-40B4-BE49-F238E27FC236}">
-                    <a16:creationId xmlns:a16="http://schemas.microsoft.com/office/drawing/2014/main" id="{A4F0757E-E158-49EF-BE66-AA660102A140}"/>
-                  </a:ext>
-                </a:extLst>
-              </p:cNvPr>
-              <p:cNvPicPr>
-                <a:picLocks noChangeAspect="1"/>
-              </p:cNvPicPr>
-              <p:nvPr/>
-            </p:nvPicPr>
-            <p:blipFill>
-              <a:blip r:embed="rId3">
-                <a:extLst>
-                  <a:ext uri="{28A0092B-C50C-407E-A947-70E740481C1C}">
-                    <a14:useLocalDpi xmlns:a14="http://schemas.microsoft.com/office/drawing/2010/main" val="0"/>
-                  </a:ext>
-                </a:extLst>
-              </a:blip>
-              <a:stretch>
-                <a:fillRect/>
-              </a:stretch>
-            </p:blipFill>
-            <p:spPr>
-              <a:xfrm>
-                <a:off x="5621046" y="2985175"/>
-                <a:ext cx="436327" cy="625640"/>
-              </a:xfrm>
-              <a:prstGeom prst="rect">
-                <a:avLst/>
-              </a:prstGeom>
-            </p:spPr>
-          </p:pic>
-          <p:pic>
-            <p:nvPicPr>
-              <p:cNvPr id="11" name="Picture 10">
-                <a:extLst>
-                  <a:ext uri="{FF2B5EF4-FFF2-40B4-BE49-F238E27FC236}">
-                    <a16:creationId xmlns:a16="http://schemas.microsoft.com/office/drawing/2014/main" id="{A177B99B-A73A-4F1C-80D1-432DA26D2F64}"/>
-                  </a:ext>
-                </a:extLst>
-              </p:cNvPr>
-              <p:cNvPicPr>
-                <a:picLocks noChangeAspect="1"/>
-              </p:cNvPicPr>
-              <p:nvPr/>
-            </p:nvPicPr>
-            <p:blipFill>
-              <a:blip r:embed="rId4">
-                <a:extLst>
-                  <a:ext uri="{28A0092B-C50C-407E-A947-70E740481C1C}">
-                    <a14:useLocalDpi xmlns:a14="http://schemas.microsoft.com/office/drawing/2010/main" val="0"/>
-                  </a:ext>
-                </a:extLst>
-              </a:blip>
-              <a:stretch>
-                <a:fillRect/>
-              </a:stretch>
-            </p:blipFill>
-            <p:spPr>
-              <a:xfrm>
-                <a:off x="6238042" y="2550629"/>
-                <a:ext cx="335701" cy="636066"/>
-              </a:xfrm>
-              <a:prstGeom prst="rect">
-                <a:avLst/>
-              </a:prstGeom>
-            </p:spPr>
-          </p:pic>
-          <p:pic>
-            <p:nvPicPr>
               <p:cNvPr id="15" name="Picture 14">
                 <a:extLst>
                   <a:ext uri="{FF2B5EF4-FFF2-40B4-BE49-F238E27FC236}">
@@ -7255,7 +7084,7 @@
               <p:nvPr/>
             </p:nvPicPr>
             <p:blipFill>
-              <a:blip r:embed="rId5" cstate="print">
+              <a:blip r:embed="rId4" cstate="print">
                 <a:extLst>
                   <a:ext uri="{28A0092B-C50C-407E-A947-70E740481C1C}">
                     <a14:useLocalDpi xmlns:a14="http://schemas.microsoft.com/office/drawing/2010/main"/>
@@ -7268,7 +7097,7 @@
             </p:blipFill>
             <p:spPr>
               <a:xfrm>
-                <a:off x="1040096" y="3055499"/>
+                <a:off x="354296" y="3055499"/>
                 <a:ext cx="1325716" cy="505917"/>
               </a:xfrm>
               <a:prstGeom prst="rect">
@@ -7294,8 +7123,8 @@
             </p:nvCxnSpPr>
             <p:spPr bwMode="auto">
               <a:xfrm flipV="1">
-                <a:off x="2365812" y="3298172"/>
-                <a:ext cx="811697" cy="10286"/>
+                <a:off x="1680012" y="3298172"/>
+                <a:ext cx="1497497" cy="10286"/>
               </a:xfrm>
               <a:prstGeom prst="straightConnector1">
                 <a:avLst/>
@@ -7341,8 +7170,8 @@
             </p:nvCxnSpPr>
             <p:spPr bwMode="auto">
               <a:xfrm flipV="1">
-                <a:off x="4248314" y="3297995"/>
-                <a:ext cx="1372732" cy="177"/>
+                <a:off x="4248314" y="3008767"/>
+                <a:ext cx="1347477" cy="289405"/>
               </a:xfrm>
               <a:prstGeom prst="straightConnector1">
                 <a:avLst/>
@@ -7370,42 +7199,6 @@
               </a:fontRef>
             </p:style>
           </p:cxnSp>
-          <p:pic>
-            <p:nvPicPr>
-              <p:cNvPr id="5" name="Picture 4">
-                <a:extLst>
-                  <a:ext uri="{FF2B5EF4-FFF2-40B4-BE49-F238E27FC236}">
-                    <a16:creationId xmlns:a16="http://schemas.microsoft.com/office/drawing/2014/main" id="{C6B31AA8-A2A8-4259-9E8E-D784C70AA78E}"/>
-                  </a:ext>
-                </a:extLst>
-              </p:cNvPr>
-              <p:cNvPicPr>
-                <a:picLocks noChangeAspect="1"/>
-              </p:cNvPicPr>
-              <p:nvPr/>
-            </p:nvPicPr>
-            <p:blipFill>
-              <a:blip r:embed="rId6">
-                <a:extLst>
-                  <a:ext uri="{28A0092B-C50C-407E-A947-70E740481C1C}">
-                    <a14:useLocalDpi xmlns:a14="http://schemas.microsoft.com/office/drawing/2010/main" val="0"/>
-                  </a:ext>
-                </a:extLst>
-              </a:blip>
-              <a:stretch>
-                <a:fillRect/>
-              </a:stretch>
-            </p:blipFill>
-            <p:spPr>
-              <a:xfrm>
-                <a:off x="4734331" y="3015876"/>
-                <a:ext cx="538195" cy="564237"/>
-              </a:xfrm>
-              <a:prstGeom prst="rect">
-                <a:avLst/>
-              </a:prstGeom>
-            </p:spPr>
-          </p:pic>
           <p:cxnSp>
             <p:nvCxnSpPr>
               <p:cNvPr id="20" name="Straight Arrow Connector 19">
@@ -7423,8 +7216,8 @@
             </p:nvCxnSpPr>
             <p:spPr bwMode="auto">
               <a:xfrm>
-                <a:off x="6057373" y="3297995"/>
-                <a:ext cx="686366" cy="16993"/>
+                <a:off x="6032118" y="3008767"/>
+                <a:ext cx="1019702" cy="10463"/>
               </a:xfrm>
               <a:prstGeom prst="straightConnector1">
                 <a:avLst/>
@@ -7468,10 +7261,10 @@
             </p:nvGrpSpPr>
             <p:grpSpPr bwMode="auto">
               <a:xfrm>
-                <a:off x="3182079" y="2643203"/>
-                <a:ext cx="2090447" cy="1278164"/>
-                <a:chOff x="545458" y="4783771"/>
-                <a:chExt cx="2293787" cy="1733798"/>
+                <a:off x="2785332" y="2568746"/>
+                <a:ext cx="2487194" cy="1385324"/>
+                <a:chOff x="110119" y="4682776"/>
+                <a:chExt cx="2729126" cy="1879159"/>
               </a:xfrm>
             </p:grpSpPr>
             <p:sp>
@@ -7488,7 +7281,7 @@
               </p:nvSpPr>
               <p:spPr>
                 <a:xfrm>
-                  <a:off x="545458" y="4783771"/>
+                  <a:off x="545458" y="4828137"/>
                   <a:ext cx="2293787" cy="1733798"/>
                 </a:xfrm>
                 <a:prstGeom prst="roundRect">
@@ -7499,9 +7292,9 @@
                 <a:noFill/>
                 <a:ln w="19050">
                   <a:solidFill>
-                    <a:schemeClr val="tx1"/>
+                    <a:srgbClr val="0070C0"/>
                   </a:solidFill>
-                  <a:prstDash val="solid"/>
+                  <a:prstDash val="dash"/>
                 </a:ln>
                 <a:effectLst/>
               </p:spPr>
@@ -7566,10 +7359,76 @@
                 </a:prstGeom>
                 <a:noFill/>
                 <a:ln w="19050">
+                  <a:noFill/>
+                  <a:prstDash val="lgDash"/>
+                </a:ln>
+                <a:effectLst/>
+              </p:spPr>
+              <p:style>
+                <a:lnRef idx="1">
+                  <a:schemeClr val="accent1"/>
+                </a:lnRef>
+                <a:fillRef idx="3">
+                  <a:schemeClr val="accent1"/>
+                </a:fillRef>
+                <a:effectRef idx="2">
+                  <a:schemeClr val="accent1"/>
+                </a:effectRef>
+                <a:fontRef idx="minor">
+                  <a:schemeClr val="lt1"/>
+                </a:fontRef>
+              </p:style>
+              <p:txBody>
+                <a:bodyPr anchor="ctr"/>
+                <a:lstStyle/>
+                <a:p>
+                  <a:pPr algn="ctr" fontAlgn="auto">
+                    <a:spcBef>
+                      <a:spcPts val="0"/>
+                    </a:spcBef>
+                    <a:spcAft>
+                      <a:spcPts val="0"/>
+                    </a:spcAft>
+                    <a:defRPr/>
+                  </a:pPr>
+                  <a:endParaRPr lang="en-US" dirty="0">
+                    <a:solidFill>
+                      <a:schemeClr val="tx1"/>
+                    </a:solidFill>
+                    <a:latin typeface="Helvetica Neue"/>
+                    <a:cs typeface="Helvetica Neue"/>
+                  </a:endParaRPr>
+                </a:p>
+              </p:txBody>
+            </p:sp>
+            <p:sp>
+              <p:nvSpPr>
+                <p:cNvPr id="35" name="Rounded Rectangle 14">
+                  <a:extLst>
+                    <a:ext uri="{FF2B5EF4-FFF2-40B4-BE49-F238E27FC236}">
+                      <a16:creationId xmlns:a16="http://schemas.microsoft.com/office/drawing/2014/main" id="{28A06686-7922-4DDF-AAE1-E232C327F7D0}"/>
+                    </a:ext>
+                  </a:extLst>
+                </p:cNvPr>
+                <p:cNvSpPr/>
+                <p:nvPr/>
+              </p:nvSpPr>
+              <p:spPr>
+                <a:xfrm>
+                  <a:off x="110119" y="4682776"/>
+                  <a:ext cx="1655510" cy="1733798"/>
+                </a:xfrm>
+                <a:prstGeom prst="roundRect">
+                  <a:avLst>
+                    <a:gd name="adj" fmla="val 9818"/>
+                  </a:avLst>
+                </a:prstGeom>
+                <a:noFill/>
+                <a:ln w="19050">
                   <a:solidFill>
-                    <a:srgbClr val="FF0000"/>
+                    <a:srgbClr val="0070C0"/>
                   </a:solidFill>
-                  <a:prstDash val="lgDash"/>
+                  <a:prstDash val="dash"/>
                 </a:ln>
                 <a:effectLst/>
               </p:spPr>
@@ -7694,7 +7553,7 @@
               <p:nvPr/>
             </p:nvPicPr>
             <p:blipFill>
-              <a:blip r:embed="rId7"/>
+              <a:blip r:embed="rId5"/>
               <a:stretch>
                 <a:fillRect/>
               </a:stretch>
@@ -7723,7 +7582,7 @@
             </p:nvSpPr>
             <p:spPr>
               <a:xfrm>
-                <a:off x="1053228" y="3561416"/>
+                <a:off x="527536" y="3594098"/>
                 <a:ext cx="1383584" cy="738664"/>
               </a:xfrm>
               <a:prstGeom prst="rect">
@@ -7770,7 +7629,7 @@
             </p:nvSpPr>
             <p:spPr>
               <a:xfrm>
-                <a:off x="6573743" y="3769757"/>
+                <a:off x="7772504" y="2824916"/>
                 <a:ext cx="1617302" cy="523220"/>
               </a:xfrm>
               <a:prstGeom prst="rect">
@@ -7811,13 +7670,17 @@
             </p:nvSpPr>
             <p:spPr>
               <a:xfrm>
-                <a:off x="6082854" y="1627299"/>
+                <a:off x="6416496" y="1650493"/>
                 <a:ext cx="2581861" cy="738664"/>
               </a:xfrm>
               <a:prstGeom prst="rect">
                 <a:avLst/>
               </a:prstGeom>
-              <a:noFill/>
+              <a:solidFill>
+                <a:schemeClr val="bg1">
+                  <a:alpha val="80000"/>
+                </a:schemeClr>
+              </a:solidFill>
             </p:spPr>
             <p:txBody>
               <a:bodyPr wrap="none" rtlCol="0">
@@ -7858,13 +7721,20 @@
             </p:nvSpPr>
             <p:spPr>
               <a:xfrm>
-                <a:off x="3919937" y="1598750"/>
-                <a:ext cx="1736694" cy="738664"/>
+                <a:off x="5067175" y="4123985"/>
+                <a:ext cx="1831912" cy="954107"/>
               </a:xfrm>
               <a:prstGeom prst="rect">
                 <a:avLst/>
               </a:prstGeom>
-              <a:noFill/>
+              <a:solidFill>
+                <a:schemeClr val="bg1">
+                  <a:alpha val="80000"/>
+                </a:schemeClr>
+              </a:solidFill>
+              <a:ln>
+                <a:noFill/>
+              </a:ln>
             </p:spPr>
             <p:txBody>
               <a:bodyPr wrap="none" rtlCol="0">
@@ -7874,24 +7744,26 @@
               <a:p>
                 <a:r>
                   <a:rPr lang="en-CA" sz="1400" dirty="0"/>
-                  <a:t>Internal </a:t>
-                </a:r>
-                <a:r>
-                  <a:rPr lang="en-CA" sz="1400" dirty="0" err="1"/>
-                  <a:t>APIGateway</a:t>
-                </a:r>
-                <a:endParaRPr lang="en-CA" sz="1400" dirty="0"/>
-              </a:p>
-              <a:p>
-                <a:r>
-                  <a:rPr lang="en-CA" sz="1400" dirty="0"/>
-                  <a:t>w/ VPC endpoint in </a:t>
+                  <a:t>Internal API Gateway</a:t>
                 </a:r>
               </a:p>
               <a:p>
                 <a:r>
                   <a:rPr lang="en-CA" sz="1400" dirty="0"/>
-                  <a:t>closed security group</a:t>
+                  <a:t>w/ VPC Endpoint in </a:t>
+                </a:r>
+              </a:p>
+              <a:p>
+                <a:r>
+                  <a:rPr lang="en-CA" sz="1400" dirty="0"/>
+                  <a:t>closed security group,</a:t>
+                </a:r>
+                <a:br>
+                  <a:rPr lang="en-CA" sz="1400" dirty="0"/>
+                </a:br>
+                <a:r>
+                  <a:rPr lang="en-CA" sz="1400" dirty="0"/>
+                  <a:t>for each AWS resource</a:t>
                 </a:r>
               </a:p>
             </p:txBody>
@@ -7910,8 +7782,57 @@
             </p:nvSpPr>
             <p:spPr>
               <a:xfrm>
-                <a:off x="2941000" y="4099760"/>
-                <a:ext cx="2076594" cy="523220"/>
+                <a:off x="2761250" y="4099760"/>
+                <a:ext cx="2007393" cy="738664"/>
+              </a:xfrm>
+              <a:prstGeom prst="rect">
+                <a:avLst/>
+              </a:prstGeom>
+              <a:solidFill>
+                <a:schemeClr val="bg1">
+                  <a:alpha val="80000"/>
+                </a:schemeClr>
+              </a:solidFill>
+            </p:spPr>
+            <p:txBody>
+              <a:bodyPr wrap="square" rtlCol="0">
+                <a:spAutoFit/>
+              </a:bodyPr>
+              <a:lstStyle/>
+              <a:p>
+                <a:r>
+                  <a:rPr lang="en-CA" sz="1400" dirty="0" err="1"/>
+                  <a:t>PubSub</a:t>
+                </a:r>
+                <a:r>
+                  <a:rPr lang="en-CA" sz="1400" dirty="0"/>
+                  <a:t>+ event broker</a:t>
+                </a:r>
+              </a:p>
+              <a:p>
+                <a:r>
+                  <a:rPr lang="en-CA" sz="1400" dirty="0"/>
+                  <a:t>w/ REST Delivery Point (RDP) to API GW</a:t>
+                </a:r>
+              </a:p>
+            </p:txBody>
+          </p:sp>
+          <p:sp>
+            <p:nvSpPr>
+              <p:cNvPr id="34" name="TextBox 33">
+                <a:extLst>
+                  <a:ext uri="{FF2B5EF4-FFF2-40B4-BE49-F238E27FC236}">
+                    <a16:creationId xmlns:a16="http://schemas.microsoft.com/office/drawing/2014/main" id="{44121118-FCDB-48E2-A796-F022D3757E03}"/>
+                  </a:ext>
+                </a:extLst>
+              </p:cNvPr>
+              <p:cNvSpPr txBox="1"/>
+              <p:nvPr/>
+            </p:nvSpPr>
+            <p:spPr>
+              <a:xfrm>
+                <a:off x="4300550" y="2418338"/>
+                <a:ext cx="1552348" cy="307777"/>
               </a:xfrm>
               <a:prstGeom prst="rect">
                 <a:avLst/>
@@ -7926,18 +7847,507 @@
               <a:p>
                 <a:r>
                   <a:rPr lang="en-CA" sz="1400" dirty="0"/>
-                  <a:t>Solace message broker</a:t>
+                  <a:t>API Security Group</a:t>
+                </a:r>
+              </a:p>
+            </p:txBody>
+          </p:sp>
+          <p:sp>
+            <p:nvSpPr>
+              <p:cNvPr id="36" name="TextBox 35">
+                <a:extLst>
+                  <a:ext uri="{FF2B5EF4-FFF2-40B4-BE49-F238E27FC236}">
+                    <a16:creationId xmlns:a16="http://schemas.microsoft.com/office/drawing/2014/main" id="{89AA221B-4899-43E9-AA2C-2DDFCA7E4982}"/>
+                  </a:ext>
+                </a:extLst>
+              </p:cNvPr>
+              <p:cNvSpPr txBox="1"/>
+              <p:nvPr/>
+            </p:nvSpPr>
+            <p:spPr>
+              <a:xfrm>
+                <a:off x="1592670" y="2191252"/>
+                <a:ext cx="1270220" cy="523220"/>
+              </a:xfrm>
+              <a:prstGeom prst="rect">
+                <a:avLst/>
+              </a:prstGeom>
+              <a:noFill/>
+            </p:spPr>
+            <p:txBody>
+              <a:bodyPr wrap="none" rtlCol="0">
+                <a:spAutoFit/>
+              </a:bodyPr>
+              <a:lstStyle/>
+              <a:p>
+                <a:r>
+                  <a:rPr lang="en-CA" sz="1400" dirty="0"/>
+                  <a:t>Broker Access</a:t>
                 </a:r>
               </a:p>
               <a:p>
                 <a:r>
                   <a:rPr lang="en-CA" sz="1400" dirty="0"/>
-                  <a:t>w/ Rest Delivery Endpoint</a:t>
+                  <a:t>Security Group</a:t>
+                </a:r>
+              </a:p>
+            </p:txBody>
+          </p:sp>
+          <p:sp>
+            <p:nvSpPr>
+              <p:cNvPr id="37" name="TextBox 36">
+                <a:extLst>
+                  <a:ext uri="{FF2B5EF4-FFF2-40B4-BE49-F238E27FC236}">
+                    <a16:creationId xmlns:a16="http://schemas.microsoft.com/office/drawing/2014/main" id="{85A67F1B-8897-4D95-AF88-8D5B3F02FAB6}"/>
+                  </a:ext>
+                </a:extLst>
+              </p:cNvPr>
+              <p:cNvSpPr txBox="1"/>
+              <p:nvPr/>
+            </p:nvSpPr>
+            <p:spPr>
+              <a:xfrm>
+                <a:off x="4292231" y="2077088"/>
+                <a:ext cx="476412" cy="307777"/>
+              </a:xfrm>
+              <a:prstGeom prst="rect">
+                <a:avLst/>
+              </a:prstGeom>
+              <a:noFill/>
+            </p:spPr>
+            <p:txBody>
+              <a:bodyPr wrap="none" rtlCol="0">
+                <a:spAutoFit/>
+              </a:bodyPr>
+              <a:lstStyle/>
+              <a:p>
+                <a:r>
+                  <a:rPr lang="en-CA" sz="1400" dirty="0"/>
+                  <a:t>VPC</a:t>
+                </a:r>
+              </a:p>
+            </p:txBody>
+          </p:sp>
+          <p:pic>
+            <p:nvPicPr>
+              <p:cNvPr id="11" name="Picture 10">
+                <a:extLst>
+                  <a:ext uri="{FF2B5EF4-FFF2-40B4-BE49-F238E27FC236}">
+                    <a16:creationId xmlns:a16="http://schemas.microsoft.com/office/drawing/2014/main" id="{A177B99B-A73A-4F1C-80D1-432DA26D2F64}"/>
+                  </a:ext>
+                </a:extLst>
+              </p:cNvPr>
+              <p:cNvPicPr>
+                <a:picLocks noChangeAspect="1"/>
+              </p:cNvPicPr>
+              <p:nvPr/>
+            </p:nvPicPr>
+            <p:blipFill>
+              <a:blip r:embed="rId6">
+                <a:extLst>
+                  <a:ext uri="{28A0092B-C50C-407E-A947-70E740481C1C}">
+                    <a14:useLocalDpi xmlns:a14="http://schemas.microsoft.com/office/drawing/2010/main" val="0"/>
+                  </a:ext>
+                </a:extLst>
+              </a:blip>
+              <a:stretch>
+                <a:fillRect/>
+              </a:stretch>
+            </p:blipFill>
+            <p:spPr>
+              <a:xfrm>
+                <a:off x="6316288" y="2316505"/>
+                <a:ext cx="335701" cy="636066"/>
+              </a:xfrm>
+              <a:prstGeom prst="rect">
+                <a:avLst/>
+              </a:prstGeom>
+            </p:spPr>
+          </p:pic>
+          <p:pic>
+            <p:nvPicPr>
+              <p:cNvPr id="38" name="Picture 37">
+                <a:extLst>
+                  <a:ext uri="{FF2B5EF4-FFF2-40B4-BE49-F238E27FC236}">
+                    <a16:creationId xmlns:a16="http://schemas.microsoft.com/office/drawing/2014/main" id="{8B4640CB-CA35-43BA-B776-CCC6FBEFEF38}"/>
+                  </a:ext>
+                </a:extLst>
+              </p:cNvPr>
+              <p:cNvPicPr>
+                <a:picLocks noChangeAspect="1"/>
+              </p:cNvPicPr>
+              <p:nvPr/>
+            </p:nvPicPr>
+            <p:blipFill>
+              <a:blip r:embed="rId7">
+                <a:extLst>
+                  <a:ext uri="{28A0092B-C50C-407E-A947-70E740481C1C}">
+                    <a14:useLocalDpi xmlns:a14="http://schemas.microsoft.com/office/drawing/2010/main" val="0"/>
+                  </a:ext>
+                </a:extLst>
+              </a:blip>
+              <a:stretch>
+                <a:fillRect/>
+              </a:stretch>
+            </p:blipFill>
+            <p:spPr>
+              <a:xfrm>
+                <a:off x="5666670" y="3411640"/>
+                <a:ext cx="436327" cy="625640"/>
+              </a:xfrm>
+              <a:prstGeom prst="rect">
+                <a:avLst/>
+              </a:prstGeom>
+            </p:spPr>
+          </p:pic>
+          <p:pic>
+            <p:nvPicPr>
+              <p:cNvPr id="9" name="Picture 8">
+                <a:extLst>
+                  <a:ext uri="{FF2B5EF4-FFF2-40B4-BE49-F238E27FC236}">
+                    <a16:creationId xmlns:a16="http://schemas.microsoft.com/office/drawing/2014/main" id="{A4F0757E-E158-49EF-BE66-AA660102A140}"/>
+                  </a:ext>
+                </a:extLst>
+              </p:cNvPr>
+              <p:cNvPicPr>
+                <a:picLocks noChangeAspect="1"/>
+              </p:cNvPicPr>
+              <p:nvPr/>
+            </p:nvPicPr>
+            <p:blipFill>
+              <a:blip r:embed="rId7">
+                <a:extLst>
+                  <a:ext uri="{28A0092B-C50C-407E-A947-70E740481C1C}">
+                    <a14:useLocalDpi xmlns:a14="http://schemas.microsoft.com/office/drawing/2010/main" val="0"/>
+                  </a:ext>
+                </a:extLst>
+              </a:blip>
+              <a:stretch>
+                <a:fillRect/>
+              </a:stretch>
+            </p:blipFill>
+            <p:spPr>
+              <a:xfrm>
+                <a:off x="5595791" y="2695947"/>
+                <a:ext cx="436327" cy="625640"/>
+              </a:xfrm>
+              <a:prstGeom prst="rect">
+                <a:avLst/>
+              </a:prstGeom>
+            </p:spPr>
+          </p:pic>
+          <p:cxnSp>
+            <p:nvCxnSpPr>
+              <p:cNvPr id="40" name="Straight Arrow Connector 39">
+                <a:extLst>
+                  <a:ext uri="{FF2B5EF4-FFF2-40B4-BE49-F238E27FC236}">
+                    <a16:creationId xmlns:a16="http://schemas.microsoft.com/office/drawing/2014/main" id="{7472B029-31A5-495B-8EF4-D8D715C2D69C}"/>
+                  </a:ext>
+                </a:extLst>
+              </p:cNvPr>
+              <p:cNvCxnSpPr>
+                <a:cxnSpLocks/>
+              </p:cNvCxnSpPr>
+              <p:nvPr/>
+            </p:nvCxnSpPr>
+            <p:spPr bwMode="auto">
+              <a:xfrm>
+                <a:off x="4266679" y="3357122"/>
+                <a:ext cx="1430944" cy="382171"/>
+              </a:xfrm>
+              <a:prstGeom prst="straightConnector1">
+                <a:avLst/>
+              </a:prstGeom>
+              <a:ln w="76200">
+                <a:solidFill>
+                  <a:srgbClr val="003469"/>
+                </a:solidFill>
+                <a:headEnd type="triangle" w="med" len="med"/>
+                <a:tailEnd type="triangle" w="med" len="med"/>
+              </a:ln>
+            </p:spPr>
+            <p:style>
+              <a:lnRef idx="1">
+                <a:schemeClr val="dk1"/>
+              </a:lnRef>
+              <a:fillRef idx="0">
+                <a:schemeClr val="dk1"/>
+              </a:fillRef>
+              <a:effectRef idx="0">
+                <a:schemeClr val="dk1"/>
+              </a:effectRef>
+              <a:fontRef idx="minor">
+                <a:schemeClr val="tx1"/>
+              </a:fontRef>
+            </p:style>
+          </p:cxnSp>
+          <p:pic>
+            <p:nvPicPr>
+              <p:cNvPr id="5" name="Picture 4">
+                <a:extLst>
+                  <a:ext uri="{FF2B5EF4-FFF2-40B4-BE49-F238E27FC236}">
+                    <a16:creationId xmlns:a16="http://schemas.microsoft.com/office/drawing/2014/main" id="{C6B31AA8-A2A8-4259-9E8E-D784C70AA78E}"/>
+                  </a:ext>
+                </a:extLst>
+              </p:cNvPr>
+              <p:cNvPicPr>
+                <a:picLocks noChangeAspect="1"/>
+              </p:cNvPicPr>
+              <p:nvPr/>
+            </p:nvPicPr>
+            <p:blipFill>
+              <a:blip r:embed="rId8">
+                <a:extLst>
+                  <a:ext uri="{28A0092B-C50C-407E-A947-70E740481C1C}">
+                    <a14:useLocalDpi xmlns:a14="http://schemas.microsoft.com/office/drawing/2010/main" val="0"/>
+                  </a:ext>
+                </a:extLst>
+              </a:blip>
+              <a:stretch>
+                <a:fillRect/>
+              </a:stretch>
+            </p:blipFill>
+            <p:spPr>
+              <a:xfrm>
+                <a:off x="4726042" y="3054158"/>
+                <a:ext cx="538195" cy="564237"/>
+              </a:xfrm>
+              <a:prstGeom prst="rect">
+                <a:avLst/>
+              </a:prstGeom>
+            </p:spPr>
+          </p:pic>
+          <p:cxnSp>
+            <p:nvCxnSpPr>
+              <p:cNvPr id="41" name="Straight Arrow Connector 40">
+                <a:extLst>
+                  <a:ext uri="{FF2B5EF4-FFF2-40B4-BE49-F238E27FC236}">
+                    <a16:creationId xmlns:a16="http://schemas.microsoft.com/office/drawing/2014/main" id="{FF31D333-6077-468C-8755-A378298F24B7}"/>
+                  </a:ext>
+                </a:extLst>
+              </p:cNvPr>
+              <p:cNvCxnSpPr>
+                <a:cxnSpLocks/>
+              </p:cNvCxnSpPr>
+              <p:nvPr/>
+            </p:nvCxnSpPr>
+            <p:spPr bwMode="auto">
+              <a:xfrm>
+                <a:off x="6139514" y="3762975"/>
+                <a:ext cx="1019702" cy="10463"/>
+              </a:xfrm>
+              <a:prstGeom prst="straightConnector1">
+                <a:avLst/>
+              </a:prstGeom>
+              <a:ln w="76200">
+                <a:solidFill>
+                  <a:srgbClr val="003469"/>
+                </a:solidFill>
+                <a:headEnd type="triangle" w="med" len="med"/>
+                <a:tailEnd type="triangle" w="med" len="med"/>
+              </a:ln>
+            </p:spPr>
+            <p:style>
+              <a:lnRef idx="1">
+                <a:schemeClr val="dk1"/>
+              </a:lnRef>
+              <a:fillRef idx="0">
+                <a:schemeClr val="dk1"/>
+              </a:fillRef>
+              <a:effectRef idx="0">
+                <a:schemeClr val="dk1"/>
+              </a:effectRef>
+              <a:fontRef idx="minor">
+                <a:schemeClr val="tx1"/>
+              </a:fontRef>
+            </p:style>
+          </p:cxnSp>
+          <p:pic>
+            <p:nvPicPr>
+              <p:cNvPr id="42" name="Picture 41">
+                <a:extLst>
+                  <a:ext uri="{FF2B5EF4-FFF2-40B4-BE49-F238E27FC236}">
+                    <a16:creationId xmlns:a16="http://schemas.microsoft.com/office/drawing/2014/main" id="{076A19FD-1C2A-43D5-BF43-FF952BC1BC45}"/>
+                  </a:ext>
+                </a:extLst>
+              </p:cNvPr>
+              <p:cNvPicPr>
+                <a:picLocks noChangeAspect="1"/>
+              </p:cNvPicPr>
+              <p:nvPr/>
+            </p:nvPicPr>
+            <p:blipFill>
+              <a:blip r:embed="rId6">
+                <a:extLst>
+                  <a:ext uri="{28A0092B-C50C-407E-A947-70E740481C1C}">
+                    <a14:useLocalDpi xmlns:a14="http://schemas.microsoft.com/office/drawing/2010/main" val="0"/>
+                  </a:ext>
+                </a:extLst>
+              </a:blip>
+              <a:stretch>
+                <a:fillRect/>
+              </a:stretch>
+            </p:blipFill>
+            <p:spPr>
+              <a:xfrm>
+                <a:off x="6442162" y="3070566"/>
+                <a:ext cx="335701" cy="636066"/>
+              </a:xfrm>
+              <a:prstGeom prst="rect">
+                <a:avLst/>
+              </a:prstGeom>
+            </p:spPr>
+          </p:pic>
+          <p:sp>
+            <p:nvSpPr>
+              <p:cNvPr id="43" name="TextBox 42">
+                <a:extLst>
+                  <a:ext uri="{FF2B5EF4-FFF2-40B4-BE49-F238E27FC236}">
+                    <a16:creationId xmlns:a16="http://schemas.microsoft.com/office/drawing/2014/main" id="{735406AA-0A07-4450-B39C-25753E985315}"/>
+                  </a:ext>
+                </a:extLst>
+              </p:cNvPr>
+              <p:cNvSpPr txBox="1"/>
+              <p:nvPr/>
+            </p:nvSpPr>
+            <p:spPr>
+              <a:xfrm>
+                <a:off x="6068073" y="3154568"/>
+                <a:ext cx="319318" cy="307777"/>
+              </a:xfrm>
+              <a:prstGeom prst="rect">
+                <a:avLst/>
+              </a:prstGeom>
+              <a:noFill/>
+            </p:spPr>
+            <p:txBody>
+              <a:bodyPr wrap="none" rtlCol="0">
+                <a:spAutoFit/>
+              </a:bodyPr>
+              <a:lstStyle/>
+              <a:p>
+                <a:r>
+                  <a:rPr lang="en-CA" sz="1400" dirty="0"/>
+                  <a:t>…</a:t>
+                </a:r>
+              </a:p>
+            </p:txBody>
+          </p:sp>
+          <p:sp>
+            <p:nvSpPr>
+              <p:cNvPr id="45" name="TextBox 44">
+                <a:extLst>
+                  <a:ext uri="{FF2B5EF4-FFF2-40B4-BE49-F238E27FC236}">
+                    <a16:creationId xmlns:a16="http://schemas.microsoft.com/office/drawing/2014/main" id="{26A3CD37-F288-4CE2-935D-6A13A966EB95}"/>
+                  </a:ext>
+                </a:extLst>
+              </p:cNvPr>
+              <p:cNvSpPr txBox="1"/>
+              <p:nvPr/>
+            </p:nvSpPr>
+            <p:spPr>
+              <a:xfrm>
+                <a:off x="7879432" y="3706632"/>
+                <a:ext cx="1479123" cy="523220"/>
+              </a:xfrm>
+              <a:prstGeom prst="rect">
+                <a:avLst/>
+              </a:prstGeom>
+              <a:noFill/>
+            </p:spPr>
+            <p:txBody>
+              <a:bodyPr wrap="none" rtlCol="0">
+                <a:spAutoFit/>
+              </a:bodyPr>
+              <a:lstStyle/>
+              <a:p>
+                <a:r>
+                  <a:rPr lang="en-CA" sz="1400" dirty="0"/>
+                  <a:t>Invoke Lambda as</a:t>
+                </a:r>
+                <a:br>
+                  <a:rPr lang="en-CA" sz="1400" dirty="0"/>
+                </a:br>
+                <a:r>
+                  <a:rPr lang="en-CA" sz="1400" dirty="0"/>
+                  <a:t>another example</a:t>
+                </a:r>
+              </a:p>
+            </p:txBody>
+          </p:sp>
+          <p:sp>
+            <p:nvSpPr>
+              <p:cNvPr id="46" name="TextBox 45">
+                <a:extLst>
+                  <a:ext uri="{FF2B5EF4-FFF2-40B4-BE49-F238E27FC236}">
+                    <a16:creationId xmlns:a16="http://schemas.microsoft.com/office/drawing/2014/main" id="{33EF74DA-19E2-4971-8D57-6F33D3BF0A80}"/>
+                  </a:ext>
+                </a:extLst>
+              </p:cNvPr>
+              <p:cNvSpPr txBox="1"/>
+              <p:nvPr/>
+            </p:nvSpPr>
+            <p:spPr>
+              <a:xfrm>
+                <a:off x="4525591" y="3492034"/>
+                <a:ext cx="846642" cy="523220"/>
+              </a:xfrm>
+              <a:prstGeom prst="rect">
+                <a:avLst/>
+              </a:prstGeom>
+              <a:noFill/>
+            </p:spPr>
+            <p:txBody>
+              <a:bodyPr wrap="none" rtlCol="0">
+                <a:spAutoFit/>
+              </a:bodyPr>
+              <a:lstStyle/>
+              <a:p>
+                <a:r>
+                  <a:rPr lang="en-CA" sz="1400" dirty="0"/>
+                  <a:t>   VPC</a:t>
+                </a:r>
+                <a:br>
+                  <a:rPr lang="en-CA" sz="1400" dirty="0"/>
+                </a:br>
+                <a:r>
+                  <a:rPr lang="en-CA" sz="1400" dirty="0"/>
+                  <a:t>Endpoint</a:t>
                 </a:r>
               </a:p>
             </p:txBody>
           </p:sp>
         </p:grpSp>
+        <p:pic>
+          <p:nvPicPr>
+            <p:cNvPr id="10" name="Picture 9">
+              <a:extLst>
+                <a:ext uri="{FF2B5EF4-FFF2-40B4-BE49-F238E27FC236}">
+                  <a16:creationId xmlns:a16="http://schemas.microsoft.com/office/drawing/2014/main" id="{26824245-E253-4B61-B8F8-A07E8CB8EEEE}"/>
+                </a:ext>
+              </a:extLst>
+            </p:cNvPr>
+            <p:cNvPicPr>
+              <a:picLocks noChangeAspect="1"/>
+            </p:cNvPicPr>
+            <p:nvPr/>
+          </p:nvPicPr>
+          <p:blipFill>
+            <a:blip r:embed="rId9"/>
+            <a:stretch>
+              <a:fillRect/>
+            </a:stretch>
+          </p:blipFill>
+          <p:spPr>
+            <a:xfrm>
+              <a:off x="6240208" y="843452"/>
+              <a:ext cx="590476" cy="485714"/>
+            </a:xfrm>
+            <a:prstGeom prst="rect">
+              <a:avLst/>
+            </a:prstGeom>
+          </p:spPr>
+        </p:pic>
         <p:pic>
           <p:nvPicPr>
             <p:cNvPr id="33" name="Picture 32">
@@ -7953,7 +8363,7 @@
             <p:nvPr/>
           </p:nvPicPr>
           <p:blipFill>
-            <a:blip r:embed="rId8">
+            <a:blip r:embed="rId10">
               <a:extLst>
                 <a:ext uri="{28A0092B-C50C-407E-A947-70E740481C1C}">
                   <a14:useLocalDpi xmlns:a14="http://schemas.microsoft.com/office/drawing/2010/main" val="0"/>
@@ -7966,7 +8376,7 @@
           </p:blipFill>
           <p:spPr>
             <a:xfrm>
-              <a:off x="6752769" y="2975514"/>
+              <a:off x="7999697" y="2525955"/>
               <a:ext cx="693132" cy="745246"/>
             </a:xfrm>
             <a:prstGeom prst="rect">
@@ -7975,6 +8385,38 @@
           </p:spPr>
         </p:pic>
       </p:grpSp>
+      <p:pic>
+        <p:nvPicPr>
+          <p:cNvPr id="44" name="Picture 43">
+            <a:extLst>
+              <a:ext uri="{FF2B5EF4-FFF2-40B4-BE49-F238E27FC236}">
+                <a16:creationId xmlns:a16="http://schemas.microsoft.com/office/drawing/2014/main" id="{0141CD06-B9F8-439D-BD78-E55BF670A12B}"/>
+              </a:ext>
+            </a:extLst>
+          </p:cNvPr>
+          <p:cNvPicPr>
+            <a:picLocks noChangeAspect="1"/>
+          </p:cNvPicPr>
+          <p:nvPr/>
+        </p:nvPicPr>
+        <p:blipFill>
+          <a:blip r:embed="rId11">
+            <a:alphaModFix/>
+          </a:blip>
+          <a:stretch>
+            <a:fillRect/>
+          </a:stretch>
+        </p:blipFill>
+        <p:spPr>
+          <a:xfrm>
+            <a:off x="8104016" y="3563458"/>
+            <a:ext cx="823494" cy="804432"/>
+          </a:xfrm>
+          <a:prstGeom prst="rect">
+            <a:avLst/>
+          </a:prstGeom>
+        </p:spPr>
+      </p:pic>
     </p:spTree>
     <p:extLst>
       <p:ext uri="{BB962C8B-B14F-4D97-AF65-F5344CB8AC3E}">
@@ -8007,10 +8449,10 @@
       </p:grpSpPr>
       <p:grpSp>
         <p:nvGrpSpPr>
-          <p:cNvPr id="2" name="Group 1">
+          <p:cNvPr id="19" name="Group 18">
             <a:extLst>
               <a:ext uri="{FF2B5EF4-FFF2-40B4-BE49-F238E27FC236}">
-                <a16:creationId xmlns:a16="http://schemas.microsoft.com/office/drawing/2014/main" id="{0A5C4AAE-228E-4E67-9742-CD8515782C60}"/>
+                <a16:creationId xmlns:a16="http://schemas.microsoft.com/office/drawing/2014/main" id="{8F1CB31E-4648-4A4C-8574-EB378989C358}"/>
               </a:ext>
             </a:extLst>
           </p:cNvPr>
@@ -8019,12 +8461,72 @@
         </p:nvGrpSpPr>
         <p:grpSpPr>
           <a:xfrm>
-            <a:off x="1040097" y="1699358"/>
-            <a:ext cx="5101429" cy="2092464"/>
-            <a:chOff x="1040096" y="1724981"/>
-            <a:chExt cx="6945637" cy="2836444"/>
+            <a:off x="656024" y="878"/>
+            <a:ext cx="10879952" cy="5138506"/>
+            <a:chOff x="578623" y="43094"/>
+            <a:chExt cx="10879952" cy="5138506"/>
           </a:xfrm>
         </p:grpSpPr>
+        <p:pic>
+          <p:nvPicPr>
+            <p:cNvPr id="7" name="Picture 6">
+              <a:extLst>
+                <a:ext uri="{FF2B5EF4-FFF2-40B4-BE49-F238E27FC236}">
+                  <a16:creationId xmlns:a16="http://schemas.microsoft.com/office/drawing/2014/main" id="{380508AD-6A7A-4652-8DC7-A2E734D9362C}"/>
+                </a:ext>
+              </a:extLst>
+            </p:cNvPr>
+            <p:cNvPicPr>
+              <a:picLocks noChangeAspect="1"/>
+            </p:cNvPicPr>
+            <p:nvPr/>
+          </p:nvPicPr>
+          <p:blipFill>
+            <a:blip r:embed="rId2"/>
+            <a:stretch>
+              <a:fillRect/>
+            </a:stretch>
+          </p:blipFill>
+          <p:spPr>
+            <a:xfrm>
+              <a:off x="3782270" y="43094"/>
+              <a:ext cx="7676305" cy="5138506"/>
+            </a:xfrm>
+            <a:prstGeom prst="rect">
+              <a:avLst/>
+            </a:prstGeom>
+          </p:spPr>
+        </p:pic>
+        <p:pic>
+          <p:nvPicPr>
+            <p:cNvPr id="12" name="Picture 11">
+              <a:extLst>
+                <a:ext uri="{FF2B5EF4-FFF2-40B4-BE49-F238E27FC236}">
+                  <a16:creationId xmlns:a16="http://schemas.microsoft.com/office/drawing/2014/main" id="{32EA7DE5-6333-46BF-89F4-8243BA5CC144}"/>
+                </a:ext>
+              </a:extLst>
+            </p:cNvPr>
+            <p:cNvPicPr>
+              <a:picLocks noChangeAspect="1"/>
+            </p:cNvPicPr>
+            <p:nvPr/>
+          </p:nvPicPr>
+          <p:blipFill>
+            <a:blip r:embed="rId3"/>
+            <a:stretch>
+              <a:fillRect/>
+            </a:stretch>
+          </p:blipFill>
+          <p:spPr>
+            <a:xfrm>
+              <a:off x="6704943" y="1430461"/>
+              <a:ext cx="823494" cy="804432"/>
+            </a:xfrm>
+            <a:prstGeom prst="rect">
+              <a:avLst/>
+            </a:prstGeom>
+          </p:spPr>
+        </p:pic>
         <p:grpSp>
           <p:nvGrpSpPr>
             <p:cNvPr id="32" name="Group 31">
@@ -8039,10 +8541,10 @@
           </p:nvGrpSpPr>
           <p:grpSpPr>
             <a:xfrm>
-              <a:off x="1040096" y="1724981"/>
-              <a:ext cx="6945637" cy="2836444"/>
-              <a:chOff x="1040096" y="1724981"/>
-              <a:chExt cx="6945637" cy="2836444"/>
+              <a:off x="578623" y="1311964"/>
+              <a:ext cx="10117089" cy="3734506"/>
+              <a:chOff x="1040096" y="1311964"/>
+              <a:chExt cx="10117089" cy="3734506"/>
             </a:xfrm>
           </p:grpSpPr>
           <p:pic>
@@ -8060,7 +8562,7 @@
               <p:nvPr/>
             </p:nvPicPr>
             <p:blipFill>
-              <a:blip r:embed="rId2" cstate="screen">
+              <a:blip r:embed="rId4" cstate="screen">
                 <a:extLst>
                   <a:ext uri="{28A0092B-C50C-407E-A947-70E740481C1C}">
                     <a14:useLocalDpi xmlns:a14="http://schemas.microsoft.com/office/drawing/2010/main"/>
@@ -8097,7 +8599,7 @@
               <p:nvPr/>
             </p:nvPicPr>
             <p:blipFill>
-              <a:blip r:embed="rId3">
+              <a:blip r:embed="rId5">
                 <a:extLst>
                   <a:ext uri="{28A0092B-C50C-407E-A947-70E740481C1C}">
                     <a14:useLocalDpi xmlns:a14="http://schemas.microsoft.com/office/drawing/2010/main" val="0"/>
@@ -8110,44 +8612,8 @@
             </p:blipFill>
             <p:spPr>
               <a:xfrm>
-                <a:off x="5621046" y="2985175"/>
+                <a:off x="6517411" y="2969460"/>
                 <a:ext cx="436327" cy="625640"/>
-              </a:xfrm>
-              <a:prstGeom prst="rect">
-                <a:avLst/>
-              </a:prstGeom>
-            </p:spPr>
-          </p:pic>
-          <p:pic>
-            <p:nvPicPr>
-              <p:cNvPr id="11" name="Picture 10">
-                <a:extLst>
-                  <a:ext uri="{FF2B5EF4-FFF2-40B4-BE49-F238E27FC236}">
-                    <a16:creationId xmlns:a16="http://schemas.microsoft.com/office/drawing/2014/main" id="{A177B99B-A73A-4F1C-80D1-432DA26D2F64}"/>
-                  </a:ext>
-                </a:extLst>
-              </p:cNvPr>
-              <p:cNvPicPr>
-                <a:picLocks noChangeAspect="1"/>
-              </p:cNvPicPr>
-              <p:nvPr/>
-            </p:nvPicPr>
-            <p:blipFill>
-              <a:blip r:embed="rId4">
-                <a:extLst>
-                  <a:ext uri="{28A0092B-C50C-407E-A947-70E740481C1C}">
-                    <a14:useLocalDpi xmlns:a14="http://schemas.microsoft.com/office/drawing/2010/main" val="0"/>
-                  </a:ext>
-                </a:extLst>
-              </a:blip>
-              <a:stretch>
-                <a:fillRect/>
-              </a:stretch>
-            </p:blipFill>
-            <p:spPr>
-              <a:xfrm>
-                <a:off x="6238042" y="2550629"/>
-                <a:ext cx="335701" cy="636066"/>
               </a:xfrm>
               <a:prstGeom prst="rect">
                 <a:avLst/>
@@ -8169,7 +8635,7 @@
               <p:nvPr/>
             </p:nvPicPr>
             <p:blipFill>
-              <a:blip r:embed="rId5" cstate="print">
+              <a:blip r:embed="rId6" cstate="print">
                 <a:extLst>
                   <a:ext uri="{28A0092B-C50C-407E-A947-70E740481C1C}">
                     <a14:useLocalDpi xmlns:a14="http://schemas.microsoft.com/office/drawing/2010/main"/>
@@ -8255,8 +8721,8 @@
             </p:nvCxnSpPr>
             <p:spPr bwMode="auto">
               <a:xfrm flipV="1">
-                <a:off x="4248314" y="3297995"/>
-                <a:ext cx="1372732" cy="177"/>
+                <a:off x="4248314" y="3282280"/>
+                <a:ext cx="2269097" cy="15892"/>
               </a:xfrm>
               <a:prstGeom prst="straightConnector1">
                 <a:avLst/>
@@ -8295,14 +8761,13 @@
               </p:cNvPr>
               <p:cNvCxnSpPr>
                 <a:cxnSpLocks/>
-                <a:stCxn id="9" idx="3"/>
               </p:cNvCxnSpPr>
               <p:nvPr/>
             </p:nvCxnSpPr>
             <p:spPr bwMode="auto">
               <a:xfrm>
-                <a:off x="6057373" y="3297995"/>
-                <a:ext cx="686366" cy="16993"/>
+                <a:off x="7084028" y="3298172"/>
+                <a:ext cx="1597520" cy="0"/>
               </a:xfrm>
               <a:prstGeom prst="straightConnector1">
                 <a:avLst/>
@@ -8332,6 +8797,72 @@
           </p:cxnSp>
           <p:sp>
             <p:nvSpPr>
+              <p:cNvPr id="24" name="Rounded Rectangle 15">
+                <a:extLst>
+                  <a:ext uri="{FF2B5EF4-FFF2-40B4-BE49-F238E27FC236}">
+                    <a16:creationId xmlns:a16="http://schemas.microsoft.com/office/drawing/2014/main" id="{0626774B-A58F-48CD-92B3-1A46BF3879C8}"/>
+                  </a:ext>
+                </a:extLst>
+              </p:cNvPr>
+              <p:cNvSpPr/>
+              <p:nvPr/>
+            </p:nvSpPr>
+            <p:spPr bwMode="auto">
+              <a:xfrm>
+                <a:off x="3182079" y="2643199"/>
+                <a:ext cx="2090447" cy="1278163"/>
+              </a:xfrm>
+              <a:prstGeom prst="roundRect">
+                <a:avLst>
+                  <a:gd name="adj" fmla="val 9818"/>
+                </a:avLst>
+              </a:prstGeom>
+              <a:noFill/>
+              <a:ln w="19050">
+                <a:noFill/>
+                <a:prstDash val="lgDash"/>
+              </a:ln>
+              <a:effectLst/>
+            </p:spPr>
+            <p:style>
+              <a:lnRef idx="1">
+                <a:schemeClr val="accent1"/>
+              </a:lnRef>
+              <a:fillRef idx="3">
+                <a:schemeClr val="accent1"/>
+              </a:fillRef>
+              <a:effectRef idx="2">
+                <a:schemeClr val="accent1"/>
+              </a:effectRef>
+              <a:fontRef idx="minor">
+                <a:schemeClr val="lt1"/>
+              </a:fontRef>
+            </p:style>
+            <p:txBody>
+              <a:bodyPr anchor="ctr"/>
+              <a:lstStyle/>
+              <a:p>
+                <a:pPr algn="ctr" fontAlgn="auto">
+                  <a:spcBef>
+                    <a:spcPts val="0"/>
+                  </a:spcBef>
+                  <a:spcAft>
+                    <a:spcPts val="0"/>
+                  </a:spcAft>
+                  <a:defRPr/>
+                </a:pPr>
+                <a:endParaRPr lang="en-US" dirty="0">
+                  <a:solidFill>
+                    <a:schemeClr val="tx1"/>
+                  </a:solidFill>
+                  <a:latin typeface="Helvetica Neue"/>
+                  <a:cs typeface="Helvetica Neue"/>
+                </a:endParaRPr>
+              </a:p>
+            </p:txBody>
+          </p:sp>
+          <p:sp>
+            <p:nvSpPr>
               <p:cNvPr id="27" name="TextBox 26">
                 <a:extLst>
                   <a:ext uri="{FF2B5EF4-FFF2-40B4-BE49-F238E27FC236}">
@@ -8345,7 +8876,7 @@
             <p:spPr>
               <a:xfrm>
                 <a:off x="1053228" y="3561416"/>
-                <a:ext cx="1213537" cy="646331"/>
+                <a:ext cx="1383584" cy="738664"/>
               </a:xfrm>
               <a:prstGeom prst="rect">
                 <a:avLst/>
@@ -8359,19 +8890,19 @@
               <a:lstStyle/>
               <a:p>
                 <a:r>
-                  <a:rPr lang="en-CA" sz="1200" dirty="0"/>
+                  <a:rPr lang="en-CA" sz="1400" dirty="0"/>
                   <a:t>Application </a:t>
                 </a:r>
               </a:p>
               <a:p>
                 <a:r>
-                  <a:rPr lang="en-CA" sz="1200" dirty="0"/>
+                  <a:rPr lang="en-CA" sz="1400" dirty="0"/>
                   <a:t>send/receive</a:t>
                 </a:r>
               </a:p>
               <a:p>
                 <a:r>
-                  <a:rPr lang="en-CA" sz="1200" dirty="0"/>
+                  <a:rPr lang="en-CA" sz="1400" dirty="0"/>
                   <a:t>JMS for example</a:t>
                 </a:r>
               </a:p>
@@ -8391,8 +8922,8 @@
             </p:nvSpPr>
             <p:spPr>
               <a:xfrm>
-                <a:off x="6573743" y="3769757"/>
-                <a:ext cx="1411990" cy="461665"/>
+                <a:off x="9539883" y="2969815"/>
+                <a:ext cx="1617302" cy="523220"/>
               </a:xfrm>
               <a:prstGeom prst="rect">
                 <a:avLst/>
@@ -8406,13 +8937,13 @@
               <a:lstStyle/>
               <a:p>
                 <a:r>
-                  <a:rPr lang="en-CA" sz="1200" dirty="0"/>
+                  <a:rPr lang="en-CA" sz="1400" dirty="0"/>
                   <a:t>Data written to SQS</a:t>
                 </a:r>
               </a:p>
               <a:p>
                 <a:r>
-                  <a:rPr lang="en-CA" sz="1200" dirty="0"/>
+                  <a:rPr lang="en-CA" sz="1400" dirty="0"/>
                   <a:t>for example</a:t>
                 </a:r>
               </a:p>
@@ -8432,13 +8963,17 @@
             </p:nvSpPr>
             <p:spPr>
               <a:xfrm>
-                <a:off x="5575831" y="1724981"/>
-                <a:ext cx="2244461" cy="646331"/>
+                <a:off x="8145379" y="2135283"/>
+                <a:ext cx="2581861" cy="738664"/>
               </a:xfrm>
               <a:prstGeom prst="rect">
                 <a:avLst/>
               </a:prstGeom>
-              <a:noFill/>
+              <a:solidFill>
+                <a:schemeClr val="bg1">
+                  <a:alpha val="79000"/>
+                </a:schemeClr>
+              </a:solidFill>
             </p:spPr>
             <p:txBody>
               <a:bodyPr wrap="none" rtlCol="0">
@@ -8447,19 +8982,19 @@
               <a:lstStyle/>
               <a:p>
                 <a:r>
-                  <a:rPr lang="en-CA" sz="1200" dirty="0"/>
+                  <a:rPr lang="en-CA" sz="1400" dirty="0"/>
                   <a:t>IAM Role generated </a:t>
                 </a:r>
               </a:p>
               <a:p>
                 <a:r>
-                  <a:rPr lang="en-CA" sz="1200" dirty="0"/>
+                  <a:rPr lang="en-CA" sz="1400" dirty="0"/>
                   <a:t>Allowing specific resource access</a:t>
                 </a:r>
               </a:p>
               <a:p>
                 <a:r>
-                  <a:rPr lang="en-CA" sz="1200" dirty="0"/>
+                  <a:rPr lang="en-CA" sz="1400" dirty="0"/>
                   <a:t>Can be across AWS account</a:t>
                 </a:r>
               </a:p>
@@ -8479,34 +9014,40 @@
             </p:nvSpPr>
             <p:spPr>
               <a:xfrm>
-                <a:off x="2771660" y="2204703"/>
-                <a:ext cx="1685269" cy="461666"/>
+                <a:off x="6105180" y="4097295"/>
+                <a:ext cx="1841795" cy="738664"/>
               </a:xfrm>
               <a:prstGeom prst="rect">
                 <a:avLst/>
               </a:prstGeom>
-              <a:noFill/>
+              <a:solidFill>
+                <a:schemeClr val="bg1">
+                  <a:alpha val="80000"/>
+                </a:schemeClr>
+              </a:solidFill>
             </p:spPr>
             <p:txBody>
-              <a:bodyPr wrap="none" rtlCol="0">
+              <a:bodyPr wrap="square" rtlCol="0">
                 <a:spAutoFit/>
               </a:bodyPr>
               <a:lstStyle/>
               <a:p>
                 <a:r>
-                  <a:rPr lang="en-CA" sz="1200" dirty="0"/>
-                  <a:t>External </a:t>
+                  <a:rPr lang="en-CA" sz="1400" dirty="0"/>
+                  <a:t>Public API Gateway</a:t>
                 </a:r>
-                <a:r>
-                  <a:rPr lang="en-CA" sz="1200" dirty="0" err="1"/>
-                  <a:t>APIGateway</a:t>
-                </a:r>
-                <a:endParaRPr lang="en-CA" sz="1200" dirty="0"/>
               </a:p>
               <a:p>
                 <a:r>
-                  <a:rPr lang="en-CA" sz="1200" dirty="0"/>
-                  <a:t>Secured with App Token</a:t>
+                  <a:rPr lang="en-CA" sz="1400" dirty="0"/>
+                  <a:t>Secured with Token,</a:t>
+                </a:r>
+                <a:br>
+                  <a:rPr lang="en-CA" sz="1400" dirty="0"/>
+                </a:br>
+                <a:r>
+                  <a:rPr lang="en-CA" sz="1400" dirty="0"/>
+                  <a:t>for each AWS resource</a:t>
                 </a:r>
               </a:p>
             </p:txBody>
@@ -8525,8 +9066,8 @@
             </p:nvSpPr>
             <p:spPr>
               <a:xfrm>
-                <a:off x="2941000" y="4099760"/>
-                <a:ext cx="1800365" cy="461665"/>
+                <a:off x="2824027" y="3876919"/>
+                <a:ext cx="2169889" cy="1169551"/>
               </a:xfrm>
               <a:prstGeom prst="rect">
                 <a:avLst/>
@@ -8534,24 +9075,557 @@
               <a:noFill/>
             </p:spPr>
             <p:txBody>
-              <a:bodyPr wrap="none" rtlCol="0">
+              <a:bodyPr wrap="square" rtlCol="0">
                 <a:spAutoFit/>
               </a:bodyPr>
               <a:lstStyle/>
               <a:p>
                 <a:r>
-                  <a:rPr lang="en-CA" sz="1200" dirty="0"/>
-                  <a:t>Solace message broker</a:t>
+                  <a:rPr lang="en-CA" sz="1400" dirty="0" err="1"/>
+                  <a:t>PubSub</a:t>
+                </a:r>
+                <a:r>
+                  <a:rPr lang="en-CA" sz="1400" dirty="0"/>
+                  <a:t>+ event broker</a:t>
                 </a:r>
               </a:p>
               <a:p>
                 <a:r>
-                  <a:rPr lang="en-CA" sz="1200" dirty="0"/>
-                  <a:t>w/ Rest Delivery Endpoint</a:t>
+                  <a:rPr lang="en-CA" sz="1400" dirty="0"/>
+                  <a:t>w/ REST Delivery Point (RDP) to API GW, configured to send Token in HTTP Header</a:t>
                 </a:r>
               </a:p>
             </p:txBody>
           </p:sp>
+          <p:sp>
+            <p:nvSpPr>
+              <p:cNvPr id="41" name="TextBox 40">
+                <a:extLst>
+                  <a:ext uri="{FF2B5EF4-FFF2-40B4-BE49-F238E27FC236}">
+                    <a16:creationId xmlns:a16="http://schemas.microsoft.com/office/drawing/2014/main" id="{37ACDC4E-394F-4981-AA57-FA97ADA7E21B}"/>
+                  </a:ext>
+                </a:extLst>
+              </p:cNvPr>
+              <p:cNvSpPr txBox="1"/>
+              <p:nvPr/>
+            </p:nvSpPr>
+            <p:spPr>
+              <a:xfrm>
+                <a:off x="7016791" y="2504615"/>
+                <a:ext cx="796324" cy="307777"/>
+              </a:xfrm>
+              <a:prstGeom prst="rect">
+                <a:avLst/>
+              </a:prstGeom>
+              <a:noFill/>
+            </p:spPr>
+            <p:txBody>
+              <a:bodyPr wrap="square" rtlCol="0">
+                <a:spAutoFit/>
+              </a:bodyPr>
+              <a:lstStyle/>
+              <a:p>
+                <a:pPr algn="ctr"/>
+                <a:r>
+                  <a:rPr lang="en-CA" sz="1400" dirty="0"/>
+                  <a:t>Policy</a:t>
+                </a:r>
+              </a:p>
+            </p:txBody>
+          </p:sp>
+          <p:cxnSp>
+            <p:nvCxnSpPr>
+              <p:cNvPr id="37" name="Straight Arrow Connector 36">
+                <a:extLst>
+                  <a:ext uri="{FF2B5EF4-FFF2-40B4-BE49-F238E27FC236}">
+                    <a16:creationId xmlns:a16="http://schemas.microsoft.com/office/drawing/2014/main" id="{83EE5941-E250-44A0-81F5-28D28EB80D47}"/>
+                  </a:ext>
+                </a:extLst>
+              </p:cNvPr>
+              <p:cNvCxnSpPr>
+                <a:cxnSpLocks/>
+              </p:cNvCxnSpPr>
+              <p:nvPr/>
+            </p:nvCxnSpPr>
+            <p:spPr bwMode="auto">
+              <a:xfrm flipV="1">
+                <a:off x="6707700" y="2095597"/>
+                <a:ext cx="551784" cy="793794"/>
+              </a:xfrm>
+              <a:prstGeom prst="straightConnector1">
+                <a:avLst/>
+              </a:prstGeom>
+              <a:ln w="76200">
+                <a:solidFill>
+                  <a:srgbClr val="003469"/>
+                </a:solidFill>
+                <a:headEnd type="none" w="med" len="med"/>
+                <a:tailEnd type="triangle" w="med" len="med"/>
+              </a:ln>
+            </p:spPr>
+            <p:style>
+              <a:lnRef idx="1">
+                <a:schemeClr val="dk1"/>
+              </a:lnRef>
+              <a:fillRef idx="0">
+                <a:schemeClr val="dk1"/>
+              </a:fillRef>
+              <a:effectRef idx="0">
+                <a:schemeClr val="dk1"/>
+              </a:effectRef>
+              <a:fontRef idx="minor">
+                <a:schemeClr val="tx1"/>
+              </a:fontRef>
+            </p:style>
+          </p:cxnSp>
+          <p:cxnSp>
+            <p:nvCxnSpPr>
+              <p:cNvPr id="38" name="Straight Arrow Connector 37">
+                <a:extLst>
+                  <a:ext uri="{FF2B5EF4-FFF2-40B4-BE49-F238E27FC236}">
+                    <a16:creationId xmlns:a16="http://schemas.microsoft.com/office/drawing/2014/main" id="{D067D193-4885-46BF-AE47-3AC3405F18BC}"/>
+                  </a:ext>
+                </a:extLst>
+              </p:cNvPr>
+              <p:cNvCxnSpPr>
+                <a:cxnSpLocks/>
+              </p:cNvCxnSpPr>
+              <p:nvPr/>
+            </p:nvCxnSpPr>
+            <p:spPr bwMode="auto">
+              <a:xfrm flipV="1">
+                <a:off x="6885194" y="2217558"/>
+                <a:ext cx="496035" cy="751905"/>
+              </a:xfrm>
+              <a:prstGeom prst="straightConnector1">
+                <a:avLst/>
+              </a:prstGeom>
+              <a:ln w="76200">
+                <a:solidFill>
+                  <a:srgbClr val="003469"/>
+                </a:solidFill>
+                <a:headEnd type="triangle" w="med" len="med"/>
+                <a:tailEnd type="none" w="med" len="med"/>
+              </a:ln>
+            </p:spPr>
+            <p:style>
+              <a:lnRef idx="1">
+                <a:schemeClr val="dk1"/>
+              </a:lnRef>
+              <a:fillRef idx="0">
+                <a:schemeClr val="dk1"/>
+              </a:fillRef>
+              <a:effectRef idx="0">
+                <a:schemeClr val="dk1"/>
+              </a:effectRef>
+              <a:fontRef idx="minor">
+                <a:schemeClr val="tx1"/>
+              </a:fontRef>
+            </p:style>
+          </p:cxnSp>
+          <p:sp>
+            <p:nvSpPr>
+              <p:cNvPr id="45" name="TextBox 44">
+                <a:extLst>
+                  <a:ext uri="{FF2B5EF4-FFF2-40B4-BE49-F238E27FC236}">
+                    <a16:creationId xmlns:a16="http://schemas.microsoft.com/office/drawing/2014/main" id="{7C257FED-90DD-4BE6-9536-47DA18135A17}"/>
+                  </a:ext>
+                </a:extLst>
+              </p:cNvPr>
+              <p:cNvSpPr txBox="1"/>
+              <p:nvPr/>
+            </p:nvSpPr>
+            <p:spPr>
+              <a:xfrm>
+                <a:off x="7651737" y="3332652"/>
+                <a:ext cx="358052" cy="307777"/>
+              </a:xfrm>
+              <a:prstGeom prst="rect">
+                <a:avLst/>
+              </a:prstGeom>
+              <a:noFill/>
+            </p:spPr>
+            <p:txBody>
+              <a:bodyPr wrap="square" rtlCol="0">
+                <a:spAutoFit/>
+              </a:bodyPr>
+              <a:lstStyle/>
+              <a:p>
+                <a:pPr algn="ctr"/>
+                <a:endParaRPr lang="en-CA" sz="1400" dirty="0"/>
+              </a:p>
+            </p:txBody>
+          </p:sp>
+          <p:sp>
+            <p:nvSpPr>
+              <p:cNvPr id="40" name="TextBox 39">
+                <a:extLst>
+                  <a:ext uri="{FF2B5EF4-FFF2-40B4-BE49-F238E27FC236}">
+                    <a16:creationId xmlns:a16="http://schemas.microsoft.com/office/drawing/2014/main" id="{22722A74-C544-4F25-8833-389FF3A39E93}"/>
+                  </a:ext>
+                </a:extLst>
+              </p:cNvPr>
+              <p:cNvSpPr txBox="1"/>
+              <p:nvPr/>
+            </p:nvSpPr>
+            <p:spPr>
+              <a:xfrm>
+                <a:off x="7898465" y="1311964"/>
+                <a:ext cx="1337124" cy="738664"/>
+              </a:xfrm>
+              <a:prstGeom prst="rect">
+                <a:avLst/>
+              </a:prstGeom>
+              <a:noFill/>
+            </p:spPr>
+            <p:txBody>
+              <a:bodyPr wrap="square" rtlCol="0">
+                <a:spAutoFit/>
+              </a:bodyPr>
+              <a:lstStyle/>
+              <a:p>
+                <a:r>
+                  <a:rPr lang="en-CA" sz="1400" dirty="0"/>
+                  <a:t>Lambda Authorizer, checks Token</a:t>
+                </a:r>
+              </a:p>
+            </p:txBody>
+          </p:sp>
+          <p:sp>
+            <p:nvSpPr>
+              <p:cNvPr id="35" name="TextBox 34">
+                <a:extLst>
+                  <a:ext uri="{FF2B5EF4-FFF2-40B4-BE49-F238E27FC236}">
+                    <a16:creationId xmlns:a16="http://schemas.microsoft.com/office/drawing/2014/main" id="{AFC592DA-A8EE-4641-B498-EB8CC2509451}"/>
+                  </a:ext>
+                </a:extLst>
+              </p:cNvPr>
+              <p:cNvSpPr txBox="1"/>
+              <p:nvPr/>
+            </p:nvSpPr>
+            <p:spPr>
+              <a:xfrm>
+                <a:off x="4698325" y="1895768"/>
+                <a:ext cx="1958123" cy="1169551"/>
+              </a:xfrm>
+              <a:prstGeom prst="rect">
+                <a:avLst/>
+              </a:prstGeom>
+              <a:solidFill>
+                <a:schemeClr val="bg1">
+                  <a:alpha val="79000"/>
+                </a:schemeClr>
+              </a:solidFill>
+            </p:spPr>
+            <p:txBody>
+              <a:bodyPr wrap="square" rtlCol="0">
+                <a:spAutoFit/>
+              </a:bodyPr>
+              <a:lstStyle/>
+              <a:p>
+                <a:r>
+                  <a:rPr lang="en-CA" sz="1400" dirty="0"/>
+                  <a:t>IAM Role generated </a:t>
+                </a:r>
+              </a:p>
+              <a:p>
+                <a:r>
+                  <a:rPr lang="en-CA" sz="1400" dirty="0"/>
+                  <a:t>Allowing Lambda authorizer access</a:t>
+                </a:r>
+              </a:p>
+              <a:p>
+                <a:r>
+                  <a:rPr lang="en-CA" sz="1400" dirty="0"/>
+                  <a:t>Can be across</a:t>
+                </a:r>
+                <a:br>
+                  <a:rPr lang="en-CA" sz="1400" dirty="0"/>
+                </a:br>
+                <a:r>
+                  <a:rPr lang="en-CA" sz="1400" dirty="0"/>
+                  <a:t>AWS account</a:t>
+                </a:r>
+              </a:p>
+            </p:txBody>
+          </p:sp>
+          <p:pic>
+            <p:nvPicPr>
+              <p:cNvPr id="34" name="Picture 33">
+                <a:extLst>
+                  <a:ext uri="{FF2B5EF4-FFF2-40B4-BE49-F238E27FC236}">
+                    <a16:creationId xmlns:a16="http://schemas.microsoft.com/office/drawing/2014/main" id="{462BD166-6470-4F31-B3E7-BD5AE66101EA}"/>
+                  </a:ext>
+                </a:extLst>
+              </p:cNvPr>
+              <p:cNvPicPr>
+                <a:picLocks noChangeAspect="1"/>
+              </p:cNvPicPr>
+              <p:nvPr/>
+            </p:nvPicPr>
+            <p:blipFill>
+              <a:blip r:embed="rId7">
+                <a:extLst>
+                  <a:ext uri="{28A0092B-C50C-407E-A947-70E740481C1C}">
+                    <a14:useLocalDpi xmlns:a14="http://schemas.microsoft.com/office/drawing/2010/main" val="0"/>
+                  </a:ext>
+                </a:extLst>
+              </a:blip>
+              <a:stretch>
+                <a:fillRect/>
+              </a:stretch>
+            </p:blipFill>
+            <p:spPr>
+              <a:xfrm>
+                <a:off x="6250302" y="2261662"/>
+                <a:ext cx="335701" cy="636066"/>
+              </a:xfrm>
+              <a:prstGeom prst="rect">
+                <a:avLst/>
+              </a:prstGeom>
+            </p:spPr>
+          </p:pic>
+          <p:sp>
+            <p:nvSpPr>
+              <p:cNvPr id="39" name="TextBox 38">
+                <a:extLst>
+                  <a:ext uri="{FF2B5EF4-FFF2-40B4-BE49-F238E27FC236}">
+                    <a16:creationId xmlns:a16="http://schemas.microsoft.com/office/drawing/2014/main" id="{54562D77-8C34-464A-8427-8C51D3175498}"/>
+                  </a:ext>
+                </a:extLst>
+              </p:cNvPr>
+              <p:cNvSpPr txBox="1"/>
+              <p:nvPr/>
+            </p:nvSpPr>
+            <p:spPr>
+              <a:xfrm>
+                <a:off x="6391193" y="1691786"/>
+                <a:ext cx="926624" cy="738664"/>
+              </a:xfrm>
+              <a:prstGeom prst="rect">
+                <a:avLst/>
+              </a:prstGeom>
+              <a:noFill/>
+            </p:spPr>
+            <p:txBody>
+              <a:bodyPr wrap="square" rtlCol="0">
+                <a:spAutoFit/>
+              </a:bodyPr>
+              <a:lstStyle/>
+              <a:p>
+                <a:pPr algn="ctr"/>
+                <a:r>
+                  <a:rPr lang="en-CA" sz="1400" dirty="0"/>
+                  <a:t>Context</a:t>
+                </a:r>
+              </a:p>
+              <a:p>
+                <a:pPr algn="ctr"/>
+                <a:r>
+                  <a:rPr lang="en-CA" sz="1400" dirty="0"/>
+                  <a:t>with Token</a:t>
+                </a:r>
+              </a:p>
+            </p:txBody>
+          </p:sp>
+          <p:pic>
+            <p:nvPicPr>
+              <p:cNvPr id="36" name="Picture 35">
+                <a:extLst>
+                  <a:ext uri="{FF2B5EF4-FFF2-40B4-BE49-F238E27FC236}">
+                    <a16:creationId xmlns:a16="http://schemas.microsoft.com/office/drawing/2014/main" id="{ADA11250-7FB5-42CB-A781-0DD32A7E8560}"/>
+                  </a:ext>
+                </a:extLst>
+              </p:cNvPr>
+              <p:cNvPicPr>
+                <a:picLocks noChangeAspect="1"/>
+              </p:cNvPicPr>
+              <p:nvPr/>
+            </p:nvPicPr>
+            <p:blipFill>
+              <a:blip r:embed="rId5">
+                <a:extLst>
+                  <a:ext uri="{28A0092B-C50C-407E-A947-70E740481C1C}">
+                    <a14:useLocalDpi xmlns:a14="http://schemas.microsoft.com/office/drawing/2010/main" val="0"/>
+                  </a:ext>
+                </a:extLst>
+              </a:blip>
+              <a:stretch>
+                <a:fillRect/>
+              </a:stretch>
+            </p:blipFill>
+            <p:spPr>
+              <a:xfrm>
+                <a:off x="6703815" y="3511295"/>
+                <a:ext cx="436327" cy="625640"/>
+              </a:xfrm>
+              <a:prstGeom prst="rect">
+                <a:avLst/>
+              </a:prstGeom>
+            </p:spPr>
+          </p:pic>
+          <p:cxnSp>
+            <p:nvCxnSpPr>
+              <p:cNvPr id="42" name="Straight Arrow Connector 41">
+                <a:extLst>
+                  <a:ext uri="{FF2B5EF4-FFF2-40B4-BE49-F238E27FC236}">
+                    <a16:creationId xmlns:a16="http://schemas.microsoft.com/office/drawing/2014/main" id="{3AD1E695-95ED-46AF-84C9-8FE40B477BC6}"/>
+                  </a:ext>
+                </a:extLst>
+              </p:cNvPr>
+              <p:cNvCxnSpPr>
+                <a:cxnSpLocks/>
+              </p:cNvCxnSpPr>
+              <p:nvPr/>
+            </p:nvCxnSpPr>
+            <p:spPr bwMode="auto">
+              <a:xfrm>
+                <a:off x="4252884" y="3446936"/>
+                <a:ext cx="2327073" cy="294853"/>
+              </a:xfrm>
+              <a:prstGeom prst="straightConnector1">
+                <a:avLst/>
+              </a:prstGeom>
+              <a:ln w="76200">
+                <a:solidFill>
+                  <a:srgbClr val="003469"/>
+                </a:solidFill>
+                <a:headEnd type="triangle" w="med" len="med"/>
+                <a:tailEnd type="triangle" w="med" len="med"/>
+              </a:ln>
+            </p:spPr>
+            <p:style>
+              <a:lnRef idx="1">
+                <a:schemeClr val="dk1"/>
+              </a:lnRef>
+              <a:fillRef idx="0">
+                <a:schemeClr val="dk1"/>
+              </a:fillRef>
+              <a:effectRef idx="0">
+                <a:schemeClr val="dk1"/>
+              </a:effectRef>
+              <a:fontRef idx="minor">
+                <a:schemeClr val="tx1"/>
+              </a:fontRef>
+            </p:style>
+          </p:cxnSp>
+          <p:pic>
+            <p:nvPicPr>
+              <p:cNvPr id="43" name="Picture 42">
+                <a:extLst>
+                  <a:ext uri="{FF2B5EF4-FFF2-40B4-BE49-F238E27FC236}">
+                    <a16:creationId xmlns:a16="http://schemas.microsoft.com/office/drawing/2014/main" id="{E37C41C1-D33D-4F50-AD60-8C56FDC236EB}"/>
+                  </a:ext>
+                </a:extLst>
+              </p:cNvPr>
+              <p:cNvPicPr>
+                <a:picLocks noChangeAspect="1"/>
+              </p:cNvPicPr>
+              <p:nvPr/>
+            </p:nvPicPr>
+            <p:blipFill>
+              <a:blip r:embed="rId7">
+                <a:extLst>
+                  <a:ext uri="{28A0092B-C50C-407E-A947-70E740481C1C}">
+                    <a14:useLocalDpi xmlns:a14="http://schemas.microsoft.com/office/drawing/2010/main" val="0"/>
+                  </a:ext>
+                </a:extLst>
+              </a:blip>
+              <a:stretch>
+                <a:fillRect/>
+              </a:stretch>
+            </p:blipFill>
+            <p:spPr>
+              <a:xfrm>
+                <a:off x="8060683" y="3345480"/>
+                <a:ext cx="335701" cy="636066"/>
+              </a:xfrm>
+              <a:prstGeom prst="rect">
+                <a:avLst/>
+              </a:prstGeom>
+            </p:spPr>
+          </p:pic>
+          <p:cxnSp>
+            <p:nvCxnSpPr>
+              <p:cNvPr id="44" name="Straight Arrow Connector 43">
+                <a:extLst>
+                  <a:ext uri="{FF2B5EF4-FFF2-40B4-BE49-F238E27FC236}">
+                    <a16:creationId xmlns:a16="http://schemas.microsoft.com/office/drawing/2014/main" id="{4F1DEC20-EC1E-44AB-A9C3-38B2462C3BF4}"/>
+                  </a:ext>
+                </a:extLst>
+              </p:cNvPr>
+              <p:cNvCxnSpPr>
+                <a:cxnSpLocks/>
+              </p:cNvCxnSpPr>
+              <p:nvPr/>
+            </p:nvCxnSpPr>
+            <p:spPr bwMode="auto">
+              <a:xfrm>
+                <a:off x="7148215" y="3930748"/>
+                <a:ext cx="1675224" cy="134317"/>
+              </a:xfrm>
+              <a:prstGeom prst="straightConnector1">
+                <a:avLst/>
+              </a:prstGeom>
+              <a:ln w="76200">
+                <a:solidFill>
+                  <a:srgbClr val="003469"/>
+                </a:solidFill>
+                <a:headEnd type="triangle" w="med" len="med"/>
+                <a:tailEnd type="triangle" w="med" len="med"/>
+              </a:ln>
+            </p:spPr>
+            <p:style>
+              <a:lnRef idx="1">
+                <a:schemeClr val="dk1"/>
+              </a:lnRef>
+              <a:fillRef idx="0">
+                <a:schemeClr val="dk1"/>
+              </a:fillRef>
+              <a:effectRef idx="0">
+                <a:schemeClr val="dk1"/>
+              </a:effectRef>
+              <a:fontRef idx="minor">
+                <a:schemeClr val="tx1"/>
+              </a:fontRef>
+            </p:style>
+          </p:cxnSp>
+          <p:pic>
+            <p:nvPicPr>
+              <p:cNvPr id="11" name="Picture 10">
+                <a:extLst>
+                  <a:ext uri="{FF2B5EF4-FFF2-40B4-BE49-F238E27FC236}">
+                    <a16:creationId xmlns:a16="http://schemas.microsoft.com/office/drawing/2014/main" id="{A177B99B-A73A-4F1C-80D1-432DA26D2F64}"/>
+                  </a:ext>
+                </a:extLst>
+              </p:cNvPr>
+              <p:cNvPicPr>
+                <a:picLocks noChangeAspect="1"/>
+              </p:cNvPicPr>
+              <p:nvPr/>
+            </p:nvPicPr>
+            <p:blipFill>
+              <a:blip r:embed="rId7">
+                <a:extLst>
+                  <a:ext uri="{28A0092B-C50C-407E-A947-70E740481C1C}">
+                    <a14:useLocalDpi xmlns:a14="http://schemas.microsoft.com/office/drawing/2010/main" val="0"/>
+                  </a:ext>
+                </a:extLst>
+              </a:blip>
+              <a:stretch>
+                <a:fillRect/>
+              </a:stretch>
+            </p:blipFill>
+            <p:spPr>
+              <a:xfrm>
+                <a:off x="7893854" y="2611143"/>
+                <a:ext cx="335701" cy="636066"/>
+              </a:xfrm>
+              <a:prstGeom prst="rect">
+                <a:avLst/>
+              </a:prstGeom>
+            </p:spPr>
+          </p:pic>
         </p:grpSp>
         <p:pic>
           <p:nvPicPr>
@@ -8568,7 +9642,7 @@
             <p:nvPr/>
           </p:nvPicPr>
           <p:blipFill>
-            <a:blip r:embed="rId6">
+            <a:blip r:embed="rId8">
               <a:extLst>
                 <a:ext uri="{28A0092B-C50C-407E-A947-70E740481C1C}">
                   <a14:useLocalDpi xmlns:a14="http://schemas.microsoft.com/office/drawing/2010/main" val="0"/>
@@ -8581,7 +9655,7 @@
           </p:blipFill>
           <p:spPr>
             <a:xfrm>
-              <a:off x="6752769" y="2975514"/>
+              <a:off x="8427550" y="2917603"/>
               <a:ext cx="693132" cy="745246"/>
             </a:xfrm>
             <a:prstGeom prst="rect">
@@ -8589,11 +9663,150 @@
             </a:prstGeom>
           </p:spPr>
         </p:pic>
+        <p:pic>
+          <p:nvPicPr>
+            <p:cNvPr id="10" name="Picture 9">
+              <a:extLst>
+                <a:ext uri="{FF2B5EF4-FFF2-40B4-BE49-F238E27FC236}">
+                  <a16:creationId xmlns:a16="http://schemas.microsoft.com/office/drawing/2014/main" id="{26824245-E253-4B61-B8F8-A07E8CB8EEEE}"/>
+                </a:ext>
+              </a:extLst>
+            </p:cNvPr>
+            <p:cNvPicPr>
+              <a:picLocks noChangeAspect="1"/>
+            </p:cNvPicPr>
+            <p:nvPr/>
+          </p:nvPicPr>
+          <p:blipFill>
+            <a:blip r:embed="rId9"/>
+            <a:stretch>
+              <a:fillRect/>
+            </a:stretch>
+          </p:blipFill>
+          <p:spPr>
+            <a:xfrm>
+              <a:off x="6895026" y="642041"/>
+              <a:ext cx="590476" cy="485714"/>
+            </a:xfrm>
+            <a:prstGeom prst="rect">
+              <a:avLst/>
+            </a:prstGeom>
+          </p:spPr>
+        </p:pic>
       </p:grpSp>
+      <p:pic>
+        <p:nvPicPr>
+          <p:cNvPr id="46" name="Picture 45">
+            <a:extLst>
+              <a:ext uri="{FF2B5EF4-FFF2-40B4-BE49-F238E27FC236}">
+                <a16:creationId xmlns:a16="http://schemas.microsoft.com/office/drawing/2014/main" id="{9C4FE3D5-74BD-4E41-A00B-4C09C17B4497}"/>
+              </a:ext>
+            </a:extLst>
+          </p:cNvPr>
+          <p:cNvPicPr>
+            <a:picLocks noChangeAspect="1"/>
+          </p:cNvPicPr>
+          <p:nvPr/>
+        </p:nvPicPr>
+        <p:blipFill>
+          <a:blip r:embed="rId3">
+            <a:alphaModFix/>
+          </a:blip>
+          <a:stretch>
+            <a:fillRect/>
+          </a:stretch>
+        </p:blipFill>
+        <p:spPr>
+          <a:xfrm>
+            <a:off x="8439367" y="3620633"/>
+            <a:ext cx="823494" cy="804432"/>
+          </a:xfrm>
+          <a:prstGeom prst="rect">
+            <a:avLst/>
+          </a:prstGeom>
+        </p:spPr>
+      </p:pic>
+      <p:sp>
+        <p:nvSpPr>
+          <p:cNvPr id="47" name="TextBox 46">
+            <a:extLst>
+              <a:ext uri="{FF2B5EF4-FFF2-40B4-BE49-F238E27FC236}">
+                <a16:creationId xmlns:a16="http://schemas.microsoft.com/office/drawing/2014/main" id="{C114F313-2B24-4202-AE2A-2B80534E8833}"/>
+              </a:ext>
+            </a:extLst>
+          </p:cNvPr>
+          <p:cNvSpPr txBox="1"/>
+          <p:nvPr/>
+        </p:nvSpPr>
+        <p:spPr>
+          <a:xfrm>
+            <a:off x="9119521" y="3734644"/>
+            <a:ext cx="1479123" cy="523220"/>
+          </a:xfrm>
+          <a:prstGeom prst="rect">
+            <a:avLst/>
+          </a:prstGeom>
+          <a:noFill/>
+        </p:spPr>
+        <p:txBody>
+          <a:bodyPr wrap="none" rtlCol="0">
+            <a:spAutoFit/>
+          </a:bodyPr>
+          <a:lstStyle/>
+          <a:p>
+            <a:r>
+              <a:rPr lang="en-CA" sz="1400" dirty="0"/>
+              <a:t>Invoke Lambda as</a:t>
+            </a:r>
+            <a:br>
+              <a:rPr lang="en-CA" sz="1400" dirty="0"/>
+            </a:br>
+            <a:r>
+              <a:rPr lang="en-CA" sz="1400" dirty="0"/>
+              <a:t>another example</a:t>
+            </a:r>
+          </a:p>
+        </p:txBody>
+      </p:sp>
+      <p:sp>
+        <p:nvSpPr>
+          <p:cNvPr id="48" name="TextBox 47">
+            <a:extLst>
+              <a:ext uri="{FF2B5EF4-FFF2-40B4-BE49-F238E27FC236}">
+                <a16:creationId xmlns:a16="http://schemas.microsoft.com/office/drawing/2014/main" id="{CB8C5CD8-B40B-4C2E-83CB-E1C7AA62618D}"/>
+              </a:ext>
+            </a:extLst>
+          </p:cNvPr>
+          <p:cNvSpPr txBox="1"/>
+          <p:nvPr/>
+        </p:nvSpPr>
+        <p:spPr>
+          <a:xfrm>
+            <a:off x="6805424" y="3350427"/>
+            <a:ext cx="319318" cy="307777"/>
+          </a:xfrm>
+          <a:prstGeom prst="rect">
+            <a:avLst/>
+          </a:prstGeom>
+          <a:noFill/>
+        </p:spPr>
+        <p:txBody>
+          <a:bodyPr wrap="none" rtlCol="0">
+            <a:spAutoFit/>
+          </a:bodyPr>
+          <a:lstStyle/>
+          <a:p>
+            <a:r>
+              <a:rPr lang="en-CA" sz="1400" dirty="0"/>
+              <a:t>…</a:t>
+            </a:r>
+          </a:p>
+        </p:txBody>
+      </p:sp>
     </p:spTree>
     <p:extLst>
       <p:ext uri="{BB962C8B-B14F-4D97-AF65-F5344CB8AC3E}">
-        <p14:creationId xmlns:p14="http://schemas.microsoft.com/office/powerpoint/2010/main" val="2595064566"/>
+        <p14:creationId xmlns:p14="http://schemas.microsoft.com/office/powerpoint/2010/main" val="3979158772"/>
       </p:ext>
     </p:extLst>
   </p:cSld>

</xml_diff>